<commit_message>
Updated PowerPoint, done basics, variables, and inputs
</commit_message>
<xml_diff>
--- a/Intro to Python.pptx
+++ b/Intro to Python.pptx
@@ -5,7 +5,7 @@
     <p:sldMasterId id="2147483672" r:id="rId1"/>
   </p:sldMasterIdLst>
   <p:notesMasterIdLst>
-    <p:notesMasterId r:id="rId7"/>
+    <p:notesMasterId r:id="rId25"/>
   </p:notesMasterIdLst>
   <p:sldIdLst>
     <p:sldId id="256" r:id="rId2"/>
@@ -13,6 +13,24 @@
     <p:sldId id="258" r:id="rId4"/>
     <p:sldId id="259" r:id="rId5"/>
     <p:sldId id="260" r:id="rId6"/>
+    <p:sldId id="261" r:id="rId7"/>
+    <p:sldId id="263" r:id="rId8"/>
+    <p:sldId id="264" r:id="rId9"/>
+    <p:sldId id="265" r:id="rId10"/>
+    <p:sldId id="266" r:id="rId11"/>
+    <p:sldId id="267" r:id="rId12"/>
+    <p:sldId id="268" r:id="rId13"/>
+    <p:sldId id="269" r:id="rId14"/>
+    <p:sldId id="262" r:id="rId15"/>
+    <p:sldId id="270" r:id="rId16"/>
+    <p:sldId id="271" r:id="rId17"/>
+    <p:sldId id="272" r:id="rId18"/>
+    <p:sldId id="273" r:id="rId19"/>
+    <p:sldId id="274" r:id="rId20"/>
+    <p:sldId id="275" r:id="rId21"/>
+    <p:sldId id="276" r:id="rId22"/>
+    <p:sldId id="277" r:id="rId23"/>
+    <p:sldId id="278" r:id="rId24"/>
   </p:sldIdLst>
   <p:sldSz cx="12192000" cy="6858000"/>
   <p:notesSz cx="6858000" cy="9144000"/>
@@ -111,7 +129,974 @@
       </a:defRPr>
     </a:lvl9pPr>
   </p:defaultTextStyle>
+  <p:extLst>
+    <p:ext uri="{521415D9-36F7-43E2-AB2F-B90AF26B5E84}">
+      <p14:sectionLst xmlns:p14="http://schemas.microsoft.com/office/powerpoint/2010/main">
+        <p14:section name="Introduction, Overview, and WingIDE" id="{2515C804-56B5-4066-808A-49802B160840}">
+          <p14:sldIdLst>
+            <p14:sldId id="256"/>
+            <p14:sldId id="257"/>
+            <p14:sldId id="258"/>
+            <p14:sldId id="259"/>
+            <p14:sldId id="260"/>
+          </p14:sldIdLst>
+        </p14:section>
+        <p14:section name="Python Basics" id="{59B42B09-35D9-4554-97E8-7AADC7E093EE}">
+          <p14:sldIdLst>
+            <p14:sldId id="261"/>
+            <p14:sldId id="263"/>
+            <p14:sldId id="264"/>
+            <p14:sldId id="265"/>
+            <p14:sldId id="266"/>
+            <p14:sldId id="267"/>
+            <p14:sldId id="268"/>
+            <p14:sldId id="269"/>
+          </p14:sldIdLst>
+        </p14:section>
+        <p14:section name="Variables" id="{0ACF0EC1-B140-4F3B-8749-10C7620FB726}">
+          <p14:sldIdLst>
+            <p14:sldId id="262"/>
+            <p14:sldId id="270"/>
+            <p14:sldId id="271"/>
+            <p14:sldId id="272"/>
+          </p14:sldIdLst>
+        </p14:section>
+        <p14:section name="Inputs" id="{BF9FD1F1-A4CB-4E95-94BF-2E093FF7EB99}">
+          <p14:sldIdLst>
+            <p14:sldId id="273"/>
+            <p14:sldId id="274"/>
+            <p14:sldId id="275"/>
+            <p14:sldId id="276"/>
+            <p14:sldId id="277"/>
+          </p14:sldIdLst>
+        </p14:section>
+        <p14:section name="Mad Libs!" id="{DA7385A5-716E-49CE-9AD6-29A5DB71C8F3}">
+          <p14:sldIdLst>
+            <p14:sldId id="278"/>
+          </p14:sldIdLst>
+        </p14:section>
+      </p14:sectionLst>
+    </p:ext>
+  </p:extLst>
 </p:presentation>
+</file>
+
+<file path=ppt/revisionInfo.xml><?xml version="1.0" encoding="utf-8"?>
+<p1510:revInfo xmlns:a="http://schemas.openxmlformats.org/drawingml/2006/main" xmlns:r="http://schemas.openxmlformats.org/officeDocument/2006/relationships" xmlns:p1510="http://schemas.microsoft.com/office/powerpoint/2015/10/main">
+  <p1510:revLst>
+    <p1510:client id="{745B7E24-5365-4587-8D3A-A90B788E4913}" v="6" dt="2025-04-11T23:34:00.415"/>
+  </p1510:revLst>
+</p1510:revInfo>
+</file>
+
+<file path=ppt/changesInfos/changesInfo1.xml><?xml version="1.0" encoding="utf-8"?>
+<pc:chgInfo xmlns:a="http://schemas.openxmlformats.org/drawingml/2006/main" xmlns:r="http://schemas.openxmlformats.org/officeDocument/2006/relationships" xmlns:ac="http://schemas.microsoft.com/office/drawing/2013/main/command" xmlns:pc="http://schemas.microsoft.com/office/powerpoint/2013/main/command">
+  <pc:docChgLst>
+    <pc:chgData name="Tristin Schlauch" userId="a338a217be8c714a" providerId="LiveId" clId="{745B7E24-5365-4587-8D3A-A90B788E4913}"/>
+    <pc:docChg chg="undo redo custSel addSld delSld modSld sldOrd addSection modSection">
+      <pc:chgData name="Tristin Schlauch" userId="a338a217be8c714a" providerId="LiveId" clId="{745B7E24-5365-4587-8D3A-A90B788E4913}" dt="2025-04-12T04:21:55.447" v="6760" actId="17846"/>
+      <pc:docMkLst>
+        <pc:docMk/>
+      </pc:docMkLst>
+      <pc:sldChg chg="addSp modSp mod">
+        <pc:chgData name="Tristin Schlauch" userId="a338a217be8c714a" providerId="LiveId" clId="{745B7E24-5365-4587-8D3A-A90B788E4913}" dt="2025-04-11T23:35:42.993" v="3301" actId="14100"/>
+        <pc:sldMkLst>
+          <pc:docMk/>
+          <pc:sldMk cId="1109769617" sldId="257"/>
+        </pc:sldMkLst>
+        <pc:spChg chg="mod">
+          <ac:chgData name="Tristin Schlauch" userId="a338a217be8c714a" providerId="LiveId" clId="{745B7E24-5365-4587-8D3A-A90B788E4913}" dt="2025-04-11T22:11:39.828" v="104" actId="20577"/>
+          <ac:spMkLst>
+            <pc:docMk/>
+            <pc:sldMk cId="1109769617" sldId="257"/>
+            <ac:spMk id="3" creationId="{A12318B2-D797-D3BD-8F96-CFE500DBAE22}"/>
+          </ac:spMkLst>
+        </pc:spChg>
+        <pc:picChg chg="add mod">
+          <ac:chgData name="Tristin Schlauch" userId="a338a217be8c714a" providerId="LiveId" clId="{745B7E24-5365-4587-8D3A-A90B788E4913}" dt="2025-04-11T23:35:42.993" v="3301" actId="14100"/>
+          <ac:picMkLst>
+            <pc:docMk/>
+            <pc:sldMk cId="1109769617" sldId="257"/>
+            <ac:picMk id="5" creationId="{3882A9EF-422F-6934-722F-EB3CE623898B}"/>
+          </ac:picMkLst>
+        </pc:picChg>
+      </pc:sldChg>
+      <pc:sldChg chg="addSp delSp modSp mod">
+        <pc:chgData name="Tristin Schlauch" userId="a338a217be8c714a" providerId="LiveId" clId="{745B7E24-5365-4587-8D3A-A90B788E4913}" dt="2025-04-11T23:35:37.197" v="3300" actId="14100"/>
+        <pc:sldMkLst>
+          <pc:docMk/>
+          <pc:sldMk cId="2464511473" sldId="258"/>
+        </pc:sldMkLst>
+        <pc:picChg chg="add del mod">
+          <ac:chgData name="Tristin Schlauch" userId="a338a217be8c714a" providerId="LiveId" clId="{745B7E24-5365-4587-8D3A-A90B788E4913}" dt="2025-04-11T23:34:48.207" v="3294" actId="478"/>
+          <ac:picMkLst>
+            <pc:docMk/>
+            <pc:sldMk cId="2464511473" sldId="258"/>
+            <ac:picMk id="4" creationId="{AF079DA9-CC36-69B3-9877-0D5819853C3B}"/>
+          </ac:picMkLst>
+        </pc:picChg>
+        <pc:picChg chg="add mod">
+          <ac:chgData name="Tristin Schlauch" userId="a338a217be8c714a" providerId="LiveId" clId="{745B7E24-5365-4587-8D3A-A90B788E4913}" dt="2025-04-11T23:35:37.197" v="3300" actId="14100"/>
+          <ac:picMkLst>
+            <pc:docMk/>
+            <pc:sldMk cId="2464511473" sldId="258"/>
+            <ac:picMk id="6" creationId="{B68FD70F-A4A2-DE95-EFB1-249C3EE107AE}"/>
+          </ac:picMkLst>
+        </pc:picChg>
+      </pc:sldChg>
+      <pc:sldChg chg="modSp mod">
+        <pc:chgData name="Tristin Schlauch" userId="a338a217be8c714a" providerId="LiveId" clId="{745B7E24-5365-4587-8D3A-A90B788E4913}" dt="2025-04-11T23:32:07.091" v="3283" actId="207"/>
+        <pc:sldMkLst>
+          <pc:docMk/>
+          <pc:sldMk cId="458471700" sldId="259"/>
+        </pc:sldMkLst>
+        <pc:picChg chg="mod">
+          <ac:chgData name="Tristin Schlauch" userId="a338a217be8c714a" providerId="LiveId" clId="{745B7E24-5365-4587-8D3A-A90B788E4913}" dt="2025-04-11T23:32:07.091" v="3283" actId="207"/>
+          <ac:picMkLst>
+            <pc:docMk/>
+            <pc:sldMk cId="458471700" sldId="259"/>
+            <ac:picMk id="6" creationId="{0BB36A43-88E1-C3CA-65E4-A65623159E6C}"/>
+          </ac:picMkLst>
+        </pc:picChg>
+      </pc:sldChg>
+      <pc:sldChg chg="modSp mod">
+        <pc:chgData name="Tristin Schlauch" userId="a338a217be8c714a" providerId="LiveId" clId="{745B7E24-5365-4587-8D3A-A90B788E4913}" dt="2025-04-11T22:09:49.520" v="100" actId="20577"/>
+        <pc:sldMkLst>
+          <pc:docMk/>
+          <pc:sldMk cId="1363732710" sldId="260"/>
+        </pc:sldMkLst>
+        <pc:spChg chg="mod">
+          <ac:chgData name="Tristin Schlauch" userId="a338a217be8c714a" providerId="LiveId" clId="{745B7E24-5365-4587-8D3A-A90B788E4913}" dt="2025-04-11T22:09:49.520" v="100" actId="20577"/>
+          <ac:spMkLst>
+            <pc:docMk/>
+            <pc:sldMk cId="1363732710" sldId="260"/>
+            <ac:spMk id="3" creationId="{CC0B45B2-181F-F932-01A4-A57EFA39835A}"/>
+          </ac:spMkLst>
+        </pc:spChg>
+      </pc:sldChg>
+      <pc:sldChg chg="modSp new mod">
+        <pc:chgData name="Tristin Schlauch" userId="a338a217be8c714a" providerId="LiveId" clId="{745B7E24-5365-4587-8D3A-A90B788E4913}" dt="2025-04-12T02:34:15.347" v="5211" actId="20577"/>
+        <pc:sldMkLst>
+          <pc:docMk/>
+          <pc:sldMk cId="2612894566" sldId="261"/>
+        </pc:sldMkLst>
+        <pc:spChg chg="mod">
+          <ac:chgData name="Tristin Schlauch" userId="a338a217be8c714a" providerId="LiveId" clId="{745B7E24-5365-4587-8D3A-A90B788E4913}" dt="2025-04-11T22:12:03.321" v="118" actId="20577"/>
+          <ac:spMkLst>
+            <pc:docMk/>
+            <pc:sldMk cId="2612894566" sldId="261"/>
+            <ac:spMk id="2" creationId="{573615FD-F95C-84F6-EE91-8545437E113C}"/>
+          </ac:spMkLst>
+        </pc:spChg>
+        <pc:spChg chg="mod">
+          <ac:chgData name="Tristin Schlauch" userId="a338a217be8c714a" providerId="LiveId" clId="{745B7E24-5365-4587-8D3A-A90B788E4913}" dt="2025-04-12T02:34:15.347" v="5211" actId="20577"/>
+          <ac:spMkLst>
+            <pc:docMk/>
+            <pc:sldMk cId="2612894566" sldId="261"/>
+            <ac:spMk id="3" creationId="{B24739C6-7DB5-4F10-F332-62756ADC1BCF}"/>
+          </ac:spMkLst>
+        </pc:spChg>
+      </pc:sldChg>
+      <pc:sldChg chg="modSp new mod">
+        <pc:chgData name="Tristin Schlauch" userId="a338a217be8c714a" providerId="LiveId" clId="{745B7E24-5365-4587-8D3A-A90B788E4913}" dt="2025-04-11T22:14:02.361" v="355" actId="20577"/>
+        <pc:sldMkLst>
+          <pc:docMk/>
+          <pc:sldMk cId="3682949838" sldId="262"/>
+        </pc:sldMkLst>
+        <pc:spChg chg="mod">
+          <ac:chgData name="Tristin Schlauch" userId="a338a217be8c714a" providerId="LiveId" clId="{745B7E24-5365-4587-8D3A-A90B788E4913}" dt="2025-04-11T22:13:05.416" v="193" actId="313"/>
+          <ac:spMkLst>
+            <pc:docMk/>
+            <pc:sldMk cId="3682949838" sldId="262"/>
+            <ac:spMk id="2" creationId="{73DB35D7-E2FF-56A9-DA52-69FB5E0EC317}"/>
+          </ac:spMkLst>
+        </pc:spChg>
+        <pc:spChg chg="mod">
+          <ac:chgData name="Tristin Schlauch" userId="a338a217be8c714a" providerId="LiveId" clId="{745B7E24-5365-4587-8D3A-A90B788E4913}" dt="2025-04-11T22:14:02.361" v="355" actId="20577"/>
+          <ac:spMkLst>
+            <pc:docMk/>
+            <pc:sldMk cId="3682949838" sldId="262"/>
+            <ac:spMk id="3" creationId="{6190B831-7B12-E33F-415E-B020A5A4A560}"/>
+          </ac:spMkLst>
+        </pc:spChg>
+      </pc:sldChg>
+      <pc:sldChg chg="addSp delSp modSp new mod">
+        <pc:chgData name="Tristin Schlauch" userId="a338a217be8c714a" providerId="LiveId" clId="{745B7E24-5365-4587-8D3A-A90B788E4913}" dt="2025-04-11T22:24:56.090" v="731" actId="113"/>
+        <pc:sldMkLst>
+          <pc:docMk/>
+          <pc:sldMk cId="333081405" sldId="263"/>
+        </pc:sldMkLst>
+        <pc:spChg chg="mod">
+          <ac:chgData name="Tristin Schlauch" userId="a338a217be8c714a" providerId="LiveId" clId="{745B7E24-5365-4587-8D3A-A90B788E4913}" dt="2025-04-11T22:14:42.013" v="372" actId="14100"/>
+          <ac:spMkLst>
+            <pc:docMk/>
+            <pc:sldMk cId="333081405" sldId="263"/>
+            <ac:spMk id="2" creationId="{20A681A3-70AE-BA1F-20B2-A91264840404}"/>
+          </ac:spMkLst>
+        </pc:spChg>
+        <pc:spChg chg="del mod">
+          <ac:chgData name="Tristin Schlauch" userId="a338a217be8c714a" providerId="LiveId" clId="{745B7E24-5365-4587-8D3A-A90B788E4913}" dt="2025-04-11T22:20:25.855" v="645" actId="22"/>
+          <ac:spMkLst>
+            <pc:docMk/>
+            <pc:sldMk cId="333081405" sldId="263"/>
+            <ac:spMk id="3" creationId="{17826960-017A-31E6-DBDF-2C779F781361}"/>
+          </ac:spMkLst>
+        </pc:spChg>
+        <pc:spChg chg="mod">
+          <ac:chgData name="Tristin Schlauch" userId="a338a217be8c714a" providerId="LiveId" clId="{745B7E24-5365-4587-8D3A-A90B788E4913}" dt="2025-04-11T22:24:56.090" v="731" actId="113"/>
+          <ac:spMkLst>
+            <pc:docMk/>
+            <pc:sldMk cId="333081405" sldId="263"/>
+            <ac:spMk id="4" creationId="{1A1876A9-055D-8AB3-5864-DBD6E0F3B6AB}"/>
+          </ac:spMkLst>
+        </pc:spChg>
+        <pc:spChg chg="add del mod">
+          <ac:chgData name="Tristin Schlauch" userId="a338a217be8c714a" providerId="LiveId" clId="{745B7E24-5365-4587-8D3A-A90B788E4913}" dt="2025-04-11T22:24:22.367" v="667" actId="22"/>
+          <ac:spMkLst>
+            <pc:docMk/>
+            <pc:sldMk cId="333081405" sldId="263"/>
+            <ac:spMk id="12" creationId="{DA922AE3-96AA-B63F-88E3-07AFA7A921F0}"/>
+          </ac:spMkLst>
+        </pc:spChg>
+        <pc:picChg chg="add del mod ord">
+          <ac:chgData name="Tristin Schlauch" userId="a338a217be8c714a" providerId="LiveId" clId="{745B7E24-5365-4587-8D3A-A90B788E4913}" dt="2025-04-11T22:24:18.303" v="666" actId="478"/>
+          <ac:picMkLst>
+            <pc:docMk/>
+            <pc:sldMk cId="333081405" sldId="263"/>
+            <ac:picMk id="6" creationId="{408E479C-D4E7-304A-2610-A19D114BF5D3}"/>
+          </ac:picMkLst>
+        </pc:picChg>
+        <pc:picChg chg="add del">
+          <ac:chgData name="Tristin Schlauch" userId="a338a217be8c714a" providerId="LiveId" clId="{745B7E24-5365-4587-8D3A-A90B788E4913}" dt="2025-04-11T22:23:51.805" v="661" actId="22"/>
+          <ac:picMkLst>
+            <pc:docMk/>
+            <pc:sldMk cId="333081405" sldId="263"/>
+            <ac:picMk id="8" creationId="{368F9386-6897-7A55-BD03-BFC1C3F76C07}"/>
+          </ac:picMkLst>
+        </pc:picChg>
+        <pc:picChg chg="add del mod">
+          <ac:chgData name="Tristin Schlauch" userId="a338a217be8c714a" providerId="LiveId" clId="{745B7E24-5365-4587-8D3A-A90B788E4913}" dt="2025-04-11T22:24:24.223" v="668" actId="478"/>
+          <ac:picMkLst>
+            <pc:docMk/>
+            <pc:sldMk cId="333081405" sldId="263"/>
+            <ac:picMk id="10" creationId="{B52FE8E4-ACF0-46CA-AEB9-D89446D9C45D}"/>
+          </ac:picMkLst>
+        </pc:picChg>
+        <pc:picChg chg="add mod ord">
+          <ac:chgData name="Tristin Schlauch" userId="a338a217be8c714a" providerId="LiveId" clId="{745B7E24-5365-4587-8D3A-A90B788E4913}" dt="2025-04-11T22:24:22.367" v="667" actId="22"/>
+          <ac:picMkLst>
+            <pc:docMk/>
+            <pc:sldMk cId="333081405" sldId="263"/>
+            <ac:picMk id="14" creationId="{2D753413-E486-569A-6E39-E888D5F16786}"/>
+          </ac:picMkLst>
+        </pc:picChg>
+      </pc:sldChg>
+      <pc:sldChg chg="new del">
+        <pc:chgData name="Tristin Schlauch" userId="a338a217be8c714a" providerId="LiveId" clId="{745B7E24-5365-4587-8D3A-A90B788E4913}" dt="2025-04-11T22:27:10.805" v="733" actId="2696"/>
+        <pc:sldMkLst>
+          <pc:docMk/>
+          <pc:sldMk cId="256862872" sldId="264"/>
+        </pc:sldMkLst>
+      </pc:sldChg>
+      <pc:sldChg chg="addSp delSp modSp add mod">
+        <pc:chgData name="Tristin Schlauch" userId="a338a217be8c714a" providerId="LiveId" clId="{745B7E24-5365-4587-8D3A-A90B788E4913}" dt="2025-04-11T23:33:03.134" v="3285" actId="207"/>
+        <pc:sldMkLst>
+          <pc:docMk/>
+          <pc:sldMk cId="1648925334" sldId="264"/>
+        </pc:sldMkLst>
+        <pc:spChg chg="mod">
+          <ac:chgData name="Tristin Schlauch" userId="a338a217be8c714a" providerId="LiveId" clId="{745B7E24-5365-4587-8D3A-A90B788E4913}" dt="2025-04-11T22:27:18.315" v="741" actId="20577"/>
+          <ac:spMkLst>
+            <pc:docMk/>
+            <pc:sldMk cId="1648925334" sldId="264"/>
+            <ac:spMk id="2" creationId="{474D8639-843F-78DB-81DB-EBCDAD1ACEE5}"/>
+          </ac:spMkLst>
+        </pc:spChg>
+        <pc:spChg chg="mod">
+          <ac:chgData name="Tristin Schlauch" userId="a338a217be8c714a" providerId="LiveId" clId="{745B7E24-5365-4587-8D3A-A90B788E4913}" dt="2025-04-11T22:36:19.977" v="1058" actId="20577"/>
+          <ac:spMkLst>
+            <pc:docMk/>
+            <pc:sldMk cId="1648925334" sldId="264"/>
+            <ac:spMk id="4" creationId="{E62A04F8-BFC6-BF6D-DF8E-72AB00E76264}"/>
+          </ac:spMkLst>
+        </pc:spChg>
+        <pc:spChg chg="add del mod">
+          <ac:chgData name="Tristin Schlauch" userId="a338a217be8c714a" providerId="LiveId" clId="{745B7E24-5365-4587-8D3A-A90B788E4913}" dt="2025-04-11T23:20:35.852" v="2653" actId="478"/>
+          <ac:spMkLst>
+            <pc:docMk/>
+            <pc:sldMk cId="1648925334" sldId="264"/>
+            <ac:spMk id="5" creationId="{051842D5-CBB8-B3C5-D53B-8E7053F31276}"/>
+          </ac:spMkLst>
+        </pc:spChg>
+        <pc:spChg chg="add mod">
+          <ac:chgData name="Tristin Schlauch" userId="a338a217be8c714a" providerId="LiveId" clId="{745B7E24-5365-4587-8D3A-A90B788E4913}" dt="2025-04-11T23:33:03.134" v="3285" actId="207"/>
+          <ac:spMkLst>
+            <pc:docMk/>
+            <pc:sldMk cId="1648925334" sldId="264"/>
+            <ac:spMk id="7" creationId="{78C4DF87-C0F0-3603-16AC-242B7A664008}"/>
+          </ac:spMkLst>
+        </pc:spChg>
+        <pc:spChg chg="add del mod">
+          <ac:chgData name="Tristin Schlauch" userId="a338a217be8c714a" providerId="LiveId" clId="{745B7E24-5365-4587-8D3A-A90B788E4913}" dt="2025-04-11T22:30:48.558" v="924" actId="478"/>
+          <ac:spMkLst>
+            <pc:docMk/>
+            <pc:sldMk cId="1648925334" sldId="264"/>
+            <ac:spMk id="8" creationId="{2DA655BA-33EF-DF43-2FAC-CC3D585D9EB8}"/>
+          </ac:spMkLst>
+        </pc:spChg>
+        <pc:spChg chg="add mod">
+          <ac:chgData name="Tristin Schlauch" userId="a338a217be8c714a" providerId="LiveId" clId="{745B7E24-5365-4587-8D3A-A90B788E4913}" dt="2025-04-11T23:33:03.134" v="3285" actId="207"/>
+          <ac:spMkLst>
+            <pc:docMk/>
+            <pc:sldMk cId="1648925334" sldId="264"/>
+            <ac:spMk id="9" creationId="{BDAAB18C-EFC9-CA6E-7B9E-2D960D7D244B}"/>
+          </ac:spMkLst>
+        </pc:spChg>
+        <pc:spChg chg="add mod">
+          <ac:chgData name="Tristin Schlauch" userId="a338a217be8c714a" providerId="LiveId" clId="{745B7E24-5365-4587-8D3A-A90B788E4913}" dt="2025-04-11T23:33:03.134" v="3285" actId="207"/>
+          <ac:spMkLst>
+            <pc:docMk/>
+            <pc:sldMk cId="1648925334" sldId="264"/>
+            <ac:spMk id="10" creationId="{D78B54C2-E135-925D-749F-3979B988A44A}"/>
+          </ac:spMkLst>
+        </pc:spChg>
+        <pc:picChg chg="add del mod ord">
+          <ac:chgData name="Tristin Schlauch" userId="a338a217be8c714a" providerId="LiveId" clId="{745B7E24-5365-4587-8D3A-A90B788E4913}" dt="2025-04-11T22:28:42.494" v="887" actId="34307"/>
+          <ac:picMkLst>
+            <pc:docMk/>
+            <pc:sldMk cId="1648925334" sldId="264"/>
+            <ac:picMk id="6" creationId="{DAB2AF7F-7315-51F0-32EC-C874079722F5}"/>
+          </ac:picMkLst>
+        </pc:picChg>
+        <pc:picChg chg="del">
+          <ac:chgData name="Tristin Schlauch" userId="a338a217be8c714a" providerId="LiveId" clId="{745B7E24-5365-4587-8D3A-A90B788E4913}" dt="2025-04-11T22:28:29.286" v="885" actId="478"/>
+          <ac:picMkLst>
+            <pc:docMk/>
+            <pc:sldMk cId="1648925334" sldId="264"/>
+            <ac:picMk id="14" creationId="{37EE6C99-5E1A-5125-A996-1BBEEDA820AC}"/>
+          </ac:picMkLst>
+        </pc:picChg>
+      </pc:sldChg>
+      <pc:sldChg chg="addSp delSp modSp add mod setBg">
+        <pc:chgData name="Tristin Schlauch" userId="a338a217be8c714a" providerId="LiveId" clId="{745B7E24-5365-4587-8D3A-A90B788E4913}" dt="2025-04-11T22:41:30.847" v="1461" actId="26606"/>
+        <pc:sldMkLst>
+          <pc:docMk/>
+          <pc:sldMk cId="1856306127" sldId="265"/>
+        </pc:sldMkLst>
+        <pc:spChg chg="mod">
+          <ac:chgData name="Tristin Schlauch" userId="a338a217be8c714a" providerId="LiveId" clId="{745B7E24-5365-4587-8D3A-A90B788E4913}" dt="2025-04-11T22:41:30.847" v="1461" actId="26606"/>
+          <ac:spMkLst>
+            <pc:docMk/>
+            <pc:sldMk cId="1856306127" sldId="265"/>
+            <ac:spMk id="2" creationId="{5AF9285D-2D7A-0EC9-39BC-AEA0A90163B8}"/>
+          </ac:spMkLst>
+        </pc:spChg>
+        <pc:spChg chg="mod">
+          <ac:chgData name="Tristin Schlauch" userId="a338a217be8c714a" providerId="LiveId" clId="{745B7E24-5365-4587-8D3A-A90B788E4913}" dt="2025-04-11T22:41:30.847" v="1461" actId="26606"/>
+          <ac:spMkLst>
+            <pc:docMk/>
+            <pc:sldMk cId="1856306127" sldId="265"/>
+            <ac:spMk id="4" creationId="{5A03E529-1997-FDB7-77C7-A311E1875715}"/>
+          </ac:spMkLst>
+        </pc:spChg>
+        <pc:spChg chg="del">
+          <ac:chgData name="Tristin Schlauch" userId="a338a217be8c714a" providerId="LiveId" clId="{745B7E24-5365-4587-8D3A-A90B788E4913}" dt="2025-04-11T22:41:20.612" v="1457" actId="22"/>
+          <ac:spMkLst>
+            <pc:docMk/>
+            <pc:sldMk cId="1856306127" sldId="265"/>
+            <ac:spMk id="5" creationId="{95212BBB-F989-2C6B-104A-0D00D48ED6C1}"/>
+          </ac:spMkLst>
+        </pc:spChg>
+        <pc:spChg chg="del">
+          <ac:chgData name="Tristin Schlauch" userId="a338a217be8c714a" providerId="LiveId" clId="{745B7E24-5365-4587-8D3A-A90B788E4913}" dt="2025-04-11T22:39:40.495" v="1453" actId="478"/>
+          <ac:spMkLst>
+            <pc:docMk/>
+            <pc:sldMk cId="1856306127" sldId="265"/>
+            <ac:spMk id="7" creationId="{B58358EA-0F22-A771-E16E-D3CFA6A38E81}"/>
+          </ac:spMkLst>
+        </pc:spChg>
+        <pc:spChg chg="add del">
+          <ac:chgData name="Tristin Schlauch" userId="a338a217be8c714a" providerId="LiveId" clId="{745B7E24-5365-4587-8D3A-A90B788E4913}" dt="2025-04-11T22:41:30.847" v="1461" actId="26606"/>
+          <ac:spMkLst>
+            <pc:docMk/>
+            <pc:sldMk cId="1856306127" sldId="265"/>
+            <ac:spMk id="8" creationId="{6C0DD7BF-8F3D-4D34-A37A-85563D3D62FF}"/>
+          </ac:spMkLst>
+        </pc:spChg>
+        <pc:spChg chg="del mod">
+          <ac:chgData name="Tristin Schlauch" userId="a338a217be8c714a" providerId="LiveId" clId="{745B7E24-5365-4587-8D3A-A90B788E4913}" dt="2025-04-11T22:39:43.948" v="1455" actId="478"/>
+          <ac:spMkLst>
+            <pc:docMk/>
+            <pc:sldMk cId="1856306127" sldId="265"/>
+            <ac:spMk id="9" creationId="{3C8CD38D-148B-0CD2-E44F-C69CCA359EBA}"/>
+          </ac:spMkLst>
+        </pc:spChg>
+        <pc:spChg chg="del">
+          <ac:chgData name="Tristin Schlauch" userId="a338a217be8c714a" providerId="LiveId" clId="{745B7E24-5365-4587-8D3A-A90B788E4913}" dt="2025-04-11T22:39:45.611" v="1456" actId="478"/>
+          <ac:spMkLst>
+            <pc:docMk/>
+            <pc:sldMk cId="1856306127" sldId="265"/>
+            <ac:spMk id="10" creationId="{1658EB61-C2E7-5FC4-B152-A4B2B0C645AD}"/>
+          </ac:spMkLst>
+        </pc:spChg>
+        <pc:spChg chg="add del">
+          <ac:chgData name="Tristin Schlauch" userId="a338a217be8c714a" providerId="LiveId" clId="{745B7E24-5365-4587-8D3A-A90B788E4913}" dt="2025-04-11T22:41:25.353" v="1459" actId="26606"/>
+          <ac:spMkLst>
+            <pc:docMk/>
+            <pc:sldMk cId="1856306127" sldId="265"/>
+            <ac:spMk id="11" creationId="{6C0DD7BF-8F3D-4D34-A37A-85563D3D62FF}"/>
+          </ac:spMkLst>
+        </pc:spChg>
+        <pc:spChg chg="add del">
+          <ac:chgData name="Tristin Schlauch" userId="a338a217be8c714a" providerId="LiveId" clId="{745B7E24-5365-4587-8D3A-A90B788E4913}" dt="2025-04-11T22:41:30.847" v="1461" actId="26606"/>
+          <ac:spMkLst>
+            <pc:docMk/>
+            <pc:sldMk cId="1856306127" sldId="265"/>
+            <ac:spMk id="12" creationId="{63135777-4113-40E0-9CAE-CC223A245E04}"/>
+          </ac:spMkLst>
+        </pc:spChg>
+        <pc:spChg chg="add del">
+          <ac:chgData name="Tristin Schlauch" userId="a338a217be8c714a" providerId="LiveId" clId="{745B7E24-5365-4587-8D3A-A90B788E4913}" dt="2025-04-11T22:41:25.353" v="1459" actId="26606"/>
+          <ac:spMkLst>
+            <pc:docMk/>
+            <pc:sldMk cId="1856306127" sldId="265"/>
+            <ac:spMk id="13" creationId="{63135777-4113-40E0-9CAE-CC223A245E04}"/>
+          </ac:spMkLst>
+        </pc:spChg>
+        <pc:picChg chg="add mod ord">
+          <ac:chgData name="Tristin Schlauch" userId="a338a217be8c714a" providerId="LiveId" clId="{745B7E24-5365-4587-8D3A-A90B788E4913}" dt="2025-04-11T22:41:30.847" v="1461" actId="26606"/>
+          <ac:picMkLst>
+            <pc:docMk/>
+            <pc:sldMk cId="1856306127" sldId="265"/>
+            <ac:picMk id="6" creationId="{A20AC352-795A-C1F0-5907-CF7CC8C08D5B}"/>
+          </ac:picMkLst>
+        </pc:picChg>
+      </pc:sldChg>
+      <pc:sldChg chg="addSp delSp modSp add mod">
+        <pc:chgData name="Tristin Schlauch" userId="a338a217be8c714a" providerId="LiveId" clId="{745B7E24-5365-4587-8D3A-A90B788E4913}" dt="2025-04-11T22:59:27.856" v="1978" actId="20577"/>
+        <pc:sldMkLst>
+          <pc:docMk/>
+          <pc:sldMk cId="2295966033" sldId="266"/>
+        </pc:sldMkLst>
+        <pc:spChg chg="mod">
+          <ac:chgData name="Tristin Schlauch" userId="a338a217be8c714a" providerId="LiveId" clId="{745B7E24-5365-4587-8D3A-A90B788E4913}" dt="2025-04-11T22:49:34.797" v="1648" actId="20577"/>
+          <ac:spMkLst>
+            <pc:docMk/>
+            <pc:sldMk cId="2295966033" sldId="266"/>
+            <ac:spMk id="2" creationId="{4BA2A229-2C1A-94AA-DA0E-D500825FC29F}"/>
+          </ac:spMkLst>
+        </pc:spChg>
+        <pc:spChg chg="mod">
+          <ac:chgData name="Tristin Schlauch" userId="a338a217be8c714a" providerId="LiveId" clId="{745B7E24-5365-4587-8D3A-A90B788E4913}" dt="2025-04-11T22:59:27.856" v="1978" actId="20577"/>
+          <ac:spMkLst>
+            <pc:docMk/>
+            <pc:sldMk cId="2295966033" sldId="266"/>
+            <ac:spMk id="4" creationId="{9DD9F5B0-9C00-F356-961F-F123AB2B2607}"/>
+          </ac:spMkLst>
+        </pc:spChg>
+        <pc:spChg chg="add del mod">
+          <ac:chgData name="Tristin Schlauch" userId="a338a217be8c714a" providerId="LiveId" clId="{745B7E24-5365-4587-8D3A-A90B788E4913}" dt="2025-04-11T22:54:44.195" v="1893" actId="22"/>
+          <ac:spMkLst>
+            <pc:docMk/>
+            <pc:sldMk cId="2295966033" sldId="266"/>
+            <ac:spMk id="5" creationId="{574F5AF7-EF62-C30B-B542-99FAE4A0673F}"/>
+          </ac:spMkLst>
+        </pc:spChg>
+        <pc:picChg chg="del">
+          <ac:chgData name="Tristin Schlauch" userId="a338a217be8c714a" providerId="LiveId" clId="{745B7E24-5365-4587-8D3A-A90B788E4913}" dt="2025-04-11T22:54:41.440" v="1892" actId="478"/>
+          <ac:picMkLst>
+            <pc:docMk/>
+            <pc:sldMk cId="2295966033" sldId="266"/>
+            <ac:picMk id="6" creationId="{14C5E604-23E1-05F0-945B-1F41AC982B0E}"/>
+          </ac:picMkLst>
+        </pc:picChg>
+        <pc:picChg chg="add mod ord">
+          <ac:chgData name="Tristin Schlauch" userId="a338a217be8c714a" providerId="LiveId" clId="{745B7E24-5365-4587-8D3A-A90B788E4913}" dt="2025-04-11T22:54:44.195" v="1893" actId="22"/>
+          <ac:picMkLst>
+            <pc:docMk/>
+            <pc:sldMk cId="2295966033" sldId="266"/>
+            <ac:picMk id="8" creationId="{31ABB23C-C8CD-CD14-9407-6513328013F7}"/>
+          </ac:picMkLst>
+        </pc:picChg>
+      </pc:sldChg>
+      <pc:sldChg chg="new del">
+        <pc:chgData name="Tristin Schlauch" userId="a338a217be8c714a" providerId="LiveId" clId="{745B7E24-5365-4587-8D3A-A90B788E4913}" dt="2025-04-11T22:47:44.277" v="1463" actId="2696"/>
+        <pc:sldMkLst>
+          <pc:docMk/>
+          <pc:sldMk cId="3809575752" sldId="266"/>
+        </pc:sldMkLst>
+      </pc:sldChg>
+      <pc:sldChg chg="addSp delSp modSp add mod">
+        <pc:chgData name="Tristin Schlauch" userId="a338a217be8c714a" providerId="LiveId" clId="{745B7E24-5365-4587-8D3A-A90B788E4913}" dt="2025-04-11T23:14:38.539" v="2210" actId="22"/>
+        <pc:sldMkLst>
+          <pc:docMk/>
+          <pc:sldMk cId="846000198" sldId="267"/>
+        </pc:sldMkLst>
+        <pc:spChg chg="mod">
+          <ac:chgData name="Tristin Schlauch" userId="a338a217be8c714a" providerId="LiveId" clId="{745B7E24-5365-4587-8D3A-A90B788E4913}" dt="2025-04-11T22:58:31.959" v="1927" actId="20577"/>
+          <ac:spMkLst>
+            <pc:docMk/>
+            <pc:sldMk cId="846000198" sldId="267"/>
+            <ac:spMk id="2" creationId="{A72BB625-0CA8-ACB9-F253-1DE85F2AEE80}"/>
+          </ac:spMkLst>
+        </pc:spChg>
+        <pc:spChg chg="mod">
+          <ac:chgData name="Tristin Schlauch" userId="a338a217be8c714a" providerId="LiveId" clId="{745B7E24-5365-4587-8D3A-A90B788E4913}" dt="2025-04-11T23:12:48.836" v="2208" actId="20577"/>
+          <ac:spMkLst>
+            <pc:docMk/>
+            <pc:sldMk cId="846000198" sldId="267"/>
+            <ac:spMk id="4" creationId="{992E0DA1-CCA6-656C-6C3B-86B0331C5728}"/>
+          </ac:spMkLst>
+        </pc:spChg>
+        <pc:spChg chg="add del mod">
+          <ac:chgData name="Tristin Schlauch" userId="a338a217be8c714a" providerId="LiveId" clId="{745B7E24-5365-4587-8D3A-A90B788E4913}" dt="2025-04-11T23:14:38.539" v="2210" actId="22"/>
+          <ac:spMkLst>
+            <pc:docMk/>
+            <pc:sldMk cId="846000198" sldId="267"/>
+            <ac:spMk id="5" creationId="{448DFE1A-70E2-BD99-1275-209F57D9AAA6}"/>
+          </ac:spMkLst>
+        </pc:spChg>
+        <pc:picChg chg="add mod ord">
+          <ac:chgData name="Tristin Schlauch" userId="a338a217be8c714a" providerId="LiveId" clId="{745B7E24-5365-4587-8D3A-A90B788E4913}" dt="2025-04-11T23:14:38.539" v="2210" actId="22"/>
+          <ac:picMkLst>
+            <pc:docMk/>
+            <pc:sldMk cId="846000198" sldId="267"/>
+            <ac:picMk id="7" creationId="{3EAEA0B7-FB3D-236F-9839-8F2E1CB85A85}"/>
+          </ac:picMkLst>
+        </pc:picChg>
+        <pc:picChg chg="del">
+          <ac:chgData name="Tristin Schlauch" userId="a338a217be8c714a" providerId="LiveId" clId="{745B7E24-5365-4587-8D3A-A90B788E4913}" dt="2025-04-11T23:14:35.031" v="2209" actId="478"/>
+          <ac:picMkLst>
+            <pc:docMk/>
+            <pc:sldMk cId="846000198" sldId="267"/>
+            <ac:picMk id="8" creationId="{3366848E-5823-D4AF-4D7E-160DD32B6C0A}"/>
+          </ac:picMkLst>
+        </pc:picChg>
+      </pc:sldChg>
+      <pc:sldChg chg="addSp delSp modSp add mod">
+        <pc:chgData name="Tristin Schlauch" userId="a338a217be8c714a" providerId="LiveId" clId="{745B7E24-5365-4587-8D3A-A90B788E4913}" dt="2025-04-11T23:20:14.188" v="2652" actId="22"/>
+        <pc:sldMkLst>
+          <pc:docMk/>
+          <pc:sldMk cId="3600372758" sldId="268"/>
+        </pc:sldMkLst>
+        <pc:spChg chg="mod">
+          <ac:chgData name="Tristin Schlauch" userId="a338a217be8c714a" providerId="LiveId" clId="{745B7E24-5365-4587-8D3A-A90B788E4913}" dt="2025-04-11T23:15:42.273" v="2242" actId="14100"/>
+          <ac:spMkLst>
+            <pc:docMk/>
+            <pc:sldMk cId="3600372758" sldId="268"/>
+            <ac:spMk id="2" creationId="{AE2EF6B0-FA34-AD22-ECB5-FB871F799452}"/>
+          </ac:spMkLst>
+        </pc:spChg>
+        <pc:spChg chg="mod">
+          <ac:chgData name="Tristin Schlauch" userId="a338a217be8c714a" providerId="LiveId" clId="{745B7E24-5365-4587-8D3A-A90B788E4913}" dt="2025-04-11T23:18:34.306" v="2650" actId="20577"/>
+          <ac:spMkLst>
+            <pc:docMk/>
+            <pc:sldMk cId="3600372758" sldId="268"/>
+            <ac:spMk id="4" creationId="{E68EF9E0-51EC-9623-B5C7-8CA25C616083}"/>
+          </ac:spMkLst>
+        </pc:spChg>
+        <pc:spChg chg="add del mod">
+          <ac:chgData name="Tristin Schlauch" userId="a338a217be8c714a" providerId="LiveId" clId="{745B7E24-5365-4587-8D3A-A90B788E4913}" dt="2025-04-11T23:20:14.188" v="2652" actId="22"/>
+          <ac:spMkLst>
+            <pc:docMk/>
+            <pc:sldMk cId="3600372758" sldId="268"/>
+            <ac:spMk id="5" creationId="{BFEDCA3B-2EF1-CAD1-D2DF-F44112484FE8}"/>
+          </ac:spMkLst>
+        </pc:spChg>
+        <pc:picChg chg="del">
+          <ac:chgData name="Tristin Schlauch" userId="a338a217be8c714a" providerId="LiveId" clId="{745B7E24-5365-4587-8D3A-A90B788E4913}" dt="2025-04-11T23:18:36.874" v="2651" actId="478"/>
+          <ac:picMkLst>
+            <pc:docMk/>
+            <pc:sldMk cId="3600372758" sldId="268"/>
+            <ac:picMk id="7" creationId="{A3D62F95-A044-B12D-6931-5CEFD20EFCBB}"/>
+          </ac:picMkLst>
+        </pc:picChg>
+        <pc:picChg chg="add mod ord">
+          <ac:chgData name="Tristin Schlauch" userId="a338a217be8c714a" providerId="LiveId" clId="{745B7E24-5365-4587-8D3A-A90B788E4913}" dt="2025-04-11T23:20:14.188" v="2652" actId="22"/>
+          <ac:picMkLst>
+            <pc:docMk/>
+            <pc:sldMk cId="3600372758" sldId="268"/>
+            <ac:picMk id="8" creationId="{3C3BAE52-6DDE-AD48-B540-E37F0CAA0F76}"/>
+          </ac:picMkLst>
+        </pc:picChg>
+      </pc:sldChg>
+      <pc:sldChg chg="modSp new mod">
+        <pc:chgData name="Tristin Schlauch" userId="a338a217be8c714a" providerId="LiveId" clId="{745B7E24-5365-4587-8D3A-A90B788E4913}" dt="2025-04-11T23:26:43.814" v="3273" actId="20577"/>
+        <pc:sldMkLst>
+          <pc:docMk/>
+          <pc:sldMk cId="2649422868" sldId="269"/>
+        </pc:sldMkLst>
+        <pc:spChg chg="mod">
+          <ac:chgData name="Tristin Schlauch" userId="a338a217be8c714a" providerId="LiveId" clId="{745B7E24-5365-4587-8D3A-A90B788E4913}" dt="2025-04-11T23:21:06.325" v="2682" actId="20577"/>
+          <ac:spMkLst>
+            <pc:docMk/>
+            <pc:sldMk cId="2649422868" sldId="269"/>
+            <ac:spMk id="2" creationId="{85C0CF99-D5BF-0D5F-778A-DC0C75D29491}"/>
+          </ac:spMkLst>
+        </pc:spChg>
+        <pc:spChg chg="mod">
+          <ac:chgData name="Tristin Schlauch" userId="a338a217be8c714a" providerId="LiveId" clId="{745B7E24-5365-4587-8D3A-A90B788E4913}" dt="2025-04-11T23:26:43.814" v="3273" actId="20577"/>
+          <ac:spMkLst>
+            <pc:docMk/>
+            <pc:sldMk cId="2649422868" sldId="269"/>
+            <ac:spMk id="3" creationId="{9C7D56BE-5D10-F538-0C1F-F17117EF8666}"/>
+          </ac:spMkLst>
+        </pc:spChg>
+      </pc:sldChg>
+      <pc:sldChg chg="addSp delSp modSp new mod modClrScheme chgLayout">
+        <pc:chgData name="Tristin Schlauch" userId="a338a217be8c714a" providerId="LiveId" clId="{745B7E24-5365-4587-8D3A-A90B788E4913}" dt="2025-04-12T01:45:00.764" v="4522" actId="14100"/>
+        <pc:sldMkLst>
+          <pc:docMk/>
+          <pc:sldMk cId="4101037148" sldId="270"/>
+        </pc:sldMkLst>
+        <pc:spChg chg="mod ord">
+          <ac:chgData name="Tristin Schlauch" userId="a338a217be8c714a" providerId="LiveId" clId="{745B7E24-5365-4587-8D3A-A90B788E4913}" dt="2025-04-12T01:33:33.679" v="3711" actId="700"/>
+          <ac:spMkLst>
+            <pc:docMk/>
+            <pc:sldMk cId="4101037148" sldId="270"/>
+            <ac:spMk id="2" creationId="{86B3F944-211E-F9D2-F4F6-5C0C0F336072}"/>
+          </ac:spMkLst>
+        </pc:spChg>
+        <pc:spChg chg="del mod ord">
+          <ac:chgData name="Tristin Schlauch" userId="a338a217be8c714a" providerId="LiveId" clId="{745B7E24-5365-4587-8D3A-A90B788E4913}" dt="2025-04-12T01:38:08.100" v="3926" actId="22"/>
+          <ac:spMkLst>
+            <pc:docMk/>
+            <pc:sldMk cId="4101037148" sldId="270"/>
+            <ac:spMk id="3" creationId="{4E8E168E-8D4A-0DEC-D9A8-CE86809FEFC9}"/>
+          </ac:spMkLst>
+        </pc:spChg>
+        <pc:spChg chg="add mod ord">
+          <ac:chgData name="Tristin Schlauch" userId="a338a217be8c714a" providerId="LiveId" clId="{745B7E24-5365-4587-8D3A-A90B788E4913}" dt="2025-04-12T01:45:00.764" v="4522" actId="14100"/>
+          <ac:spMkLst>
+            <pc:docMk/>
+            <pc:sldMk cId="4101037148" sldId="270"/>
+            <ac:spMk id="4" creationId="{EBD85136-D407-4C2C-44D6-FA290D61DC74}"/>
+          </ac:spMkLst>
+        </pc:spChg>
+        <pc:picChg chg="add mod ord">
+          <ac:chgData name="Tristin Schlauch" userId="a338a217be8c714a" providerId="LiveId" clId="{745B7E24-5365-4587-8D3A-A90B788E4913}" dt="2025-04-12T01:38:08.100" v="3926" actId="22"/>
+          <ac:picMkLst>
+            <pc:docMk/>
+            <pc:sldMk cId="4101037148" sldId="270"/>
+            <ac:picMk id="6" creationId="{17A2B4E0-6F0D-4918-A4D4-891DCEE5DAB9}"/>
+          </ac:picMkLst>
+        </pc:picChg>
+      </pc:sldChg>
+      <pc:sldChg chg="addSp delSp modSp add mod">
+        <pc:chgData name="Tristin Schlauch" userId="a338a217be8c714a" providerId="LiveId" clId="{745B7E24-5365-4587-8D3A-A90B788E4913}" dt="2025-04-12T01:51:53.167" v="4529" actId="22"/>
+        <pc:sldMkLst>
+          <pc:docMk/>
+          <pc:sldMk cId="1890857210" sldId="271"/>
+        </pc:sldMkLst>
+        <pc:spChg chg="mod">
+          <ac:chgData name="Tristin Schlauch" userId="a338a217be8c714a" providerId="LiveId" clId="{745B7E24-5365-4587-8D3A-A90B788E4913}" dt="2025-04-12T01:39:03.392" v="3942" actId="20577"/>
+          <ac:spMkLst>
+            <pc:docMk/>
+            <pc:sldMk cId="1890857210" sldId="271"/>
+            <ac:spMk id="2" creationId="{2C503A57-6DB6-E8E0-900B-FBCCF90E107E}"/>
+          </ac:spMkLst>
+        </pc:spChg>
+        <pc:spChg chg="mod">
+          <ac:chgData name="Tristin Schlauch" userId="a338a217be8c714a" providerId="LiveId" clId="{745B7E24-5365-4587-8D3A-A90B788E4913}" dt="2025-04-12T01:45:25.992" v="4527" actId="114"/>
+          <ac:spMkLst>
+            <pc:docMk/>
+            <pc:sldMk cId="1890857210" sldId="271"/>
+            <ac:spMk id="4" creationId="{519E66CB-B56F-D845-F4E5-D736212EECE0}"/>
+          </ac:spMkLst>
+        </pc:spChg>
+        <pc:spChg chg="add del mod">
+          <ac:chgData name="Tristin Schlauch" userId="a338a217be8c714a" providerId="LiveId" clId="{745B7E24-5365-4587-8D3A-A90B788E4913}" dt="2025-04-12T01:51:53.167" v="4529" actId="22"/>
+          <ac:spMkLst>
+            <pc:docMk/>
+            <pc:sldMk cId="1890857210" sldId="271"/>
+            <ac:spMk id="5" creationId="{F42A1BDB-CF3D-6CBA-307D-9FDEC889EC9C}"/>
+          </ac:spMkLst>
+        </pc:spChg>
+        <pc:picChg chg="del">
+          <ac:chgData name="Tristin Schlauch" userId="a338a217be8c714a" providerId="LiveId" clId="{745B7E24-5365-4587-8D3A-A90B788E4913}" dt="2025-04-12T01:51:50.925" v="4528" actId="478"/>
+          <ac:picMkLst>
+            <pc:docMk/>
+            <pc:sldMk cId="1890857210" sldId="271"/>
+            <ac:picMk id="6" creationId="{A34B32F5-CCA3-ADF9-B196-93CE9DB957D3}"/>
+          </ac:picMkLst>
+        </pc:picChg>
+        <pc:picChg chg="add mod ord">
+          <ac:chgData name="Tristin Schlauch" userId="a338a217be8c714a" providerId="LiveId" clId="{745B7E24-5365-4587-8D3A-A90B788E4913}" dt="2025-04-12T01:51:53.167" v="4529" actId="22"/>
+          <ac:picMkLst>
+            <pc:docMk/>
+            <pc:sldMk cId="1890857210" sldId="271"/>
+            <ac:picMk id="8" creationId="{2D34436E-E1A3-546E-7947-74BA019E7CB7}"/>
+          </ac:picMkLst>
+        </pc:picChg>
+      </pc:sldChg>
+      <pc:sldChg chg="modSp add mod ord">
+        <pc:chgData name="Tristin Schlauch" userId="a338a217be8c714a" providerId="LiveId" clId="{745B7E24-5365-4587-8D3A-A90B788E4913}" dt="2025-04-12T02:01:39.329" v="5125" actId="255"/>
+        <pc:sldMkLst>
+          <pc:docMk/>
+          <pc:sldMk cId="1159791470" sldId="272"/>
+        </pc:sldMkLst>
+        <pc:spChg chg="mod">
+          <ac:chgData name="Tristin Schlauch" userId="a338a217be8c714a" providerId="LiveId" clId="{745B7E24-5365-4587-8D3A-A90B788E4913}" dt="2025-04-12T01:54:41.162" v="4541" actId="20577"/>
+          <ac:spMkLst>
+            <pc:docMk/>
+            <pc:sldMk cId="1159791470" sldId="272"/>
+            <ac:spMk id="2" creationId="{24171CEB-3F5F-811C-7488-46209BA5C5F7}"/>
+          </ac:spMkLst>
+        </pc:spChg>
+        <pc:spChg chg="mod">
+          <ac:chgData name="Tristin Schlauch" userId="a338a217be8c714a" providerId="LiveId" clId="{745B7E24-5365-4587-8D3A-A90B788E4913}" dt="2025-04-12T02:01:39.329" v="5125" actId="255"/>
+          <ac:spMkLst>
+            <pc:docMk/>
+            <pc:sldMk cId="1159791470" sldId="272"/>
+            <ac:spMk id="3" creationId="{BC16C1B0-4ACC-BB02-DCE3-F8A2BA412897}"/>
+          </ac:spMkLst>
+        </pc:spChg>
+      </pc:sldChg>
+      <pc:sldChg chg="modSp add mod ord">
+        <pc:chgData name="Tristin Schlauch" userId="a338a217be8c714a" providerId="LiveId" clId="{745B7E24-5365-4587-8D3A-A90B788E4913}" dt="2025-04-12T02:41:16.263" v="5218" actId="2711"/>
+        <pc:sldMkLst>
+          <pc:docMk/>
+          <pc:sldMk cId="2657423670" sldId="273"/>
+        </pc:sldMkLst>
+        <pc:spChg chg="mod">
+          <ac:chgData name="Tristin Schlauch" userId="a338a217be8c714a" providerId="LiveId" clId="{745B7E24-5365-4587-8D3A-A90B788E4913}" dt="2025-04-12T02:12:44.742" v="5134" actId="20577"/>
+          <ac:spMkLst>
+            <pc:docMk/>
+            <pc:sldMk cId="2657423670" sldId="273"/>
+            <ac:spMk id="2" creationId="{A37F8991-028C-BE2D-1E2A-8440BFEA052B}"/>
+          </ac:spMkLst>
+        </pc:spChg>
+        <pc:spChg chg="mod">
+          <ac:chgData name="Tristin Schlauch" userId="a338a217be8c714a" providerId="LiveId" clId="{745B7E24-5365-4587-8D3A-A90B788E4913}" dt="2025-04-12T02:41:16.263" v="5218" actId="2711"/>
+          <ac:spMkLst>
+            <pc:docMk/>
+            <pc:sldMk cId="2657423670" sldId="273"/>
+            <ac:spMk id="3" creationId="{50D7CF0D-0649-82D6-4744-24EF339A3C23}"/>
+          </ac:spMkLst>
+        </pc:spChg>
+      </pc:sldChg>
+      <pc:sldChg chg="addSp delSp modSp add mod ord">
+        <pc:chgData name="Tristin Schlauch" userId="a338a217be8c714a" providerId="LiveId" clId="{745B7E24-5365-4587-8D3A-A90B788E4913}" dt="2025-04-12T03:49:26.337" v="5710" actId="1076"/>
+        <pc:sldMkLst>
+          <pc:docMk/>
+          <pc:sldMk cId="1987775902" sldId="274"/>
+        </pc:sldMkLst>
+        <pc:spChg chg="mod">
+          <ac:chgData name="Tristin Schlauch" userId="a338a217be8c714a" providerId="LiveId" clId="{745B7E24-5365-4587-8D3A-A90B788E4913}" dt="2025-04-12T03:41:55.365" v="5702" actId="1076"/>
+          <ac:spMkLst>
+            <pc:docMk/>
+            <pc:sldMk cId="1987775902" sldId="274"/>
+            <ac:spMk id="2" creationId="{104346AA-DCBC-FE9A-C2FF-441EBEED8313}"/>
+          </ac:spMkLst>
+        </pc:spChg>
+        <pc:spChg chg="mod">
+          <ac:chgData name="Tristin Schlauch" userId="a338a217be8c714a" providerId="LiveId" clId="{745B7E24-5365-4587-8D3A-A90B788E4913}" dt="2025-04-12T03:43:31.382" v="5703" actId="20577"/>
+          <ac:spMkLst>
+            <pc:docMk/>
+            <pc:sldMk cId="1987775902" sldId="274"/>
+            <ac:spMk id="4" creationId="{EFEF4443-4903-A401-FDAA-195F8C06A5A3}"/>
+          </ac:spMkLst>
+        </pc:spChg>
+        <pc:spChg chg="add del mod">
+          <ac:chgData name="Tristin Schlauch" userId="a338a217be8c714a" providerId="LiveId" clId="{745B7E24-5365-4587-8D3A-A90B788E4913}" dt="2025-04-12T03:49:12.215" v="5707" actId="22"/>
+          <ac:spMkLst>
+            <pc:docMk/>
+            <pc:sldMk cId="1987775902" sldId="274"/>
+            <ac:spMk id="5" creationId="{77CF4652-F3D1-4C95-A780-8FA9870C2357}"/>
+          </ac:spMkLst>
+        </pc:spChg>
+        <pc:picChg chg="del">
+          <ac:chgData name="Tristin Schlauch" userId="a338a217be8c714a" providerId="LiveId" clId="{745B7E24-5365-4587-8D3A-A90B788E4913}" dt="2025-04-12T03:48:17.074" v="5704" actId="478"/>
+          <ac:picMkLst>
+            <pc:docMk/>
+            <pc:sldMk cId="1987775902" sldId="274"/>
+            <ac:picMk id="6" creationId="{F092E289-9CD9-D73E-91CD-2FC1F0DA3E20}"/>
+          </ac:picMkLst>
+        </pc:picChg>
+        <pc:picChg chg="add mod">
+          <ac:chgData name="Tristin Schlauch" userId="a338a217be8c714a" providerId="LiveId" clId="{745B7E24-5365-4587-8D3A-A90B788E4913}" dt="2025-04-12T03:49:26.337" v="5710" actId="1076"/>
+          <ac:picMkLst>
+            <pc:docMk/>
+            <pc:sldMk cId="1987775902" sldId="274"/>
+            <ac:picMk id="8" creationId="{2B781598-7620-EF1F-9F76-825000F9CF09}"/>
+          </ac:picMkLst>
+        </pc:picChg>
+        <pc:picChg chg="add mod ord">
+          <ac:chgData name="Tristin Schlauch" userId="a338a217be8c714a" providerId="LiveId" clId="{745B7E24-5365-4587-8D3A-A90B788E4913}" dt="2025-04-12T03:49:18.773" v="5708" actId="1076"/>
+          <ac:picMkLst>
+            <pc:docMk/>
+            <pc:sldMk cId="1987775902" sldId="274"/>
+            <ac:picMk id="10" creationId="{353AFD7C-DDB6-C1A1-504F-AF9CB2175037}"/>
+          </ac:picMkLst>
+        </pc:picChg>
+      </pc:sldChg>
+      <pc:sldChg chg="addSp delSp modSp add mod">
+        <pc:chgData name="Tristin Schlauch" userId="a338a217be8c714a" providerId="LiveId" clId="{745B7E24-5365-4587-8D3A-A90B788E4913}" dt="2025-04-12T03:58:50.881" v="6069" actId="20577"/>
+        <pc:sldMkLst>
+          <pc:docMk/>
+          <pc:sldMk cId="3610940009" sldId="275"/>
+        </pc:sldMkLst>
+        <pc:spChg chg="mod">
+          <ac:chgData name="Tristin Schlauch" userId="a338a217be8c714a" providerId="LiveId" clId="{745B7E24-5365-4587-8D3A-A90B788E4913}" dt="2025-04-12T03:53:02.907" v="5739" actId="20577"/>
+          <ac:spMkLst>
+            <pc:docMk/>
+            <pc:sldMk cId="3610940009" sldId="275"/>
+            <ac:spMk id="2" creationId="{B674C022-A32E-7000-362B-E2A15B381159}"/>
+          </ac:spMkLst>
+        </pc:spChg>
+        <pc:spChg chg="mod">
+          <ac:chgData name="Tristin Schlauch" userId="a338a217be8c714a" providerId="LiveId" clId="{745B7E24-5365-4587-8D3A-A90B788E4913}" dt="2025-04-12T03:58:50.881" v="6069" actId="20577"/>
+          <ac:spMkLst>
+            <pc:docMk/>
+            <pc:sldMk cId="3610940009" sldId="275"/>
+            <ac:spMk id="4" creationId="{6AE680DF-3966-9499-8EBE-E0CB325C7728}"/>
+          </ac:spMkLst>
+        </pc:spChg>
+        <pc:spChg chg="add del mod">
+          <ac:chgData name="Tristin Schlauch" userId="a338a217be8c714a" providerId="LiveId" clId="{745B7E24-5365-4587-8D3A-A90B788E4913}" dt="2025-04-12T03:57:26.651" v="6043" actId="22"/>
+          <ac:spMkLst>
+            <pc:docMk/>
+            <pc:sldMk cId="3610940009" sldId="275"/>
+            <ac:spMk id="7" creationId="{902F5CF5-295C-EC69-4E69-27F1EF5D3E1C}"/>
+          </ac:spMkLst>
+        </pc:spChg>
+        <pc:picChg chg="add mod">
+          <ac:chgData name="Tristin Schlauch" userId="a338a217be8c714a" providerId="LiveId" clId="{745B7E24-5365-4587-8D3A-A90B788E4913}" dt="2025-04-12T03:56:48.495" v="6040" actId="14100"/>
+          <ac:picMkLst>
+            <pc:docMk/>
+            <pc:sldMk cId="3610940009" sldId="275"/>
+            <ac:picMk id="5" creationId="{AA5A447C-1BB4-1349-A8AD-9B1EBE14EB77}"/>
+          </ac:picMkLst>
+        </pc:picChg>
+        <pc:picChg chg="del">
+          <ac:chgData name="Tristin Schlauch" userId="a338a217be8c714a" providerId="LiveId" clId="{745B7E24-5365-4587-8D3A-A90B788E4913}" dt="2025-04-12T03:56:55.721" v="6041" actId="478"/>
+          <ac:picMkLst>
+            <pc:docMk/>
+            <pc:sldMk cId="3610940009" sldId="275"/>
+            <ac:picMk id="8" creationId="{17A81380-B2A5-E7B7-4B1F-9F0CF79110EA}"/>
+          </ac:picMkLst>
+        </pc:picChg>
+        <pc:picChg chg="del">
+          <ac:chgData name="Tristin Schlauch" userId="a338a217be8c714a" providerId="LiveId" clId="{745B7E24-5365-4587-8D3A-A90B788E4913}" dt="2025-04-12T03:57:01.612" v="6042" actId="478"/>
+          <ac:picMkLst>
+            <pc:docMk/>
+            <pc:sldMk cId="3610940009" sldId="275"/>
+            <ac:picMk id="10" creationId="{90C131BA-770D-53FA-9852-375717336F9B}"/>
+          </ac:picMkLst>
+        </pc:picChg>
+        <pc:picChg chg="add mod ord">
+          <ac:chgData name="Tristin Schlauch" userId="a338a217be8c714a" providerId="LiveId" clId="{745B7E24-5365-4587-8D3A-A90B788E4913}" dt="2025-04-12T03:57:33.724" v="6044" actId="1076"/>
+          <ac:picMkLst>
+            <pc:docMk/>
+            <pc:sldMk cId="3610940009" sldId="275"/>
+            <ac:picMk id="11" creationId="{9B56725C-4362-AC64-359D-D31783547BAC}"/>
+          </ac:picMkLst>
+        </pc:picChg>
+      </pc:sldChg>
+      <pc:sldChg chg="addSp delSp modSp add mod">
+        <pc:chgData name="Tristin Schlauch" userId="a338a217be8c714a" providerId="LiveId" clId="{745B7E24-5365-4587-8D3A-A90B788E4913}" dt="2025-04-12T04:14:25.089" v="6377" actId="478"/>
+        <pc:sldMkLst>
+          <pc:docMk/>
+          <pc:sldMk cId="2527031289" sldId="276"/>
+        </pc:sldMkLst>
+        <pc:spChg chg="mod">
+          <ac:chgData name="Tristin Schlauch" userId="a338a217be8c714a" providerId="LiveId" clId="{745B7E24-5365-4587-8D3A-A90B788E4913}" dt="2025-04-12T03:59:14.409" v="6077" actId="20577"/>
+          <ac:spMkLst>
+            <pc:docMk/>
+            <pc:sldMk cId="2527031289" sldId="276"/>
+            <ac:spMk id="2" creationId="{446627F0-C61D-FBC3-1E60-8100A216837A}"/>
+          </ac:spMkLst>
+        </pc:spChg>
+        <pc:spChg chg="mod">
+          <ac:chgData name="Tristin Schlauch" userId="a338a217be8c714a" providerId="LiveId" clId="{745B7E24-5365-4587-8D3A-A90B788E4913}" dt="2025-04-12T04:07:34.199" v="6374" actId="20577"/>
+          <ac:spMkLst>
+            <pc:docMk/>
+            <pc:sldMk cId="2527031289" sldId="276"/>
+            <ac:spMk id="4" creationId="{60C6A015-3E37-A1B3-BF69-9E3B1D714098}"/>
+          </ac:spMkLst>
+        </pc:spChg>
+        <pc:spChg chg="add del mod">
+          <ac:chgData name="Tristin Schlauch" userId="a338a217be8c714a" providerId="LiveId" clId="{745B7E24-5365-4587-8D3A-A90B788E4913}" dt="2025-04-12T04:14:23.163" v="6376" actId="22"/>
+          <ac:spMkLst>
+            <pc:docMk/>
+            <pc:sldMk cId="2527031289" sldId="276"/>
+            <ac:spMk id="6" creationId="{C152D853-D517-EEAB-5D21-49319436141B}"/>
+          </ac:spMkLst>
+        </pc:spChg>
+        <pc:picChg chg="del">
+          <ac:chgData name="Tristin Schlauch" userId="a338a217be8c714a" providerId="LiveId" clId="{745B7E24-5365-4587-8D3A-A90B788E4913}" dt="2025-04-12T04:14:25.089" v="6377" actId="478"/>
+          <ac:picMkLst>
+            <pc:docMk/>
+            <pc:sldMk cId="2527031289" sldId="276"/>
+            <ac:picMk id="5" creationId="{EE725A2E-DD7F-7E9F-B925-7476D592219D}"/>
+          </ac:picMkLst>
+        </pc:picChg>
+        <pc:picChg chg="add mod ord">
+          <ac:chgData name="Tristin Schlauch" userId="a338a217be8c714a" providerId="LiveId" clId="{745B7E24-5365-4587-8D3A-A90B788E4913}" dt="2025-04-12T04:14:23.163" v="6376" actId="22"/>
+          <ac:picMkLst>
+            <pc:docMk/>
+            <pc:sldMk cId="2527031289" sldId="276"/>
+            <ac:picMk id="8" creationId="{0E36455B-D11C-5731-E76C-2405B1404CA8}"/>
+          </ac:picMkLst>
+        </pc:picChg>
+        <pc:picChg chg="del">
+          <ac:chgData name="Tristin Schlauch" userId="a338a217be8c714a" providerId="LiveId" clId="{745B7E24-5365-4587-8D3A-A90B788E4913}" dt="2025-04-12T04:14:15.011" v="6375" actId="478"/>
+          <ac:picMkLst>
+            <pc:docMk/>
+            <pc:sldMk cId="2527031289" sldId="276"/>
+            <ac:picMk id="11" creationId="{2F31E022-07A1-0184-2494-EBA43BFD1316}"/>
+          </ac:picMkLst>
+        </pc:picChg>
+      </pc:sldChg>
+      <pc:sldChg chg="modSp add mod ord">
+        <pc:chgData name="Tristin Schlauch" userId="a338a217be8c714a" providerId="LiveId" clId="{745B7E24-5365-4587-8D3A-A90B788E4913}" dt="2025-04-12T04:21:15.845" v="6735" actId="20577"/>
+        <pc:sldMkLst>
+          <pc:docMk/>
+          <pc:sldMk cId="1768162994" sldId="277"/>
+        </pc:sldMkLst>
+        <pc:spChg chg="mod">
+          <ac:chgData name="Tristin Schlauch" userId="a338a217be8c714a" providerId="LiveId" clId="{745B7E24-5365-4587-8D3A-A90B788E4913}" dt="2025-04-12T04:18:15.285" v="6386" actId="20577"/>
+          <ac:spMkLst>
+            <pc:docMk/>
+            <pc:sldMk cId="1768162994" sldId="277"/>
+            <ac:spMk id="2" creationId="{F7C201CA-3D83-3A4B-2E58-A4D6E84EBA2E}"/>
+          </ac:spMkLst>
+        </pc:spChg>
+        <pc:spChg chg="mod">
+          <ac:chgData name="Tristin Schlauch" userId="a338a217be8c714a" providerId="LiveId" clId="{745B7E24-5365-4587-8D3A-A90B788E4913}" dt="2025-04-12T04:21:15.845" v="6735" actId="20577"/>
+          <ac:spMkLst>
+            <pc:docMk/>
+            <pc:sldMk cId="1768162994" sldId="277"/>
+            <ac:spMk id="3" creationId="{44BEB54D-F878-20E7-46FB-43CF582C4164}"/>
+          </ac:spMkLst>
+        </pc:spChg>
+      </pc:sldChg>
+      <pc:sldChg chg="modSp new mod">
+        <pc:chgData name="Tristin Schlauch" userId="a338a217be8c714a" providerId="LiveId" clId="{745B7E24-5365-4587-8D3A-A90B788E4913}" dt="2025-04-12T04:21:42.001" v="6758" actId="20577"/>
+        <pc:sldMkLst>
+          <pc:docMk/>
+          <pc:sldMk cId="3727397199" sldId="278"/>
+        </pc:sldMkLst>
+        <pc:spChg chg="mod">
+          <ac:chgData name="Tristin Schlauch" userId="a338a217be8c714a" providerId="LiveId" clId="{745B7E24-5365-4587-8D3A-A90B788E4913}" dt="2025-04-12T04:21:34.053" v="6749" actId="20577"/>
+          <ac:spMkLst>
+            <pc:docMk/>
+            <pc:sldMk cId="3727397199" sldId="278"/>
+            <ac:spMk id="2" creationId="{BC594031-05C0-F774-5565-70E86424CBAA}"/>
+          </ac:spMkLst>
+        </pc:spChg>
+        <pc:spChg chg="mod">
+          <ac:chgData name="Tristin Schlauch" userId="a338a217be8c714a" providerId="LiveId" clId="{745B7E24-5365-4587-8D3A-A90B788E4913}" dt="2025-04-12T04:21:42.001" v="6758" actId="20577"/>
+          <ac:spMkLst>
+            <pc:docMk/>
+            <pc:sldMk cId="3727397199" sldId="278"/>
+            <ac:spMk id="3" creationId="{AE75AB3B-5876-932A-0763-B4A4FCE47C51}"/>
+          </ac:spMkLst>
+        </pc:spChg>
+      </pc:sldChg>
+    </pc:docChg>
+  </pc:docChgLst>
+</pc:chgInfo>
 </file>
 
 <file path=ppt/notesMasters/notesMaster1.xml><?xml version="1.0" encoding="utf-8"?>
@@ -4056,6 +5041,1656 @@
 </p:sld>
 </file>
 
+<file path=ppt/slides/slide10.xml><?xml version="1.0" encoding="utf-8"?>
+<p:sld xmlns:a="http://schemas.openxmlformats.org/drawingml/2006/main" xmlns:r="http://schemas.openxmlformats.org/officeDocument/2006/relationships" xmlns:p="http://schemas.openxmlformats.org/presentationml/2006/main">
+  <p:cSld>
+    <p:spTree>
+      <p:nvGrpSpPr>
+        <p:cNvPr id="1" name="">
+          <a:extLst>
+            <a:ext uri="{FF2B5EF4-FFF2-40B4-BE49-F238E27FC236}">
+              <a16:creationId xmlns:a16="http://schemas.microsoft.com/office/drawing/2014/main" id="{320F65D3-E973-8BF3-38B4-6501156C8F20}"/>
+            </a:ext>
+          </a:extLst>
+        </p:cNvPr>
+        <p:cNvGrpSpPr/>
+        <p:nvPr/>
+      </p:nvGrpSpPr>
+      <p:grpSpPr>
+        <a:xfrm>
+          <a:off x="0" y="0"/>
+          <a:ext cx="0" cy="0"/>
+          <a:chOff x="0" y="0"/>
+          <a:chExt cx="0" cy="0"/>
+        </a:xfrm>
+      </p:grpSpPr>
+      <p:sp>
+        <p:nvSpPr>
+          <p:cNvPr id="2" name="Title 1">
+            <a:extLst>
+              <a:ext uri="{FF2B5EF4-FFF2-40B4-BE49-F238E27FC236}">
+                <a16:creationId xmlns:a16="http://schemas.microsoft.com/office/drawing/2014/main" id="{4BA2A229-2C1A-94AA-DA0E-D500825FC29F}"/>
+              </a:ext>
+            </a:extLst>
+          </p:cNvPr>
+          <p:cNvSpPr>
+            <a:spLocks noGrp="1"/>
+          </p:cNvSpPr>
+          <p:nvPr>
+            <p:ph type="title"/>
+          </p:nvPr>
+        </p:nvSpPr>
+        <p:spPr>
+          <a:xfrm>
+            <a:off x="1143000" y="1097280"/>
+            <a:ext cx="3931920" cy="851263"/>
+          </a:xfrm>
+        </p:spPr>
+        <p:txBody>
+          <a:bodyPr/>
+          <a:lstStyle/>
+          <a:p>
+            <a:r>
+              <a:rPr lang="en-CA" dirty="0"/>
+              <a:t>Integers</a:t>
+            </a:r>
+          </a:p>
+        </p:txBody>
+      </p:sp>
+      <p:sp>
+        <p:nvSpPr>
+          <p:cNvPr id="4" name="Text Placeholder 3">
+            <a:extLst>
+              <a:ext uri="{FF2B5EF4-FFF2-40B4-BE49-F238E27FC236}">
+                <a16:creationId xmlns:a16="http://schemas.microsoft.com/office/drawing/2014/main" id="{9DD9F5B0-9C00-F356-961F-F123AB2B2607}"/>
+              </a:ext>
+            </a:extLst>
+          </p:cNvPr>
+          <p:cNvSpPr>
+            <a:spLocks noGrp="1"/>
+          </p:cNvSpPr>
+          <p:nvPr>
+            <p:ph type="body" sz="half" idx="2"/>
+          </p:nvPr>
+        </p:nvSpPr>
+        <p:spPr>
+          <a:xfrm>
+            <a:off x="1143000" y="2090057"/>
+            <a:ext cx="3931920" cy="3762103"/>
+          </a:xfrm>
+        </p:spPr>
+        <p:txBody>
+          <a:bodyPr/>
+          <a:lstStyle/>
+          <a:p>
+            <a:pPr marL="285750" indent="-285750">
+              <a:buFont typeface="Arial" panose="020B0604020202020204" pitchFamily="34" charset="0"/>
+              <a:buChar char="•"/>
+            </a:pPr>
+            <a:r>
+              <a:rPr lang="en-CA" dirty="0"/>
+              <a:t>We can also use </a:t>
+            </a:r>
+            <a:r>
+              <a:rPr lang="en-CA" b="1" dirty="0"/>
+              <a:t>integers</a:t>
+            </a:r>
+            <a:r>
+              <a:rPr lang="en-CA" dirty="0"/>
+              <a:t> in Python!</a:t>
+            </a:r>
+          </a:p>
+          <a:p>
+            <a:pPr marL="285750" indent="-285750">
+              <a:buFont typeface="Arial" panose="020B0604020202020204" pitchFamily="34" charset="0"/>
+              <a:buChar char="•"/>
+            </a:pPr>
+            <a:endParaRPr lang="en-CA" dirty="0"/>
+          </a:p>
+          <a:p>
+            <a:pPr marL="285750" indent="-285750">
+              <a:buFont typeface="Arial" panose="020B0604020202020204" pitchFamily="34" charset="0"/>
+              <a:buChar char="•"/>
+            </a:pPr>
+            <a:r>
+              <a:rPr lang="en-CA" b="1" dirty="0"/>
+              <a:t>Integer</a:t>
+            </a:r>
+            <a:r>
+              <a:rPr lang="en-CA" dirty="0"/>
+              <a:t> is just a fancy word for a whole number like 1, 15032, or -10.</a:t>
+            </a:r>
+          </a:p>
+          <a:p>
+            <a:pPr marL="285750" indent="-285750">
+              <a:buFont typeface="Arial" panose="020B0604020202020204" pitchFamily="34" charset="0"/>
+              <a:buChar char="•"/>
+            </a:pPr>
+            <a:endParaRPr lang="en-CA" dirty="0"/>
+          </a:p>
+          <a:p>
+            <a:pPr marL="285750" indent="-285750">
+              <a:buFont typeface="Arial" panose="020B0604020202020204" pitchFamily="34" charset="0"/>
+              <a:buChar char="•"/>
+            </a:pPr>
+            <a:r>
+              <a:rPr lang="en-CA" dirty="0"/>
+              <a:t>With integers, we can do mathematical calculations like addition (+), subtraction (-), multiplication (*), and division (/).</a:t>
+            </a:r>
+          </a:p>
+        </p:txBody>
+      </p:sp>
+      <p:pic>
+        <p:nvPicPr>
+          <p:cNvPr id="8" name="Content Placeholder 7">
+            <a:extLst>
+              <a:ext uri="{FF2B5EF4-FFF2-40B4-BE49-F238E27FC236}">
+                <a16:creationId xmlns:a16="http://schemas.microsoft.com/office/drawing/2014/main" id="{31ABB23C-C8CD-CD14-9407-6513328013F7}"/>
+              </a:ext>
+            </a:extLst>
+          </p:cNvPr>
+          <p:cNvPicPr>
+            <a:picLocks noGrp="1" noChangeAspect="1"/>
+          </p:cNvPicPr>
+          <p:nvPr>
+            <p:ph idx="1"/>
+          </p:nvPr>
+        </p:nvPicPr>
+        <p:blipFill>
+          <a:blip r:embed="rId2"/>
+          <a:stretch>
+            <a:fillRect/>
+          </a:stretch>
+        </p:blipFill>
+        <p:spPr>
+          <a:xfrm>
+            <a:off x="5851525" y="1717748"/>
+            <a:ext cx="5213350" cy="3422504"/>
+          </a:xfrm>
+        </p:spPr>
+      </p:pic>
+    </p:spTree>
+    <p:extLst>
+      <p:ext uri="{BB962C8B-B14F-4D97-AF65-F5344CB8AC3E}">
+        <p14:creationId xmlns:p14="http://schemas.microsoft.com/office/powerpoint/2010/main" val="2295966033"/>
+      </p:ext>
+    </p:extLst>
+  </p:cSld>
+  <p:clrMapOvr>
+    <a:masterClrMapping/>
+  </p:clrMapOvr>
+</p:sld>
+</file>
+
+<file path=ppt/slides/slide11.xml><?xml version="1.0" encoding="utf-8"?>
+<p:sld xmlns:a="http://schemas.openxmlformats.org/drawingml/2006/main" xmlns:r="http://schemas.openxmlformats.org/officeDocument/2006/relationships" xmlns:p="http://schemas.openxmlformats.org/presentationml/2006/main">
+  <p:cSld>
+    <p:spTree>
+      <p:nvGrpSpPr>
+        <p:cNvPr id="1" name="">
+          <a:extLst>
+            <a:ext uri="{FF2B5EF4-FFF2-40B4-BE49-F238E27FC236}">
+              <a16:creationId xmlns:a16="http://schemas.microsoft.com/office/drawing/2014/main" id="{514385F6-A55F-A37F-87E4-86E67E5AF52A}"/>
+            </a:ext>
+          </a:extLst>
+        </p:cNvPr>
+        <p:cNvGrpSpPr/>
+        <p:nvPr/>
+      </p:nvGrpSpPr>
+      <p:grpSpPr>
+        <a:xfrm>
+          <a:off x="0" y="0"/>
+          <a:ext cx="0" cy="0"/>
+          <a:chOff x="0" y="0"/>
+          <a:chExt cx="0" cy="0"/>
+        </a:xfrm>
+      </p:grpSpPr>
+      <p:sp>
+        <p:nvSpPr>
+          <p:cNvPr id="2" name="Title 1">
+            <a:extLst>
+              <a:ext uri="{FF2B5EF4-FFF2-40B4-BE49-F238E27FC236}">
+                <a16:creationId xmlns:a16="http://schemas.microsoft.com/office/drawing/2014/main" id="{A72BB625-0CA8-ACB9-F253-1DE85F2AEE80}"/>
+              </a:ext>
+            </a:extLst>
+          </p:cNvPr>
+          <p:cNvSpPr>
+            <a:spLocks noGrp="1"/>
+          </p:cNvSpPr>
+          <p:nvPr>
+            <p:ph type="title"/>
+          </p:nvPr>
+        </p:nvSpPr>
+        <p:spPr>
+          <a:xfrm>
+            <a:off x="1143000" y="1097280"/>
+            <a:ext cx="3931920" cy="851263"/>
+          </a:xfrm>
+        </p:spPr>
+        <p:txBody>
+          <a:bodyPr/>
+          <a:lstStyle/>
+          <a:p>
+            <a:r>
+              <a:rPr lang="en-CA" dirty="0"/>
+              <a:t>More About Integers</a:t>
+            </a:r>
+          </a:p>
+        </p:txBody>
+      </p:sp>
+      <p:sp>
+        <p:nvSpPr>
+          <p:cNvPr id="4" name="Text Placeholder 3">
+            <a:extLst>
+              <a:ext uri="{FF2B5EF4-FFF2-40B4-BE49-F238E27FC236}">
+                <a16:creationId xmlns:a16="http://schemas.microsoft.com/office/drawing/2014/main" id="{992E0DA1-CCA6-656C-6C3B-86B0331C5728}"/>
+              </a:ext>
+            </a:extLst>
+          </p:cNvPr>
+          <p:cNvSpPr>
+            <a:spLocks noGrp="1"/>
+          </p:cNvSpPr>
+          <p:nvPr>
+            <p:ph type="body" sz="half" idx="2"/>
+          </p:nvPr>
+        </p:nvSpPr>
+        <p:spPr>
+          <a:xfrm>
+            <a:off x="1143000" y="2090057"/>
+            <a:ext cx="3931920" cy="3762103"/>
+          </a:xfrm>
+        </p:spPr>
+        <p:txBody>
+          <a:bodyPr>
+            <a:normAutofit/>
+          </a:bodyPr>
+          <a:lstStyle/>
+          <a:p>
+            <a:pPr marL="285750" indent="-285750">
+              <a:buFont typeface="Arial" panose="020B0604020202020204" pitchFamily="34" charset="0"/>
+              <a:buChar char="•"/>
+            </a:pPr>
+            <a:r>
+              <a:rPr lang="en-CA" dirty="0"/>
+              <a:t>We can also print integers and entire mathematical operations with the </a:t>
+            </a:r>
+            <a:r>
+              <a:rPr lang="en-CA" dirty="0">
+                <a:latin typeface="Consolas" panose="020B0609020204030204" pitchFamily="49" charset="0"/>
+              </a:rPr>
+              <a:t>print</a:t>
+            </a:r>
+            <a:r>
+              <a:rPr lang="en-CA" dirty="0"/>
+              <a:t> function.</a:t>
+            </a:r>
+          </a:p>
+          <a:p>
+            <a:pPr marL="285750" indent="-285750">
+              <a:buFont typeface="Arial" panose="020B0604020202020204" pitchFamily="34" charset="0"/>
+              <a:buChar char="•"/>
+            </a:pPr>
+            <a:endParaRPr lang="en-CA" dirty="0"/>
+          </a:p>
+          <a:p>
+            <a:pPr marL="285750" indent="-285750">
+              <a:buFont typeface="Arial" panose="020B0604020202020204" pitchFamily="34" charset="0"/>
+              <a:buChar char="•"/>
+            </a:pPr>
+            <a:r>
+              <a:rPr lang="en-CA" dirty="0"/>
+              <a:t>We can find the maximum of a bunch of numbers by using the </a:t>
+            </a:r>
+            <a:r>
+              <a:rPr lang="en-CA" dirty="0">
+                <a:latin typeface="Consolas" panose="020B0609020204030204" pitchFamily="49" charset="0"/>
+              </a:rPr>
+              <a:t>max</a:t>
+            </a:r>
+            <a:r>
+              <a:rPr lang="en-CA" dirty="0"/>
+              <a:t> function.</a:t>
+            </a:r>
+          </a:p>
+          <a:p>
+            <a:pPr marL="285750" indent="-285750">
+              <a:buFont typeface="Arial" panose="020B0604020202020204" pitchFamily="34" charset="0"/>
+              <a:buChar char="•"/>
+            </a:pPr>
+            <a:endParaRPr lang="en-CA" dirty="0"/>
+          </a:p>
+          <a:p>
+            <a:pPr marL="285750" indent="-285750">
+              <a:buFont typeface="Arial" panose="020B0604020202020204" pitchFamily="34" charset="0"/>
+              <a:buChar char="•"/>
+            </a:pPr>
+            <a:r>
+              <a:rPr lang="en-CA" dirty="0"/>
+              <a:t>We can also find the minimum of a bunch of numbers by using the </a:t>
+            </a:r>
+            <a:r>
+              <a:rPr lang="en-CA" dirty="0">
+                <a:latin typeface="Consolas" panose="020B0609020204030204" pitchFamily="49" charset="0"/>
+              </a:rPr>
+              <a:t>min</a:t>
+            </a:r>
+            <a:r>
+              <a:rPr lang="en-CA" dirty="0"/>
+              <a:t> function.</a:t>
+            </a:r>
+          </a:p>
+        </p:txBody>
+      </p:sp>
+      <p:pic>
+        <p:nvPicPr>
+          <p:cNvPr id="7" name="Content Placeholder 6">
+            <a:extLst>
+              <a:ext uri="{FF2B5EF4-FFF2-40B4-BE49-F238E27FC236}">
+                <a16:creationId xmlns:a16="http://schemas.microsoft.com/office/drawing/2014/main" id="{3EAEA0B7-FB3D-236F-9839-8F2E1CB85A85}"/>
+              </a:ext>
+            </a:extLst>
+          </p:cNvPr>
+          <p:cNvPicPr>
+            <a:picLocks noGrp="1" noChangeAspect="1"/>
+          </p:cNvPicPr>
+          <p:nvPr>
+            <p:ph idx="1"/>
+          </p:nvPr>
+        </p:nvPicPr>
+        <p:blipFill>
+          <a:blip r:embed="rId2"/>
+          <a:stretch>
+            <a:fillRect/>
+          </a:stretch>
+        </p:blipFill>
+        <p:spPr>
+          <a:xfrm>
+            <a:off x="5851525" y="1682496"/>
+            <a:ext cx="5213350" cy="3493009"/>
+          </a:xfrm>
+        </p:spPr>
+      </p:pic>
+    </p:spTree>
+    <p:extLst>
+      <p:ext uri="{BB962C8B-B14F-4D97-AF65-F5344CB8AC3E}">
+        <p14:creationId xmlns:p14="http://schemas.microsoft.com/office/powerpoint/2010/main" val="846000198"/>
+      </p:ext>
+    </p:extLst>
+  </p:cSld>
+  <p:clrMapOvr>
+    <a:masterClrMapping/>
+  </p:clrMapOvr>
+</p:sld>
+</file>
+
+<file path=ppt/slides/slide12.xml><?xml version="1.0" encoding="utf-8"?>
+<p:sld xmlns:a="http://schemas.openxmlformats.org/drawingml/2006/main" xmlns:r="http://schemas.openxmlformats.org/officeDocument/2006/relationships" xmlns:p="http://schemas.openxmlformats.org/presentationml/2006/main">
+  <p:cSld>
+    <p:spTree>
+      <p:nvGrpSpPr>
+        <p:cNvPr id="1" name="">
+          <a:extLst>
+            <a:ext uri="{FF2B5EF4-FFF2-40B4-BE49-F238E27FC236}">
+              <a16:creationId xmlns:a16="http://schemas.microsoft.com/office/drawing/2014/main" id="{F3C740A7-81E8-5A83-2954-81D863E78A11}"/>
+            </a:ext>
+          </a:extLst>
+        </p:cNvPr>
+        <p:cNvGrpSpPr/>
+        <p:nvPr/>
+      </p:nvGrpSpPr>
+      <p:grpSpPr>
+        <a:xfrm>
+          <a:off x="0" y="0"/>
+          <a:ext cx="0" cy="0"/>
+          <a:chOff x="0" y="0"/>
+          <a:chExt cx="0" cy="0"/>
+        </a:xfrm>
+      </p:grpSpPr>
+      <p:sp>
+        <p:nvSpPr>
+          <p:cNvPr id="2" name="Title 1">
+            <a:extLst>
+              <a:ext uri="{FF2B5EF4-FFF2-40B4-BE49-F238E27FC236}">
+                <a16:creationId xmlns:a16="http://schemas.microsoft.com/office/drawing/2014/main" id="{AE2EF6B0-FA34-AD22-ECB5-FB871F799452}"/>
+              </a:ext>
+            </a:extLst>
+          </p:cNvPr>
+          <p:cNvSpPr>
+            <a:spLocks noGrp="1"/>
+          </p:cNvSpPr>
+          <p:nvPr>
+            <p:ph type="title"/>
+          </p:nvPr>
+        </p:nvSpPr>
+        <p:spPr>
+          <a:xfrm>
+            <a:off x="968829" y="1097280"/>
+            <a:ext cx="4106091" cy="851263"/>
+          </a:xfrm>
+        </p:spPr>
+        <p:txBody>
+          <a:bodyPr/>
+          <a:lstStyle/>
+          <a:p>
+            <a:r>
+              <a:rPr lang="en-CA" dirty="0"/>
+              <a:t>Combining Strings and Integers</a:t>
+            </a:r>
+          </a:p>
+        </p:txBody>
+      </p:sp>
+      <p:sp>
+        <p:nvSpPr>
+          <p:cNvPr id="4" name="Text Placeholder 3">
+            <a:extLst>
+              <a:ext uri="{FF2B5EF4-FFF2-40B4-BE49-F238E27FC236}">
+                <a16:creationId xmlns:a16="http://schemas.microsoft.com/office/drawing/2014/main" id="{E68EF9E0-51EC-9623-B5C7-8CA25C616083}"/>
+              </a:ext>
+            </a:extLst>
+          </p:cNvPr>
+          <p:cNvSpPr>
+            <a:spLocks noGrp="1"/>
+          </p:cNvSpPr>
+          <p:nvPr>
+            <p:ph type="body" sz="half" idx="2"/>
+          </p:nvPr>
+        </p:nvSpPr>
+        <p:spPr>
+          <a:xfrm>
+            <a:off x="1143000" y="2090057"/>
+            <a:ext cx="3931920" cy="3762103"/>
+          </a:xfrm>
+        </p:spPr>
+        <p:txBody>
+          <a:bodyPr>
+            <a:normAutofit/>
+          </a:bodyPr>
+          <a:lstStyle/>
+          <a:p>
+            <a:pPr marL="285750" indent="-285750">
+              <a:buFont typeface="Arial" panose="020B0604020202020204" pitchFamily="34" charset="0"/>
+              <a:buChar char="•"/>
+            </a:pPr>
+            <a:r>
+              <a:rPr lang="en-CA" dirty="0"/>
+              <a:t>If we try to combine a string and an integer by just putting a plus sign (+) between them, we get an </a:t>
+            </a:r>
+            <a:r>
+              <a:rPr lang="en-CA" dirty="0">
+                <a:solidFill>
+                  <a:srgbClr val="FF0000"/>
+                </a:solidFill>
+              </a:rPr>
+              <a:t>error</a:t>
+            </a:r>
+          </a:p>
+          <a:p>
+            <a:pPr marL="285750" indent="-285750">
+              <a:buFont typeface="Arial" panose="020B0604020202020204" pitchFamily="34" charset="0"/>
+              <a:buChar char="•"/>
+            </a:pPr>
+            <a:endParaRPr lang="en-CA" dirty="0">
+              <a:solidFill>
+                <a:srgbClr val="FF0000"/>
+              </a:solidFill>
+            </a:endParaRPr>
+          </a:p>
+          <a:p>
+            <a:pPr marL="285750" indent="-285750">
+              <a:buFont typeface="Arial" panose="020B0604020202020204" pitchFamily="34" charset="0"/>
+              <a:buChar char="•"/>
+            </a:pPr>
+            <a:r>
+              <a:rPr lang="en-CA" dirty="0"/>
+              <a:t>To avoid this, we need to </a:t>
+            </a:r>
+            <a:r>
+              <a:rPr lang="en-CA" b="1" dirty="0"/>
+              <a:t>convert</a:t>
+            </a:r>
+            <a:r>
+              <a:rPr lang="en-CA" dirty="0"/>
+              <a:t> the integer to a string by using the </a:t>
+            </a:r>
+            <a:r>
+              <a:rPr lang="en-CA" dirty="0">
+                <a:latin typeface="Consolas" panose="020B0609020204030204" pitchFamily="49" charset="0"/>
+              </a:rPr>
+              <a:t>str</a:t>
+            </a:r>
+            <a:r>
+              <a:rPr lang="en-CA" dirty="0"/>
+              <a:t> function on the integer</a:t>
+            </a:r>
+          </a:p>
+          <a:p>
+            <a:pPr marL="285750" indent="-285750">
+              <a:buFont typeface="Arial" panose="020B0604020202020204" pitchFamily="34" charset="0"/>
+              <a:buChar char="•"/>
+            </a:pPr>
+            <a:endParaRPr lang="en-CA" dirty="0"/>
+          </a:p>
+          <a:p>
+            <a:pPr marL="285750" indent="-285750">
+              <a:buFont typeface="Arial" panose="020B0604020202020204" pitchFamily="34" charset="0"/>
+              <a:buChar char="•"/>
+            </a:pPr>
+            <a:r>
+              <a:rPr lang="en-CA" dirty="0"/>
+              <a:t>Now, we can put a plus sign between them and combine the string and integer!</a:t>
+            </a:r>
+          </a:p>
+        </p:txBody>
+      </p:sp>
+      <p:pic>
+        <p:nvPicPr>
+          <p:cNvPr id="8" name="Content Placeholder 7">
+            <a:extLst>
+              <a:ext uri="{FF2B5EF4-FFF2-40B4-BE49-F238E27FC236}">
+                <a16:creationId xmlns:a16="http://schemas.microsoft.com/office/drawing/2014/main" id="{3C3BAE52-6DDE-AD48-B540-E37F0CAA0F76}"/>
+              </a:ext>
+            </a:extLst>
+          </p:cNvPr>
+          <p:cNvPicPr>
+            <a:picLocks noGrp="1" noChangeAspect="1"/>
+          </p:cNvPicPr>
+          <p:nvPr>
+            <p:ph idx="1"/>
+          </p:nvPr>
+        </p:nvPicPr>
+        <p:blipFill>
+          <a:blip r:embed="rId2"/>
+          <a:stretch>
+            <a:fillRect/>
+          </a:stretch>
+        </p:blipFill>
+        <p:spPr>
+          <a:xfrm>
+            <a:off x="5851525" y="1696716"/>
+            <a:ext cx="5213350" cy="3464568"/>
+          </a:xfrm>
+        </p:spPr>
+      </p:pic>
+    </p:spTree>
+    <p:extLst>
+      <p:ext uri="{BB962C8B-B14F-4D97-AF65-F5344CB8AC3E}">
+        <p14:creationId xmlns:p14="http://schemas.microsoft.com/office/powerpoint/2010/main" val="3600372758"/>
+      </p:ext>
+    </p:extLst>
+  </p:cSld>
+  <p:clrMapOvr>
+    <a:masterClrMapping/>
+  </p:clrMapOvr>
+</p:sld>
+</file>
+
+<file path=ppt/slides/slide13.xml><?xml version="1.0" encoding="utf-8"?>
+<p:sld xmlns:a="http://schemas.openxmlformats.org/drawingml/2006/main" xmlns:r="http://schemas.openxmlformats.org/officeDocument/2006/relationships" xmlns:p="http://schemas.openxmlformats.org/presentationml/2006/main">
+  <p:cSld>
+    <p:spTree>
+      <p:nvGrpSpPr>
+        <p:cNvPr id="1" name=""/>
+        <p:cNvGrpSpPr/>
+        <p:nvPr/>
+      </p:nvGrpSpPr>
+      <p:grpSpPr>
+        <a:xfrm>
+          <a:off x="0" y="0"/>
+          <a:ext cx="0" cy="0"/>
+          <a:chOff x="0" y="0"/>
+          <a:chExt cx="0" cy="0"/>
+        </a:xfrm>
+      </p:grpSpPr>
+      <p:sp>
+        <p:nvSpPr>
+          <p:cNvPr id="2" name="Title 1">
+            <a:extLst>
+              <a:ext uri="{FF2B5EF4-FFF2-40B4-BE49-F238E27FC236}">
+                <a16:creationId xmlns:a16="http://schemas.microsoft.com/office/drawing/2014/main" id="{85C0CF99-D5BF-0D5F-778A-DC0C75D29491}"/>
+              </a:ext>
+            </a:extLst>
+          </p:cNvPr>
+          <p:cNvSpPr>
+            <a:spLocks noGrp="1"/>
+          </p:cNvSpPr>
+          <p:nvPr>
+            <p:ph type="title"/>
+          </p:nvPr>
+        </p:nvSpPr>
+        <p:spPr/>
+        <p:txBody>
+          <a:bodyPr/>
+          <a:lstStyle/>
+          <a:p>
+            <a:r>
+              <a:rPr lang="en-CA" dirty="0"/>
+              <a:t>Summary: Python Basics</a:t>
+            </a:r>
+          </a:p>
+        </p:txBody>
+      </p:sp>
+      <p:sp>
+        <p:nvSpPr>
+          <p:cNvPr id="3" name="Content Placeholder 2">
+            <a:extLst>
+              <a:ext uri="{FF2B5EF4-FFF2-40B4-BE49-F238E27FC236}">
+                <a16:creationId xmlns:a16="http://schemas.microsoft.com/office/drawing/2014/main" id="{9C7D56BE-5D10-F538-0C1F-F17117EF8666}"/>
+              </a:ext>
+            </a:extLst>
+          </p:cNvPr>
+          <p:cNvSpPr>
+            <a:spLocks noGrp="1"/>
+          </p:cNvSpPr>
+          <p:nvPr>
+            <p:ph idx="1"/>
+          </p:nvPr>
+        </p:nvSpPr>
+        <p:spPr/>
+        <p:txBody>
+          <a:bodyPr/>
+          <a:lstStyle/>
+          <a:p>
+            <a:r>
+              <a:rPr lang="en-CA" dirty="0"/>
+              <a:t>Python has </a:t>
+            </a:r>
+            <a:r>
+              <a:rPr lang="en-CA" b="1" dirty="0"/>
+              <a:t>strings</a:t>
+            </a:r>
+            <a:r>
+              <a:rPr lang="en-CA" dirty="0"/>
+              <a:t> (“text”) and </a:t>
+            </a:r>
+            <a:r>
+              <a:rPr lang="en-CA" b="1" dirty="0"/>
+              <a:t>integers</a:t>
+            </a:r>
+            <a:r>
+              <a:rPr lang="en-CA" dirty="0"/>
+              <a:t> (whole numbers).</a:t>
+            </a:r>
+          </a:p>
+          <a:p>
+            <a:r>
+              <a:rPr lang="en-CA" dirty="0"/>
+              <a:t>We can print both strings and integers on the screen using the </a:t>
+            </a:r>
+            <a:r>
+              <a:rPr lang="en-CA" b="1" dirty="0">
+                <a:latin typeface="Consolas" panose="020B0609020204030204" pitchFamily="49" charset="0"/>
+              </a:rPr>
+              <a:t>print</a:t>
+            </a:r>
+            <a:r>
+              <a:rPr lang="en-CA" dirty="0"/>
+              <a:t> function.</a:t>
+            </a:r>
+          </a:p>
+          <a:p>
+            <a:r>
+              <a:rPr lang="en-CA" dirty="0"/>
+              <a:t>We can combine strings using the plus sign (+)</a:t>
+            </a:r>
+          </a:p>
+          <a:p>
+            <a:r>
+              <a:rPr lang="en-CA" dirty="0"/>
+              <a:t>We can do math on numbers using +, -, *, and /</a:t>
+            </a:r>
+          </a:p>
+          <a:p>
+            <a:r>
+              <a:rPr lang="en-CA" dirty="0"/>
+              <a:t>We can combine strings and integers by </a:t>
+            </a:r>
+            <a:r>
+              <a:rPr lang="en-CA" b="1" dirty="0"/>
+              <a:t>converting </a:t>
+            </a:r>
+            <a:r>
+              <a:rPr lang="en-CA" dirty="0"/>
+              <a:t>the integer to a string first</a:t>
+            </a:r>
+          </a:p>
+          <a:p>
+            <a:pPr lvl="1"/>
+            <a:r>
+              <a:rPr lang="en-CA" dirty="0">
+                <a:latin typeface="Consolas" panose="020B0609020204030204" pitchFamily="49" charset="0"/>
+              </a:rPr>
+              <a:t>str(50)</a:t>
+            </a:r>
+          </a:p>
+          <a:p>
+            <a:pPr marL="274320" lvl="1" indent="0">
+              <a:buNone/>
+            </a:pPr>
+            <a:endParaRPr lang="en-CA" dirty="0">
+              <a:latin typeface="Consolas" panose="020B0609020204030204" pitchFamily="49" charset="0"/>
+            </a:endParaRPr>
+          </a:p>
+        </p:txBody>
+      </p:sp>
+    </p:spTree>
+    <p:extLst>
+      <p:ext uri="{BB962C8B-B14F-4D97-AF65-F5344CB8AC3E}">
+        <p14:creationId xmlns:p14="http://schemas.microsoft.com/office/powerpoint/2010/main" val="2649422868"/>
+      </p:ext>
+    </p:extLst>
+  </p:cSld>
+  <p:clrMapOvr>
+    <a:masterClrMapping/>
+  </p:clrMapOvr>
+</p:sld>
+</file>
+
+<file path=ppt/slides/slide14.xml><?xml version="1.0" encoding="utf-8"?>
+<p:sld xmlns:a="http://schemas.openxmlformats.org/drawingml/2006/main" xmlns:r="http://schemas.openxmlformats.org/officeDocument/2006/relationships" xmlns:p="http://schemas.openxmlformats.org/presentationml/2006/main">
+  <p:cSld>
+    <p:spTree>
+      <p:nvGrpSpPr>
+        <p:cNvPr id="1" name=""/>
+        <p:cNvGrpSpPr/>
+        <p:nvPr/>
+      </p:nvGrpSpPr>
+      <p:grpSpPr>
+        <a:xfrm>
+          <a:off x="0" y="0"/>
+          <a:ext cx="0" cy="0"/>
+          <a:chOff x="0" y="0"/>
+          <a:chExt cx="0" cy="0"/>
+        </a:xfrm>
+      </p:grpSpPr>
+      <p:sp>
+        <p:nvSpPr>
+          <p:cNvPr id="2" name="Title 1">
+            <a:extLst>
+              <a:ext uri="{FF2B5EF4-FFF2-40B4-BE49-F238E27FC236}">
+                <a16:creationId xmlns:a16="http://schemas.microsoft.com/office/drawing/2014/main" id="{73DB35D7-E2FF-56A9-DA52-69FB5E0EC317}"/>
+              </a:ext>
+            </a:extLst>
+          </p:cNvPr>
+          <p:cNvSpPr>
+            <a:spLocks noGrp="1"/>
+          </p:cNvSpPr>
+          <p:nvPr>
+            <p:ph type="title"/>
+          </p:nvPr>
+        </p:nvSpPr>
+        <p:spPr/>
+        <p:txBody>
+          <a:bodyPr/>
+          <a:lstStyle/>
+          <a:p>
+            <a:r>
+              <a:rPr lang="en-CA" dirty="0"/>
+              <a:t>Variables</a:t>
+            </a:r>
+          </a:p>
+        </p:txBody>
+      </p:sp>
+      <p:sp>
+        <p:nvSpPr>
+          <p:cNvPr id="3" name="Text Placeholder 2">
+            <a:extLst>
+              <a:ext uri="{FF2B5EF4-FFF2-40B4-BE49-F238E27FC236}">
+                <a16:creationId xmlns:a16="http://schemas.microsoft.com/office/drawing/2014/main" id="{6190B831-7B12-E33F-415E-B020A5A4A560}"/>
+              </a:ext>
+            </a:extLst>
+          </p:cNvPr>
+          <p:cNvSpPr>
+            <a:spLocks noGrp="1"/>
+          </p:cNvSpPr>
+          <p:nvPr>
+            <p:ph type="body" idx="1"/>
+          </p:nvPr>
+        </p:nvSpPr>
+        <p:spPr/>
+        <p:txBody>
+          <a:bodyPr/>
+          <a:lstStyle/>
+          <a:p>
+            <a:r>
+              <a:rPr lang="en-CA" dirty="0"/>
+              <a:t>Assigning variables and how to use them</a:t>
+            </a:r>
+          </a:p>
+        </p:txBody>
+      </p:sp>
+    </p:spTree>
+    <p:extLst>
+      <p:ext uri="{BB962C8B-B14F-4D97-AF65-F5344CB8AC3E}">
+        <p14:creationId xmlns:p14="http://schemas.microsoft.com/office/powerpoint/2010/main" val="3682949838"/>
+      </p:ext>
+    </p:extLst>
+  </p:cSld>
+  <p:clrMapOvr>
+    <a:masterClrMapping/>
+  </p:clrMapOvr>
+</p:sld>
+</file>
+
+<file path=ppt/slides/slide15.xml><?xml version="1.0" encoding="utf-8"?>
+<p:sld xmlns:a="http://schemas.openxmlformats.org/drawingml/2006/main" xmlns:r="http://schemas.openxmlformats.org/officeDocument/2006/relationships" xmlns:p="http://schemas.openxmlformats.org/presentationml/2006/main">
+  <p:cSld>
+    <p:spTree>
+      <p:nvGrpSpPr>
+        <p:cNvPr id="1" name=""/>
+        <p:cNvGrpSpPr/>
+        <p:nvPr/>
+      </p:nvGrpSpPr>
+      <p:grpSpPr>
+        <a:xfrm>
+          <a:off x="0" y="0"/>
+          <a:ext cx="0" cy="0"/>
+          <a:chOff x="0" y="0"/>
+          <a:chExt cx="0" cy="0"/>
+        </a:xfrm>
+      </p:grpSpPr>
+      <p:sp>
+        <p:nvSpPr>
+          <p:cNvPr id="2" name="Title 1">
+            <a:extLst>
+              <a:ext uri="{FF2B5EF4-FFF2-40B4-BE49-F238E27FC236}">
+                <a16:creationId xmlns:a16="http://schemas.microsoft.com/office/drawing/2014/main" id="{86B3F944-211E-F9D2-F4F6-5C0C0F336072}"/>
+              </a:ext>
+            </a:extLst>
+          </p:cNvPr>
+          <p:cNvSpPr>
+            <a:spLocks noGrp="1"/>
+          </p:cNvSpPr>
+          <p:nvPr>
+            <p:ph type="title"/>
+          </p:nvPr>
+        </p:nvSpPr>
+        <p:spPr/>
+        <p:txBody>
+          <a:bodyPr/>
+          <a:lstStyle/>
+          <a:p>
+            <a:r>
+              <a:rPr lang="en-CA" dirty="0"/>
+              <a:t>What are variables?</a:t>
+            </a:r>
+          </a:p>
+        </p:txBody>
+      </p:sp>
+      <p:pic>
+        <p:nvPicPr>
+          <p:cNvPr id="6" name="Content Placeholder 5">
+            <a:extLst>
+              <a:ext uri="{FF2B5EF4-FFF2-40B4-BE49-F238E27FC236}">
+                <a16:creationId xmlns:a16="http://schemas.microsoft.com/office/drawing/2014/main" id="{17A2B4E0-6F0D-4918-A4D4-891DCEE5DAB9}"/>
+              </a:ext>
+            </a:extLst>
+          </p:cNvPr>
+          <p:cNvPicPr>
+            <a:picLocks noGrp="1" noChangeAspect="1"/>
+          </p:cNvPicPr>
+          <p:nvPr>
+            <p:ph idx="1"/>
+          </p:nvPr>
+        </p:nvPicPr>
+        <p:blipFill>
+          <a:blip r:embed="rId2"/>
+          <a:stretch>
+            <a:fillRect/>
+          </a:stretch>
+        </p:blipFill>
+        <p:spPr>
+          <a:xfrm>
+            <a:off x="5851525" y="1700050"/>
+            <a:ext cx="5213350" cy="3457901"/>
+          </a:xfrm>
+        </p:spPr>
+      </p:pic>
+      <p:sp>
+        <p:nvSpPr>
+          <p:cNvPr id="4" name="Text Placeholder 3">
+            <a:extLst>
+              <a:ext uri="{FF2B5EF4-FFF2-40B4-BE49-F238E27FC236}">
+                <a16:creationId xmlns:a16="http://schemas.microsoft.com/office/drawing/2014/main" id="{EBD85136-D407-4C2C-44D6-FA290D61DC74}"/>
+              </a:ext>
+            </a:extLst>
+          </p:cNvPr>
+          <p:cNvSpPr>
+            <a:spLocks noGrp="1"/>
+          </p:cNvSpPr>
+          <p:nvPr>
+            <p:ph type="body" sz="half" idx="2"/>
+          </p:nvPr>
+        </p:nvSpPr>
+        <p:spPr>
+          <a:xfrm>
+            <a:off x="1143000" y="2834640"/>
+            <a:ext cx="3931920" cy="3457900"/>
+          </a:xfrm>
+        </p:spPr>
+        <p:txBody>
+          <a:bodyPr>
+            <a:normAutofit/>
+          </a:bodyPr>
+          <a:lstStyle/>
+          <a:p>
+            <a:pPr marL="285750" indent="-285750">
+              <a:buFont typeface="Arial" panose="020B0604020202020204" pitchFamily="34" charset="0"/>
+              <a:buChar char="•"/>
+            </a:pPr>
+            <a:r>
+              <a:rPr lang="en-CA" b="1" dirty="0"/>
+              <a:t>Variables</a:t>
+            </a:r>
+            <a:r>
+              <a:rPr lang="en-CA" dirty="0"/>
+              <a:t> are used to store data and give it a name so that we can use it later</a:t>
+            </a:r>
+          </a:p>
+          <a:p>
+            <a:pPr marL="285750" indent="-285750">
+              <a:buFont typeface="Arial" panose="020B0604020202020204" pitchFamily="34" charset="0"/>
+              <a:buChar char="•"/>
+            </a:pPr>
+            <a:r>
+              <a:rPr lang="en-CA" dirty="0"/>
+              <a:t>They can store almost anything in Python, including strings, integers, lists, and Booleans</a:t>
+            </a:r>
+          </a:p>
+          <a:p>
+            <a:pPr marL="285750" indent="-285750">
+              <a:buFont typeface="Arial" panose="020B0604020202020204" pitchFamily="34" charset="0"/>
+              <a:buChar char="•"/>
+            </a:pPr>
+            <a:r>
+              <a:rPr lang="en-CA" dirty="0"/>
+              <a:t>We can </a:t>
+            </a:r>
+            <a:r>
+              <a:rPr lang="en-CA" b="1" dirty="0"/>
+              <a:t>assign</a:t>
+            </a:r>
+            <a:r>
+              <a:rPr lang="en-CA" dirty="0"/>
+              <a:t> a value (or the result of a calculation) to a variable by using the equals sign (=)</a:t>
+            </a:r>
+          </a:p>
+          <a:p>
+            <a:pPr marL="285750" indent="-285750">
+              <a:buFont typeface="Arial" panose="020B0604020202020204" pitchFamily="34" charset="0"/>
+              <a:buChar char="•"/>
+            </a:pPr>
+            <a:r>
+              <a:rPr lang="en-CA" dirty="0"/>
+              <a:t>Structure: </a:t>
+            </a:r>
+            <a:r>
+              <a:rPr lang="en-CA" dirty="0">
+                <a:latin typeface="Consolas" panose="020B0609020204030204" pitchFamily="49" charset="0"/>
+              </a:rPr>
+              <a:t>variable = value</a:t>
+            </a:r>
+            <a:endParaRPr lang="en-CA" dirty="0"/>
+          </a:p>
+        </p:txBody>
+      </p:sp>
+    </p:spTree>
+    <p:extLst>
+      <p:ext uri="{BB962C8B-B14F-4D97-AF65-F5344CB8AC3E}">
+        <p14:creationId xmlns:p14="http://schemas.microsoft.com/office/powerpoint/2010/main" val="4101037148"/>
+      </p:ext>
+    </p:extLst>
+  </p:cSld>
+  <p:clrMapOvr>
+    <a:masterClrMapping/>
+  </p:clrMapOvr>
+</p:sld>
+</file>
+
+<file path=ppt/slides/slide16.xml><?xml version="1.0" encoding="utf-8"?>
+<p:sld xmlns:a="http://schemas.openxmlformats.org/drawingml/2006/main" xmlns:r="http://schemas.openxmlformats.org/officeDocument/2006/relationships" xmlns:p="http://schemas.openxmlformats.org/presentationml/2006/main">
+  <p:cSld>
+    <p:spTree>
+      <p:nvGrpSpPr>
+        <p:cNvPr id="1" name="">
+          <a:extLst>
+            <a:ext uri="{FF2B5EF4-FFF2-40B4-BE49-F238E27FC236}">
+              <a16:creationId xmlns:a16="http://schemas.microsoft.com/office/drawing/2014/main" id="{2CA8D5E0-0143-F25A-5CCB-72A9DD53FDFE}"/>
+            </a:ext>
+          </a:extLst>
+        </p:cNvPr>
+        <p:cNvGrpSpPr/>
+        <p:nvPr/>
+      </p:nvGrpSpPr>
+      <p:grpSpPr>
+        <a:xfrm>
+          <a:off x="0" y="0"/>
+          <a:ext cx="0" cy="0"/>
+          <a:chOff x="0" y="0"/>
+          <a:chExt cx="0" cy="0"/>
+        </a:xfrm>
+      </p:grpSpPr>
+      <p:sp>
+        <p:nvSpPr>
+          <p:cNvPr id="2" name="Title 1">
+            <a:extLst>
+              <a:ext uri="{FF2B5EF4-FFF2-40B4-BE49-F238E27FC236}">
+                <a16:creationId xmlns:a16="http://schemas.microsoft.com/office/drawing/2014/main" id="{2C503A57-6DB6-E8E0-900B-FBCCF90E107E}"/>
+              </a:ext>
+            </a:extLst>
+          </p:cNvPr>
+          <p:cNvSpPr>
+            <a:spLocks noGrp="1"/>
+          </p:cNvSpPr>
+          <p:nvPr>
+            <p:ph type="title"/>
+          </p:nvPr>
+        </p:nvSpPr>
+        <p:spPr/>
+        <p:txBody>
+          <a:bodyPr/>
+          <a:lstStyle/>
+          <a:p>
+            <a:r>
+              <a:rPr lang="en-CA" dirty="0"/>
+              <a:t>How can we use variables?</a:t>
+            </a:r>
+          </a:p>
+        </p:txBody>
+      </p:sp>
+      <p:sp>
+        <p:nvSpPr>
+          <p:cNvPr id="4" name="Text Placeholder 3">
+            <a:extLst>
+              <a:ext uri="{FF2B5EF4-FFF2-40B4-BE49-F238E27FC236}">
+                <a16:creationId xmlns:a16="http://schemas.microsoft.com/office/drawing/2014/main" id="{519E66CB-B56F-D845-F4E5-D736212EECE0}"/>
+              </a:ext>
+            </a:extLst>
+          </p:cNvPr>
+          <p:cNvSpPr>
+            <a:spLocks noGrp="1"/>
+          </p:cNvSpPr>
+          <p:nvPr>
+            <p:ph type="body" sz="half" idx="2"/>
+          </p:nvPr>
+        </p:nvSpPr>
+        <p:spPr/>
+        <p:txBody>
+          <a:bodyPr>
+            <a:normAutofit/>
+          </a:bodyPr>
+          <a:lstStyle/>
+          <a:p>
+            <a:pPr marL="285750" indent="-285750">
+              <a:buFont typeface="Arial" panose="020B0604020202020204" pitchFamily="34" charset="0"/>
+              <a:buChar char="•"/>
+            </a:pPr>
+            <a:r>
+              <a:rPr lang="en-CA" dirty="0"/>
+              <a:t>After assigning a variable, we can use it anywhere else in our program by using its name</a:t>
+            </a:r>
+          </a:p>
+          <a:p>
+            <a:pPr marL="285750" indent="-285750">
+              <a:buFont typeface="Arial" panose="020B0604020202020204" pitchFamily="34" charset="0"/>
+              <a:buChar char="•"/>
+            </a:pPr>
+            <a:r>
+              <a:rPr lang="en-CA" dirty="0"/>
+              <a:t>You can use a variable to </a:t>
+            </a:r>
+            <a:r>
+              <a:rPr lang="en-CA" i="1" dirty="0"/>
+              <a:t>perform a calculation</a:t>
+            </a:r>
+          </a:p>
+          <a:p>
+            <a:pPr marL="285750" indent="-285750">
+              <a:buFont typeface="Arial" panose="020B0604020202020204" pitchFamily="34" charset="0"/>
+              <a:buChar char="•"/>
+            </a:pPr>
+            <a:r>
+              <a:rPr lang="en-CA" dirty="0"/>
+              <a:t>You can use a variable to </a:t>
+            </a:r>
+            <a:r>
+              <a:rPr lang="en-CA" i="1" dirty="0"/>
+              <a:t>compute another new variable</a:t>
+            </a:r>
+          </a:p>
+          <a:p>
+            <a:pPr marL="285750" indent="-285750">
+              <a:buFont typeface="Arial" panose="020B0604020202020204" pitchFamily="34" charset="0"/>
+              <a:buChar char="•"/>
+            </a:pPr>
+            <a:r>
+              <a:rPr lang="en-CA" dirty="0"/>
+              <a:t>You can also </a:t>
+            </a:r>
+            <a:r>
+              <a:rPr lang="en-CA" i="1" dirty="0"/>
+              <a:t>update variables </a:t>
+            </a:r>
+            <a:r>
+              <a:rPr lang="en-CA" dirty="0"/>
+              <a:t>by assigning it to a calculation with itself</a:t>
+            </a:r>
+          </a:p>
+        </p:txBody>
+      </p:sp>
+      <p:pic>
+        <p:nvPicPr>
+          <p:cNvPr id="8" name="Content Placeholder 7">
+            <a:extLst>
+              <a:ext uri="{FF2B5EF4-FFF2-40B4-BE49-F238E27FC236}">
+                <a16:creationId xmlns:a16="http://schemas.microsoft.com/office/drawing/2014/main" id="{2D34436E-E1A3-546E-7947-74BA019E7CB7}"/>
+              </a:ext>
+            </a:extLst>
+          </p:cNvPr>
+          <p:cNvPicPr>
+            <a:picLocks noGrp="1" noChangeAspect="1"/>
+          </p:cNvPicPr>
+          <p:nvPr>
+            <p:ph idx="1"/>
+          </p:nvPr>
+        </p:nvPicPr>
+        <p:blipFill>
+          <a:blip r:embed="rId2"/>
+          <a:stretch>
+            <a:fillRect/>
+          </a:stretch>
+        </p:blipFill>
+        <p:spPr>
+          <a:xfrm>
+            <a:off x="5851525" y="1697850"/>
+            <a:ext cx="5213350" cy="3462301"/>
+          </a:xfrm>
+        </p:spPr>
+      </p:pic>
+    </p:spTree>
+    <p:extLst>
+      <p:ext uri="{BB962C8B-B14F-4D97-AF65-F5344CB8AC3E}">
+        <p14:creationId xmlns:p14="http://schemas.microsoft.com/office/powerpoint/2010/main" val="1890857210"/>
+      </p:ext>
+    </p:extLst>
+  </p:cSld>
+  <p:clrMapOvr>
+    <a:masterClrMapping/>
+  </p:clrMapOvr>
+</p:sld>
+</file>
+
+<file path=ppt/slides/slide17.xml><?xml version="1.0" encoding="utf-8"?>
+<p:sld xmlns:a="http://schemas.openxmlformats.org/drawingml/2006/main" xmlns:r="http://schemas.openxmlformats.org/officeDocument/2006/relationships" xmlns:p="http://schemas.openxmlformats.org/presentationml/2006/main">
+  <p:cSld>
+    <p:spTree>
+      <p:nvGrpSpPr>
+        <p:cNvPr id="1" name="">
+          <a:extLst>
+            <a:ext uri="{FF2B5EF4-FFF2-40B4-BE49-F238E27FC236}">
+              <a16:creationId xmlns:a16="http://schemas.microsoft.com/office/drawing/2014/main" id="{AE0C542C-F318-E8D7-E290-6546ACA2699F}"/>
+            </a:ext>
+          </a:extLst>
+        </p:cNvPr>
+        <p:cNvGrpSpPr/>
+        <p:nvPr/>
+      </p:nvGrpSpPr>
+      <p:grpSpPr>
+        <a:xfrm>
+          <a:off x="0" y="0"/>
+          <a:ext cx="0" cy="0"/>
+          <a:chOff x="0" y="0"/>
+          <a:chExt cx="0" cy="0"/>
+        </a:xfrm>
+      </p:grpSpPr>
+      <p:sp>
+        <p:nvSpPr>
+          <p:cNvPr id="2" name="Title 1">
+            <a:extLst>
+              <a:ext uri="{FF2B5EF4-FFF2-40B4-BE49-F238E27FC236}">
+                <a16:creationId xmlns:a16="http://schemas.microsoft.com/office/drawing/2014/main" id="{24171CEB-3F5F-811C-7488-46209BA5C5F7}"/>
+              </a:ext>
+            </a:extLst>
+          </p:cNvPr>
+          <p:cNvSpPr>
+            <a:spLocks noGrp="1"/>
+          </p:cNvSpPr>
+          <p:nvPr>
+            <p:ph type="title"/>
+          </p:nvPr>
+        </p:nvSpPr>
+        <p:spPr/>
+        <p:txBody>
+          <a:bodyPr/>
+          <a:lstStyle/>
+          <a:p>
+            <a:r>
+              <a:rPr lang="en-CA" dirty="0"/>
+              <a:t>Summary: Variables</a:t>
+            </a:r>
+          </a:p>
+        </p:txBody>
+      </p:sp>
+      <p:sp>
+        <p:nvSpPr>
+          <p:cNvPr id="3" name="Content Placeholder 2">
+            <a:extLst>
+              <a:ext uri="{FF2B5EF4-FFF2-40B4-BE49-F238E27FC236}">
+                <a16:creationId xmlns:a16="http://schemas.microsoft.com/office/drawing/2014/main" id="{BC16C1B0-4ACC-BB02-DCE3-F8A2BA412897}"/>
+              </a:ext>
+            </a:extLst>
+          </p:cNvPr>
+          <p:cNvSpPr>
+            <a:spLocks noGrp="1"/>
+          </p:cNvSpPr>
+          <p:nvPr>
+            <p:ph idx="1"/>
+          </p:nvPr>
+        </p:nvSpPr>
+        <p:spPr/>
+        <p:txBody>
+          <a:bodyPr/>
+          <a:lstStyle/>
+          <a:p>
+            <a:r>
+              <a:rPr lang="en-CA" b="1" dirty="0"/>
+              <a:t>Variables</a:t>
+            </a:r>
+            <a:r>
+              <a:rPr lang="en-CA" dirty="0"/>
+              <a:t> can store almost any type of data and give it a name so that we can use it later in our programs</a:t>
+            </a:r>
+          </a:p>
+          <a:p>
+            <a:r>
+              <a:rPr lang="en-CA" dirty="0"/>
+              <a:t>We can </a:t>
+            </a:r>
+            <a:r>
+              <a:rPr lang="en-CA" b="1" dirty="0"/>
+              <a:t>assign </a:t>
+            </a:r>
+            <a:r>
+              <a:rPr lang="en-CA" dirty="0"/>
+              <a:t>a value or a computation result to a variable by using the equals sign (=)</a:t>
+            </a:r>
+          </a:p>
+          <a:p>
+            <a:pPr lvl="1"/>
+            <a:r>
+              <a:rPr lang="en-CA" sz="2200" dirty="0">
+                <a:latin typeface="Consolas" panose="020B0609020204030204" pitchFamily="49" charset="0"/>
+              </a:rPr>
+              <a:t>variable = value</a:t>
+            </a:r>
+            <a:endParaRPr lang="en-CA" sz="2200" dirty="0"/>
+          </a:p>
+          <a:p>
+            <a:r>
+              <a:rPr lang="en-CA" dirty="0"/>
+              <a:t>After assigning a variable, we can use it again in our program simply by using its name</a:t>
+            </a:r>
+          </a:p>
+          <a:p>
+            <a:r>
+              <a:rPr lang="en-CA" dirty="0"/>
+              <a:t>We can use variables to </a:t>
+            </a:r>
+            <a:r>
+              <a:rPr lang="en-CA" i="1" dirty="0"/>
+              <a:t>perform computations, compute new variables, </a:t>
+            </a:r>
+            <a:r>
+              <a:rPr lang="en-CA" dirty="0"/>
+              <a:t>or </a:t>
+            </a:r>
+            <a:r>
+              <a:rPr lang="en-CA" i="1" dirty="0"/>
+              <a:t>update variables</a:t>
+            </a:r>
+            <a:r>
+              <a:rPr lang="en-CA" dirty="0"/>
+              <a:t> by assigning them to a computation that includes itself</a:t>
+            </a:r>
+          </a:p>
+        </p:txBody>
+      </p:sp>
+    </p:spTree>
+    <p:extLst>
+      <p:ext uri="{BB962C8B-B14F-4D97-AF65-F5344CB8AC3E}">
+        <p14:creationId xmlns:p14="http://schemas.microsoft.com/office/powerpoint/2010/main" val="1159791470"/>
+      </p:ext>
+    </p:extLst>
+  </p:cSld>
+  <p:clrMapOvr>
+    <a:masterClrMapping/>
+  </p:clrMapOvr>
+</p:sld>
+</file>
+
+<file path=ppt/slides/slide18.xml><?xml version="1.0" encoding="utf-8"?>
+<p:sld xmlns:a="http://schemas.openxmlformats.org/drawingml/2006/main" xmlns:r="http://schemas.openxmlformats.org/officeDocument/2006/relationships" xmlns:p="http://schemas.openxmlformats.org/presentationml/2006/main">
+  <p:cSld>
+    <p:spTree>
+      <p:nvGrpSpPr>
+        <p:cNvPr id="1" name="">
+          <a:extLst>
+            <a:ext uri="{FF2B5EF4-FFF2-40B4-BE49-F238E27FC236}">
+              <a16:creationId xmlns:a16="http://schemas.microsoft.com/office/drawing/2014/main" id="{5A7B5A41-75A3-AF1E-09D8-437B08D34D34}"/>
+            </a:ext>
+          </a:extLst>
+        </p:cNvPr>
+        <p:cNvGrpSpPr/>
+        <p:nvPr/>
+      </p:nvGrpSpPr>
+      <p:grpSpPr>
+        <a:xfrm>
+          <a:off x="0" y="0"/>
+          <a:ext cx="0" cy="0"/>
+          <a:chOff x="0" y="0"/>
+          <a:chExt cx="0" cy="0"/>
+        </a:xfrm>
+      </p:grpSpPr>
+      <p:sp>
+        <p:nvSpPr>
+          <p:cNvPr id="2" name="Title 1">
+            <a:extLst>
+              <a:ext uri="{FF2B5EF4-FFF2-40B4-BE49-F238E27FC236}">
+                <a16:creationId xmlns:a16="http://schemas.microsoft.com/office/drawing/2014/main" id="{A37F8991-028C-BE2D-1E2A-8440BFEA052B}"/>
+              </a:ext>
+            </a:extLst>
+          </p:cNvPr>
+          <p:cNvSpPr>
+            <a:spLocks noGrp="1"/>
+          </p:cNvSpPr>
+          <p:nvPr>
+            <p:ph type="title"/>
+          </p:nvPr>
+        </p:nvSpPr>
+        <p:spPr/>
+        <p:txBody>
+          <a:bodyPr/>
+          <a:lstStyle/>
+          <a:p>
+            <a:r>
+              <a:rPr lang="en-CA" dirty="0"/>
+              <a:t>Inputs</a:t>
+            </a:r>
+          </a:p>
+        </p:txBody>
+      </p:sp>
+      <p:sp>
+        <p:nvSpPr>
+          <p:cNvPr id="3" name="Text Placeholder 2">
+            <a:extLst>
+              <a:ext uri="{FF2B5EF4-FFF2-40B4-BE49-F238E27FC236}">
+                <a16:creationId xmlns:a16="http://schemas.microsoft.com/office/drawing/2014/main" id="{50D7CF0D-0649-82D6-4744-24EF339A3C23}"/>
+              </a:ext>
+            </a:extLst>
+          </p:cNvPr>
+          <p:cNvSpPr>
+            <a:spLocks noGrp="1"/>
+          </p:cNvSpPr>
+          <p:nvPr>
+            <p:ph type="body" idx="1"/>
+          </p:nvPr>
+        </p:nvSpPr>
+        <p:spPr/>
+        <p:txBody>
+          <a:bodyPr/>
+          <a:lstStyle/>
+          <a:p>
+            <a:r>
+              <a:rPr lang="en-CA" dirty="0"/>
+              <a:t>The </a:t>
+            </a:r>
+            <a:r>
+              <a:rPr lang="en-CA" dirty="0">
+                <a:latin typeface="Consolas" panose="020B0609020204030204" pitchFamily="49" charset="0"/>
+              </a:rPr>
+              <a:t>input</a:t>
+            </a:r>
+            <a:r>
+              <a:rPr lang="en-CA" dirty="0"/>
+              <a:t> function, program customizations, and integer conversions</a:t>
+            </a:r>
+          </a:p>
+        </p:txBody>
+      </p:sp>
+    </p:spTree>
+    <p:extLst>
+      <p:ext uri="{BB962C8B-B14F-4D97-AF65-F5344CB8AC3E}">
+        <p14:creationId xmlns:p14="http://schemas.microsoft.com/office/powerpoint/2010/main" val="2657423670"/>
+      </p:ext>
+    </p:extLst>
+  </p:cSld>
+  <p:clrMapOvr>
+    <a:masterClrMapping/>
+  </p:clrMapOvr>
+</p:sld>
+</file>
+
+<file path=ppt/slides/slide19.xml><?xml version="1.0" encoding="utf-8"?>
+<p:sld xmlns:a="http://schemas.openxmlformats.org/drawingml/2006/main" xmlns:r="http://schemas.openxmlformats.org/officeDocument/2006/relationships" xmlns:p="http://schemas.openxmlformats.org/presentationml/2006/main">
+  <p:cSld>
+    <p:spTree>
+      <p:nvGrpSpPr>
+        <p:cNvPr id="1" name="">
+          <a:extLst>
+            <a:ext uri="{FF2B5EF4-FFF2-40B4-BE49-F238E27FC236}">
+              <a16:creationId xmlns:a16="http://schemas.microsoft.com/office/drawing/2014/main" id="{A43DC3F4-F1FA-292C-71C0-CB09A5FDC39C}"/>
+            </a:ext>
+          </a:extLst>
+        </p:cNvPr>
+        <p:cNvGrpSpPr/>
+        <p:nvPr/>
+      </p:nvGrpSpPr>
+      <p:grpSpPr>
+        <a:xfrm>
+          <a:off x="0" y="0"/>
+          <a:ext cx="0" cy="0"/>
+          <a:chOff x="0" y="0"/>
+          <a:chExt cx="0" cy="0"/>
+        </a:xfrm>
+      </p:grpSpPr>
+      <p:sp>
+        <p:nvSpPr>
+          <p:cNvPr id="2" name="Title 1">
+            <a:extLst>
+              <a:ext uri="{FF2B5EF4-FFF2-40B4-BE49-F238E27FC236}">
+                <a16:creationId xmlns:a16="http://schemas.microsoft.com/office/drawing/2014/main" id="{104346AA-DCBC-FE9A-C2FF-441EBEED8313}"/>
+              </a:ext>
+            </a:extLst>
+          </p:cNvPr>
+          <p:cNvSpPr>
+            <a:spLocks noGrp="1"/>
+          </p:cNvSpPr>
+          <p:nvPr>
+            <p:ph type="title"/>
+          </p:nvPr>
+        </p:nvSpPr>
+        <p:spPr/>
+        <p:txBody>
+          <a:bodyPr/>
+          <a:lstStyle/>
+          <a:p>
+            <a:r>
+              <a:rPr lang="en-CA" dirty="0"/>
+              <a:t>The </a:t>
+            </a:r>
+            <a:r>
+              <a:rPr lang="en-CA" dirty="0">
+                <a:latin typeface="Consolas" panose="020B0609020204030204" pitchFamily="49" charset="0"/>
+              </a:rPr>
+              <a:t>input</a:t>
+            </a:r>
+            <a:r>
+              <a:rPr lang="en-CA" dirty="0"/>
+              <a:t> function</a:t>
+            </a:r>
+          </a:p>
+        </p:txBody>
+      </p:sp>
+      <p:sp>
+        <p:nvSpPr>
+          <p:cNvPr id="4" name="Text Placeholder 3">
+            <a:extLst>
+              <a:ext uri="{FF2B5EF4-FFF2-40B4-BE49-F238E27FC236}">
+                <a16:creationId xmlns:a16="http://schemas.microsoft.com/office/drawing/2014/main" id="{EFEF4443-4903-A401-FDAA-195F8C06A5A3}"/>
+              </a:ext>
+            </a:extLst>
+          </p:cNvPr>
+          <p:cNvSpPr>
+            <a:spLocks noGrp="1"/>
+          </p:cNvSpPr>
+          <p:nvPr>
+            <p:ph type="body" sz="half" idx="2"/>
+          </p:nvPr>
+        </p:nvSpPr>
+        <p:spPr>
+          <a:xfrm>
+            <a:off x="1143000" y="2834640"/>
+            <a:ext cx="3931920" cy="3457900"/>
+          </a:xfrm>
+        </p:spPr>
+        <p:txBody>
+          <a:bodyPr>
+            <a:normAutofit/>
+          </a:bodyPr>
+          <a:lstStyle/>
+          <a:p>
+            <a:pPr marL="285750" indent="-285750">
+              <a:buFont typeface="Arial" panose="020B0604020202020204" pitchFamily="34" charset="0"/>
+              <a:buChar char="•"/>
+            </a:pPr>
+            <a:r>
+              <a:rPr lang="en-CA" dirty="0"/>
+              <a:t>What if we want to get information from the user to use in our program?</a:t>
+            </a:r>
+          </a:p>
+          <a:p>
+            <a:pPr marL="285750" indent="-285750">
+              <a:buFont typeface="Arial" panose="020B0604020202020204" pitchFamily="34" charset="0"/>
+              <a:buChar char="•"/>
+            </a:pPr>
+            <a:r>
+              <a:rPr lang="en-CA" dirty="0"/>
+              <a:t>We can use the </a:t>
+            </a:r>
+            <a:r>
+              <a:rPr lang="en-CA" dirty="0">
+                <a:latin typeface="Consolas" panose="020B0609020204030204" pitchFamily="49" charset="0"/>
+              </a:rPr>
+              <a:t>input</a:t>
+            </a:r>
+            <a:r>
+              <a:rPr lang="en-CA" dirty="0"/>
+              <a:t> function!</a:t>
+            </a:r>
+          </a:p>
+          <a:p>
+            <a:pPr marL="285750" indent="-285750">
+              <a:buFont typeface="Arial" panose="020B0604020202020204" pitchFamily="34" charset="0"/>
+              <a:buChar char="•"/>
+            </a:pPr>
+            <a:r>
+              <a:rPr lang="en-CA" dirty="0"/>
+              <a:t>We type the question or prompt that we want to ask inside the function.</a:t>
+            </a:r>
+          </a:p>
+          <a:p>
+            <a:pPr marL="285750" indent="-285750">
+              <a:buFont typeface="Arial" panose="020B0604020202020204" pitchFamily="34" charset="0"/>
+              <a:buChar char="•"/>
+            </a:pPr>
+            <a:r>
+              <a:rPr lang="en-CA" dirty="0"/>
+              <a:t>When we run our program, this prompt will be printed on the screen for the user to answer.</a:t>
+            </a:r>
+          </a:p>
+          <a:p>
+            <a:pPr marL="285750" indent="-285750">
+              <a:buFont typeface="Arial" panose="020B0604020202020204" pitchFamily="34" charset="0"/>
+              <a:buChar char="•"/>
+            </a:pPr>
+            <a:r>
+              <a:rPr lang="en-CA" dirty="0"/>
+              <a:t>Remember to include a space at the end of your prompt!</a:t>
+            </a:r>
+          </a:p>
+        </p:txBody>
+      </p:sp>
+      <p:pic>
+        <p:nvPicPr>
+          <p:cNvPr id="10" name="Content Placeholder 9">
+            <a:extLst>
+              <a:ext uri="{FF2B5EF4-FFF2-40B4-BE49-F238E27FC236}">
+                <a16:creationId xmlns:a16="http://schemas.microsoft.com/office/drawing/2014/main" id="{353AFD7C-DDB6-C1A1-504F-AF9CB2175037}"/>
+              </a:ext>
+            </a:extLst>
+          </p:cNvPr>
+          <p:cNvPicPr>
+            <a:picLocks noGrp="1" noChangeAspect="1"/>
+          </p:cNvPicPr>
+          <p:nvPr>
+            <p:ph idx="1"/>
+          </p:nvPr>
+        </p:nvPicPr>
+        <p:blipFill>
+          <a:blip r:embed="rId2"/>
+          <a:stretch>
+            <a:fillRect/>
+          </a:stretch>
+        </p:blipFill>
+        <p:spPr>
+          <a:xfrm>
+            <a:off x="5835650" y="2594296"/>
+            <a:ext cx="5213350" cy="3513056"/>
+          </a:xfrm>
+        </p:spPr>
+      </p:pic>
+      <p:pic>
+        <p:nvPicPr>
+          <p:cNvPr id="8" name="Picture 7">
+            <a:extLst>
+              <a:ext uri="{FF2B5EF4-FFF2-40B4-BE49-F238E27FC236}">
+                <a16:creationId xmlns:a16="http://schemas.microsoft.com/office/drawing/2014/main" id="{2B781598-7620-EF1F-9F76-825000F9CF09}"/>
+              </a:ext>
+            </a:extLst>
+          </p:cNvPr>
+          <p:cNvPicPr>
+            <a:picLocks noChangeAspect="1"/>
+          </p:cNvPicPr>
+          <p:nvPr/>
+        </p:nvPicPr>
+        <p:blipFill>
+          <a:blip r:embed="rId3"/>
+          <a:stretch>
+            <a:fillRect/>
+          </a:stretch>
+        </p:blipFill>
+        <p:spPr>
+          <a:xfrm>
+            <a:off x="5835650" y="1097280"/>
+            <a:ext cx="5213351" cy="1244478"/>
+          </a:xfrm>
+          <a:prstGeom prst="rect">
+            <a:avLst/>
+          </a:prstGeom>
+        </p:spPr>
+      </p:pic>
+    </p:spTree>
+    <p:extLst>
+      <p:ext uri="{BB962C8B-B14F-4D97-AF65-F5344CB8AC3E}">
+        <p14:creationId xmlns:p14="http://schemas.microsoft.com/office/powerpoint/2010/main" val="1987775902"/>
+      </p:ext>
+    </p:extLst>
+  </p:cSld>
+  <p:clrMapOvr>
+    <a:masterClrMapping/>
+  </p:clrMapOvr>
+</p:sld>
+</file>
+
 <file path=ppt/slides/slide2.xml><?xml version="1.0" encoding="utf-8"?>
 <p:sld xmlns:a="http://schemas.openxmlformats.org/drawingml/2006/main" xmlns:r="http://schemas.openxmlformats.org/officeDocument/2006/relationships" xmlns:p="http://schemas.openxmlformats.org/presentationml/2006/main">
   <p:cSld>
@@ -4133,17 +6768,7 @@
           <a:p>
             <a:r>
               <a:rPr lang="en-CA" dirty="0"/>
-              <a:t>Python Basics, including Strings, integers, and the </a:t>
-            </a:r>
-            <a:r>
-              <a:rPr lang="en-CA" dirty="0">
-                <a:latin typeface="Consolas" panose="020B0609020204030204" pitchFamily="49" charset="0"/>
-              </a:rPr>
-              <a:t>print</a:t>
-            </a:r>
-            <a:r>
-              <a:rPr lang="en-CA" dirty="0"/>
-              <a:t> statement</a:t>
+              <a:t>Python Basics</a:t>
             </a:r>
           </a:p>
           <a:p>
@@ -4204,10 +6829,629 @@
           </a:p>
         </p:txBody>
       </p:sp>
+      <p:pic>
+        <p:nvPicPr>
+          <p:cNvPr id="5" name="Graphic 4" descr="Laptop outline">
+            <a:extLst>
+              <a:ext uri="{FF2B5EF4-FFF2-40B4-BE49-F238E27FC236}">
+                <a16:creationId xmlns:a16="http://schemas.microsoft.com/office/drawing/2014/main" id="{3882A9EF-422F-6934-722F-EB3CE623898B}"/>
+              </a:ext>
+            </a:extLst>
+          </p:cNvPr>
+          <p:cNvPicPr>
+            <a:picLocks noChangeAspect="1"/>
+          </p:cNvPicPr>
+          <p:nvPr/>
+        </p:nvPicPr>
+        <p:blipFill>
+          <a:blip r:embed="rId2">
+            <a:extLst>
+              <a:ext uri="{96DAC541-7B7A-43D3-8B79-37D633B846F1}">
+                <asvg:svgBlip xmlns:asvg="http://schemas.microsoft.com/office/drawing/2016/SVG/main" r:embed="rId3"/>
+              </a:ext>
+            </a:extLst>
+          </a:blip>
+          <a:stretch>
+            <a:fillRect/>
+          </a:stretch>
+        </p:blipFill>
+        <p:spPr>
+          <a:xfrm>
+            <a:off x="8882742" y="4038600"/>
+            <a:ext cx="2721429" cy="2721429"/>
+          </a:xfrm>
+          <a:prstGeom prst="rect">
+            <a:avLst/>
+          </a:prstGeom>
+        </p:spPr>
+      </p:pic>
     </p:spTree>
     <p:extLst>
       <p:ext uri="{BB962C8B-B14F-4D97-AF65-F5344CB8AC3E}">
         <p14:creationId xmlns:p14="http://schemas.microsoft.com/office/powerpoint/2010/main" val="1109769617"/>
+      </p:ext>
+    </p:extLst>
+  </p:cSld>
+  <p:clrMapOvr>
+    <a:masterClrMapping/>
+  </p:clrMapOvr>
+</p:sld>
+</file>
+
+<file path=ppt/slides/slide20.xml><?xml version="1.0" encoding="utf-8"?>
+<p:sld xmlns:a="http://schemas.openxmlformats.org/drawingml/2006/main" xmlns:r="http://schemas.openxmlformats.org/officeDocument/2006/relationships" xmlns:p="http://schemas.openxmlformats.org/presentationml/2006/main">
+  <p:cSld>
+    <p:spTree>
+      <p:nvGrpSpPr>
+        <p:cNvPr id="1" name="">
+          <a:extLst>
+            <a:ext uri="{FF2B5EF4-FFF2-40B4-BE49-F238E27FC236}">
+              <a16:creationId xmlns:a16="http://schemas.microsoft.com/office/drawing/2014/main" id="{037B97D1-140A-33BC-AA1C-4914174F827E}"/>
+            </a:ext>
+          </a:extLst>
+        </p:cNvPr>
+        <p:cNvGrpSpPr/>
+        <p:nvPr/>
+      </p:nvGrpSpPr>
+      <p:grpSpPr>
+        <a:xfrm>
+          <a:off x="0" y="0"/>
+          <a:ext cx="0" cy="0"/>
+          <a:chOff x="0" y="0"/>
+          <a:chExt cx="0" cy="0"/>
+        </a:xfrm>
+      </p:grpSpPr>
+      <p:sp>
+        <p:nvSpPr>
+          <p:cNvPr id="2" name="Title 1">
+            <a:extLst>
+              <a:ext uri="{FF2B5EF4-FFF2-40B4-BE49-F238E27FC236}">
+                <a16:creationId xmlns:a16="http://schemas.microsoft.com/office/drawing/2014/main" id="{B674C022-A32E-7000-362B-E2A15B381159}"/>
+              </a:ext>
+            </a:extLst>
+          </p:cNvPr>
+          <p:cNvSpPr>
+            <a:spLocks noGrp="1"/>
+          </p:cNvSpPr>
+          <p:nvPr>
+            <p:ph type="title"/>
+          </p:nvPr>
+        </p:nvSpPr>
+        <p:spPr/>
+        <p:txBody>
+          <a:bodyPr/>
+          <a:lstStyle/>
+          <a:p>
+            <a:r>
+              <a:rPr lang="en-CA" dirty="0"/>
+              <a:t>Storing and Using Inputs</a:t>
+            </a:r>
+          </a:p>
+        </p:txBody>
+      </p:sp>
+      <p:sp>
+        <p:nvSpPr>
+          <p:cNvPr id="4" name="Text Placeholder 3">
+            <a:extLst>
+              <a:ext uri="{FF2B5EF4-FFF2-40B4-BE49-F238E27FC236}">
+                <a16:creationId xmlns:a16="http://schemas.microsoft.com/office/drawing/2014/main" id="{6AE680DF-3966-9499-8EBE-E0CB325C7728}"/>
+              </a:ext>
+            </a:extLst>
+          </p:cNvPr>
+          <p:cNvSpPr>
+            <a:spLocks noGrp="1"/>
+          </p:cNvSpPr>
+          <p:nvPr>
+            <p:ph type="body" sz="half" idx="2"/>
+          </p:nvPr>
+        </p:nvSpPr>
+        <p:spPr>
+          <a:xfrm>
+            <a:off x="1143000" y="2834640"/>
+            <a:ext cx="3931920" cy="3457900"/>
+          </a:xfrm>
+        </p:spPr>
+        <p:txBody>
+          <a:bodyPr>
+            <a:normAutofit/>
+          </a:bodyPr>
+          <a:lstStyle/>
+          <a:p>
+            <a:pPr marL="285750" indent="-285750">
+              <a:buFont typeface="Arial" panose="020B0604020202020204" pitchFamily="34" charset="0"/>
+              <a:buChar char="•"/>
+            </a:pPr>
+            <a:r>
+              <a:rPr lang="en-CA" dirty="0"/>
+              <a:t>Usually, we want to use player inputs in our programs. This can customize our program’s behaviour!</a:t>
+            </a:r>
+          </a:p>
+          <a:p>
+            <a:pPr marL="285750" indent="-285750">
+              <a:buFont typeface="Arial" panose="020B0604020202020204" pitchFamily="34" charset="0"/>
+              <a:buChar char="•"/>
+            </a:pPr>
+            <a:r>
+              <a:rPr lang="en-CA" dirty="0"/>
+              <a:t>To use player inputs, store it into a variable by using an assignment.</a:t>
+            </a:r>
+          </a:p>
+          <a:p>
+            <a:pPr marL="285750" indent="-285750">
+              <a:buFont typeface="Arial" panose="020B0604020202020204" pitchFamily="34" charset="0"/>
+              <a:buChar char="•"/>
+            </a:pPr>
+            <a:r>
+              <a:rPr lang="en-CA" dirty="0"/>
+              <a:t>After storing it into a variable, we can use that variable just like any variable that we’ve already learned about!</a:t>
+            </a:r>
+          </a:p>
+        </p:txBody>
+      </p:sp>
+      <p:pic>
+        <p:nvPicPr>
+          <p:cNvPr id="5" name="Picture 4">
+            <a:extLst>
+              <a:ext uri="{FF2B5EF4-FFF2-40B4-BE49-F238E27FC236}">
+                <a16:creationId xmlns:a16="http://schemas.microsoft.com/office/drawing/2014/main" id="{AA5A447C-1BB4-1349-A8AD-9B1EBE14EB77}"/>
+              </a:ext>
+            </a:extLst>
+          </p:cNvPr>
+          <p:cNvPicPr>
+            <a:picLocks noChangeAspect="1"/>
+          </p:cNvPicPr>
+          <p:nvPr/>
+        </p:nvPicPr>
+        <p:blipFill>
+          <a:blip r:embed="rId2"/>
+          <a:stretch>
+            <a:fillRect/>
+          </a:stretch>
+        </p:blipFill>
+        <p:spPr>
+          <a:xfrm>
+            <a:off x="5835650" y="1097281"/>
+            <a:ext cx="5214407" cy="1112520"/>
+          </a:xfrm>
+          <a:prstGeom prst="rect">
+            <a:avLst/>
+          </a:prstGeom>
+        </p:spPr>
+      </p:pic>
+      <p:pic>
+        <p:nvPicPr>
+          <p:cNvPr id="11" name="Content Placeholder 10">
+            <a:extLst>
+              <a:ext uri="{FF2B5EF4-FFF2-40B4-BE49-F238E27FC236}">
+                <a16:creationId xmlns:a16="http://schemas.microsoft.com/office/drawing/2014/main" id="{9B56725C-4362-AC64-359D-D31783547BAC}"/>
+              </a:ext>
+            </a:extLst>
+          </p:cNvPr>
+          <p:cNvPicPr>
+            <a:picLocks noGrp="1" noChangeAspect="1"/>
+          </p:cNvPicPr>
+          <p:nvPr>
+            <p:ph idx="1"/>
+          </p:nvPr>
+        </p:nvPicPr>
+        <p:blipFill>
+          <a:blip r:embed="rId3"/>
+          <a:stretch>
+            <a:fillRect/>
+          </a:stretch>
+        </p:blipFill>
+        <p:spPr>
+          <a:xfrm>
+            <a:off x="5835650" y="2459719"/>
+            <a:ext cx="5213350" cy="3484332"/>
+          </a:xfrm>
+        </p:spPr>
+      </p:pic>
+    </p:spTree>
+    <p:extLst>
+      <p:ext uri="{BB962C8B-B14F-4D97-AF65-F5344CB8AC3E}">
+        <p14:creationId xmlns:p14="http://schemas.microsoft.com/office/powerpoint/2010/main" val="3610940009"/>
+      </p:ext>
+    </p:extLst>
+  </p:cSld>
+  <p:clrMapOvr>
+    <a:masterClrMapping/>
+  </p:clrMapOvr>
+</p:sld>
+</file>
+
+<file path=ppt/slides/slide21.xml><?xml version="1.0" encoding="utf-8"?>
+<p:sld xmlns:a="http://schemas.openxmlformats.org/drawingml/2006/main" xmlns:r="http://schemas.openxmlformats.org/officeDocument/2006/relationships" xmlns:p="http://schemas.openxmlformats.org/presentationml/2006/main">
+  <p:cSld>
+    <p:spTree>
+      <p:nvGrpSpPr>
+        <p:cNvPr id="1" name="">
+          <a:extLst>
+            <a:ext uri="{FF2B5EF4-FFF2-40B4-BE49-F238E27FC236}">
+              <a16:creationId xmlns:a16="http://schemas.microsoft.com/office/drawing/2014/main" id="{2FF4C12F-86E8-2D99-AFA6-4771311F89CD}"/>
+            </a:ext>
+          </a:extLst>
+        </p:cNvPr>
+        <p:cNvGrpSpPr/>
+        <p:nvPr/>
+      </p:nvGrpSpPr>
+      <p:grpSpPr>
+        <a:xfrm>
+          <a:off x="0" y="0"/>
+          <a:ext cx="0" cy="0"/>
+          <a:chOff x="0" y="0"/>
+          <a:chExt cx="0" cy="0"/>
+        </a:xfrm>
+      </p:grpSpPr>
+      <p:sp>
+        <p:nvSpPr>
+          <p:cNvPr id="2" name="Title 1">
+            <a:extLst>
+              <a:ext uri="{FF2B5EF4-FFF2-40B4-BE49-F238E27FC236}">
+                <a16:creationId xmlns:a16="http://schemas.microsoft.com/office/drawing/2014/main" id="{446627F0-C61D-FBC3-1E60-8100A216837A}"/>
+              </a:ext>
+            </a:extLst>
+          </p:cNvPr>
+          <p:cNvSpPr>
+            <a:spLocks noGrp="1"/>
+          </p:cNvSpPr>
+          <p:nvPr>
+            <p:ph type="title"/>
+          </p:nvPr>
+        </p:nvSpPr>
+        <p:spPr/>
+        <p:txBody>
+          <a:bodyPr/>
+          <a:lstStyle/>
+          <a:p>
+            <a:r>
+              <a:rPr lang="en-CA" dirty="0"/>
+              <a:t>Number Inputs</a:t>
+            </a:r>
+          </a:p>
+        </p:txBody>
+      </p:sp>
+      <p:sp>
+        <p:nvSpPr>
+          <p:cNvPr id="4" name="Text Placeholder 3">
+            <a:extLst>
+              <a:ext uri="{FF2B5EF4-FFF2-40B4-BE49-F238E27FC236}">
+                <a16:creationId xmlns:a16="http://schemas.microsoft.com/office/drawing/2014/main" id="{60C6A015-3E37-A1B3-BF69-9E3B1D714098}"/>
+              </a:ext>
+            </a:extLst>
+          </p:cNvPr>
+          <p:cNvSpPr>
+            <a:spLocks noGrp="1"/>
+          </p:cNvSpPr>
+          <p:nvPr>
+            <p:ph type="body" sz="half" idx="2"/>
+          </p:nvPr>
+        </p:nvSpPr>
+        <p:spPr>
+          <a:xfrm>
+            <a:off x="1143000" y="2834640"/>
+            <a:ext cx="3931920" cy="3457900"/>
+          </a:xfrm>
+        </p:spPr>
+        <p:txBody>
+          <a:bodyPr>
+            <a:normAutofit/>
+          </a:bodyPr>
+          <a:lstStyle/>
+          <a:p>
+            <a:pPr marL="285750" indent="-285750">
+              <a:buFont typeface="Arial" panose="020B0604020202020204" pitchFamily="34" charset="0"/>
+              <a:buChar char="•"/>
+            </a:pPr>
+            <a:r>
+              <a:rPr lang="en-CA" dirty="0"/>
+              <a:t>We can also get number inputs from users.</a:t>
+            </a:r>
+          </a:p>
+          <a:p>
+            <a:pPr marL="285750" indent="-285750">
+              <a:buFont typeface="Arial" panose="020B0604020202020204" pitchFamily="34" charset="0"/>
+              <a:buChar char="•"/>
+            </a:pPr>
+            <a:r>
+              <a:rPr lang="en-CA" dirty="0">
+                <a:solidFill>
+                  <a:srgbClr val="FF0000"/>
+                </a:solidFill>
+              </a:rPr>
+              <a:t>However, we cannot use these inputs as numbers immediately! Inputs will </a:t>
+            </a:r>
+            <a:r>
+              <a:rPr lang="en-CA" i="1" dirty="0">
+                <a:solidFill>
+                  <a:srgbClr val="FF0000"/>
+                </a:solidFill>
+              </a:rPr>
+              <a:t>always</a:t>
+            </a:r>
+            <a:r>
+              <a:rPr lang="en-CA" dirty="0">
+                <a:solidFill>
+                  <a:srgbClr val="FF0000"/>
+                </a:solidFill>
+              </a:rPr>
+              <a:t> be stored as strings.</a:t>
+            </a:r>
+          </a:p>
+          <a:p>
+            <a:pPr marL="285750" indent="-285750">
+              <a:buFont typeface="Arial" panose="020B0604020202020204" pitchFamily="34" charset="0"/>
+              <a:buChar char="•"/>
+            </a:pPr>
+            <a:r>
+              <a:rPr lang="en-CA" dirty="0"/>
+              <a:t>To use an input as a number, we need to </a:t>
+            </a:r>
+            <a:r>
+              <a:rPr lang="en-CA" b="1" dirty="0"/>
+              <a:t>convert</a:t>
+            </a:r>
+            <a:r>
+              <a:rPr lang="en-CA" dirty="0"/>
+              <a:t> the string into an integer by using the </a:t>
+            </a:r>
+            <a:r>
+              <a:rPr lang="en-CA" dirty="0">
+                <a:latin typeface="Consolas" panose="020B0609020204030204" pitchFamily="49" charset="0"/>
+              </a:rPr>
+              <a:t>int</a:t>
+            </a:r>
+            <a:r>
+              <a:rPr lang="en-CA" dirty="0"/>
+              <a:t> function on the string.</a:t>
+            </a:r>
+            <a:endParaRPr lang="en-CA" b="1" dirty="0"/>
+          </a:p>
+        </p:txBody>
+      </p:sp>
+      <p:pic>
+        <p:nvPicPr>
+          <p:cNvPr id="8" name="Content Placeholder 7">
+            <a:extLst>
+              <a:ext uri="{FF2B5EF4-FFF2-40B4-BE49-F238E27FC236}">
+                <a16:creationId xmlns:a16="http://schemas.microsoft.com/office/drawing/2014/main" id="{0E36455B-D11C-5731-E76C-2405B1404CA8}"/>
+              </a:ext>
+            </a:extLst>
+          </p:cNvPr>
+          <p:cNvPicPr>
+            <a:picLocks noGrp="1" noChangeAspect="1"/>
+          </p:cNvPicPr>
+          <p:nvPr>
+            <p:ph idx="1"/>
+          </p:nvPr>
+        </p:nvPicPr>
+        <p:blipFill>
+          <a:blip r:embed="rId2"/>
+          <a:stretch>
+            <a:fillRect/>
+          </a:stretch>
+        </p:blipFill>
+        <p:spPr>
+          <a:xfrm>
+            <a:off x="5851525" y="1709844"/>
+            <a:ext cx="5213350" cy="3438312"/>
+          </a:xfrm>
+        </p:spPr>
+      </p:pic>
+    </p:spTree>
+    <p:extLst>
+      <p:ext uri="{BB962C8B-B14F-4D97-AF65-F5344CB8AC3E}">
+        <p14:creationId xmlns:p14="http://schemas.microsoft.com/office/powerpoint/2010/main" val="2527031289"/>
+      </p:ext>
+    </p:extLst>
+  </p:cSld>
+  <p:clrMapOvr>
+    <a:masterClrMapping/>
+  </p:clrMapOvr>
+</p:sld>
+</file>
+
+<file path=ppt/slides/slide22.xml><?xml version="1.0" encoding="utf-8"?>
+<p:sld xmlns:a="http://schemas.openxmlformats.org/drawingml/2006/main" xmlns:r="http://schemas.openxmlformats.org/officeDocument/2006/relationships" xmlns:p="http://schemas.openxmlformats.org/presentationml/2006/main">
+  <p:cSld>
+    <p:spTree>
+      <p:nvGrpSpPr>
+        <p:cNvPr id="1" name="">
+          <a:extLst>
+            <a:ext uri="{FF2B5EF4-FFF2-40B4-BE49-F238E27FC236}">
+              <a16:creationId xmlns:a16="http://schemas.microsoft.com/office/drawing/2014/main" id="{DE4C093E-3E3A-70E3-C805-E4BD9ECC814C}"/>
+            </a:ext>
+          </a:extLst>
+        </p:cNvPr>
+        <p:cNvGrpSpPr/>
+        <p:nvPr/>
+      </p:nvGrpSpPr>
+      <p:grpSpPr>
+        <a:xfrm>
+          <a:off x="0" y="0"/>
+          <a:ext cx="0" cy="0"/>
+          <a:chOff x="0" y="0"/>
+          <a:chExt cx="0" cy="0"/>
+        </a:xfrm>
+      </p:grpSpPr>
+      <p:sp>
+        <p:nvSpPr>
+          <p:cNvPr id="2" name="Title 1">
+            <a:extLst>
+              <a:ext uri="{FF2B5EF4-FFF2-40B4-BE49-F238E27FC236}">
+                <a16:creationId xmlns:a16="http://schemas.microsoft.com/office/drawing/2014/main" id="{F7C201CA-3D83-3A4B-2E58-A4D6E84EBA2E}"/>
+              </a:ext>
+            </a:extLst>
+          </p:cNvPr>
+          <p:cNvSpPr>
+            <a:spLocks noGrp="1"/>
+          </p:cNvSpPr>
+          <p:nvPr>
+            <p:ph type="title"/>
+          </p:nvPr>
+        </p:nvSpPr>
+        <p:spPr/>
+        <p:txBody>
+          <a:bodyPr/>
+          <a:lstStyle/>
+          <a:p>
+            <a:r>
+              <a:rPr lang="en-CA" dirty="0"/>
+              <a:t>Summary: Inputs</a:t>
+            </a:r>
+          </a:p>
+        </p:txBody>
+      </p:sp>
+      <p:sp>
+        <p:nvSpPr>
+          <p:cNvPr id="3" name="Content Placeholder 2">
+            <a:extLst>
+              <a:ext uri="{FF2B5EF4-FFF2-40B4-BE49-F238E27FC236}">
+                <a16:creationId xmlns:a16="http://schemas.microsoft.com/office/drawing/2014/main" id="{44BEB54D-F878-20E7-46FB-43CF582C4164}"/>
+              </a:ext>
+            </a:extLst>
+          </p:cNvPr>
+          <p:cNvSpPr>
+            <a:spLocks noGrp="1"/>
+          </p:cNvSpPr>
+          <p:nvPr>
+            <p:ph idx="1"/>
+          </p:nvPr>
+        </p:nvSpPr>
+        <p:spPr/>
+        <p:txBody>
+          <a:bodyPr/>
+          <a:lstStyle/>
+          <a:p>
+            <a:r>
+              <a:rPr lang="en-CA" dirty="0"/>
+              <a:t>We can use the </a:t>
+            </a:r>
+            <a:r>
+              <a:rPr lang="en-CA" dirty="0">
+                <a:latin typeface="Consolas" panose="020B0609020204030204" pitchFamily="49" charset="0"/>
+              </a:rPr>
+              <a:t>input</a:t>
+            </a:r>
+            <a:r>
+              <a:rPr lang="en-CA" dirty="0"/>
+              <a:t> function to ask the user to input that you can use to customize the behaviour of your program.</a:t>
+            </a:r>
+          </a:p>
+          <a:p>
+            <a:r>
+              <a:rPr lang="en-CA" dirty="0"/>
+              <a:t>To use the player’s input, remember to store it in a variable!</a:t>
+            </a:r>
+          </a:p>
+          <a:p>
+            <a:r>
+              <a:rPr lang="en-CA" dirty="0"/>
+              <a:t>If you want to use a number that your player inputted, remember to convert the input to an integer first by using the </a:t>
+            </a:r>
+            <a:r>
+              <a:rPr lang="en-CA" dirty="0">
+                <a:latin typeface="Consolas" panose="020B0609020204030204" pitchFamily="49" charset="0"/>
+              </a:rPr>
+              <a:t>int</a:t>
+            </a:r>
+            <a:r>
+              <a:rPr lang="en-CA" dirty="0"/>
+              <a:t> function!</a:t>
+            </a:r>
+          </a:p>
+        </p:txBody>
+      </p:sp>
+    </p:spTree>
+    <p:extLst>
+      <p:ext uri="{BB962C8B-B14F-4D97-AF65-F5344CB8AC3E}">
+        <p14:creationId xmlns:p14="http://schemas.microsoft.com/office/powerpoint/2010/main" val="1768162994"/>
+      </p:ext>
+    </p:extLst>
+  </p:cSld>
+  <p:clrMapOvr>
+    <a:masterClrMapping/>
+  </p:clrMapOvr>
+</p:sld>
+</file>
+
+<file path=ppt/slides/slide23.xml><?xml version="1.0" encoding="utf-8"?>
+<p:sld xmlns:a="http://schemas.openxmlformats.org/drawingml/2006/main" xmlns:r="http://schemas.openxmlformats.org/officeDocument/2006/relationships" xmlns:p="http://schemas.openxmlformats.org/presentationml/2006/main">
+  <p:cSld>
+    <p:spTree>
+      <p:nvGrpSpPr>
+        <p:cNvPr id="1" name=""/>
+        <p:cNvGrpSpPr/>
+        <p:nvPr/>
+      </p:nvGrpSpPr>
+      <p:grpSpPr>
+        <a:xfrm>
+          <a:off x="0" y="0"/>
+          <a:ext cx="0" cy="0"/>
+          <a:chOff x="0" y="0"/>
+          <a:chExt cx="0" cy="0"/>
+        </a:xfrm>
+      </p:grpSpPr>
+      <p:sp>
+        <p:nvSpPr>
+          <p:cNvPr id="2" name="Title 1">
+            <a:extLst>
+              <a:ext uri="{FF2B5EF4-FFF2-40B4-BE49-F238E27FC236}">
+                <a16:creationId xmlns:a16="http://schemas.microsoft.com/office/drawing/2014/main" id="{BC594031-05C0-F774-5565-70E86424CBAA}"/>
+              </a:ext>
+            </a:extLst>
+          </p:cNvPr>
+          <p:cNvSpPr>
+            <a:spLocks noGrp="1"/>
+          </p:cNvSpPr>
+          <p:nvPr>
+            <p:ph type="ctrTitle"/>
+          </p:nvPr>
+        </p:nvSpPr>
+        <p:spPr/>
+        <p:txBody>
+          <a:bodyPr/>
+          <a:lstStyle/>
+          <a:p>
+            <a:r>
+              <a:rPr lang="en-CA" dirty="0"/>
+              <a:t>Project Time!</a:t>
+            </a:r>
+          </a:p>
+        </p:txBody>
+      </p:sp>
+      <p:sp>
+        <p:nvSpPr>
+          <p:cNvPr id="3" name="Subtitle 2">
+            <a:extLst>
+              <a:ext uri="{FF2B5EF4-FFF2-40B4-BE49-F238E27FC236}">
+                <a16:creationId xmlns:a16="http://schemas.microsoft.com/office/drawing/2014/main" id="{AE75AB3B-5876-932A-0763-B4A4FCE47C51}"/>
+              </a:ext>
+            </a:extLst>
+          </p:cNvPr>
+          <p:cNvSpPr>
+            <a:spLocks noGrp="1"/>
+          </p:cNvSpPr>
+          <p:nvPr>
+            <p:ph type="subTitle" idx="1"/>
+          </p:nvPr>
+        </p:nvSpPr>
+        <p:spPr/>
+        <p:txBody>
+          <a:bodyPr/>
+          <a:lstStyle/>
+          <a:p>
+            <a:r>
+              <a:rPr lang="en-CA" dirty="0"/>
+              <a:t>Mad Libs!</a:t>
+            </a:r>
+          </a:p>
+        </p:txBody>
+      </p:sp>
+    </p:spTree>
+    <p:extLst>
+      <p:ext uri="{BB962C8B-B14F-4D97-AF65-F5344CB8AC3E}">
+        <p14:creationId xmlns:p14="http://schemas.microsoft.com/office/powerpoint/2010/main" val="3727397199"/>
       </p:ext>
     </p:extLst>
   </p:cSld>
@@ -4323,6 +7567,42 @@
           </a:p>
         </p:txBody>
       </p:sp>
+      <p:pic>
+        <p:nvPicPr>
+          <p:cNvPr id="6" name="Graphic 5" descr="Server outline">
+            <a:extLst>
+              <a:ext uri="{FF2B5EF4-FFF2-40B4-BE49-F238E27FC236}">
+                <a16:creationId xmlns:a16="http://schemas.microsoft.com/office/drawing/2014/main" id="{B68FD70F-A4A2-DE95-EFB1-249C3EE107AE}"/>
+              </a:ext>
+            </a:extLst>
+          </p:cNvPr>
+          <p:cNvPicPr>
+            <a:picLocks noChangeAspect="1"/>
+          </p:cNvPicPr>
+          <p:nvPr/>
+        </p:nvPicPr>
+        <p:blipFill>
+          <a:blip r:embed="rId2">
+            <a:extLst>
+              <a:ext uri="{96DAC541-7B7A-43D3-8B79-37D633B846F1}">
+                <asvg:svgBlip xmlns:asvg="http://schemas.microsoft.com/office/drawing/2016/SVG/main" r:embed="rId3"/>
+              </a:ext>
+            </a:extLst>
+          </a:blip>
+          <a:stretch>
+            <a:fillRect/>
+          </a:stretch>
+        </p:blipFill>
+        <p:spPr>
+          <a:xfrm>
+            <a:off x="9111343" y="4103915"/>
+            <a:ext cx="2601684" cy="2601684"/>
+          </a:xfrm>
+          <a:prstGeom prst="rect">
+            <a:avLst/>
+          </a:prstGeom>
+        </p:spPr>
+      </p:pic>
     </p:spTree>
     <p:extLst>
       <p:ext uri="{BB962C8B-B14F-4D97-AF65-F5344CB8AC3E}">
@@ -4571,11 +7851,13 @@
             </a:r>
             <a:r>
               <a:rPr lang="en-CA" dirty="0"/>
-              <a:t>, including features like the interactive Python section</a:t>
-            </a:r>
-            <a:r>
-              <a:rPr lang="en-CA"/>
-              <a:t>, Run code, and </a:t>
+              <a:t>, including features like the interactive Python section, Run code, and how to save files.</a:t>
+            </a:r>
+          </a:p>
+          <a:p>
+            <a:r>
+              <a:rPr lang="en-CA" dirty="0"/>
+              <a:t>Wait to see how the IDE appears on the Dojo computers before making the slide(s)</a:t>
             </a:r>
           </a:p>
         </p:txBody>
@@ -4584,6 +7866,804 @@
     <p:extLst>
       <p:ext uri="{BB962C8B-B14F-4D97-AF65-F5344CB8AC3E}">
         <p14:creationId xmlns:p14="http://schemas.microsoft.com/office/powerpoint/2010/main" val="1363732710"/>
+      </p:ext>
+    </p:extLst>
+  </p:cSld>
+  <p:clrMapOvr>
+    <a:masterClrMapping/>
+  </p:clrMapOvr>
+</p:sld>
+</file>
+
+<file path=ppt/slides/slide6.xml><?xml version="1.0" encoding="utf-8"?>
+<p:sld xmlns:a="http://schemas.openxmlformats.org/drawingml/2006/main" xmlns:r="http://schemas.openxmlformats.org/officeDocument/2006/relationships" xmlns:p="http://schemas.openxmlformats.org/presentationml/2006/main">
+  <p:cSld>
+    <p:spTree>
+      <p:nvGrpSpPr>
+        <p:cNvPr id="1" name=""/>
+        <p:cNvGrpSpPr/>
+        <p:nvPr/>
+      </p:nvGrpSpPr>
+      <p:grpSpPr>
+        <a:xfrm>
+          <a:off x="0" y="0"/>
+          <a:ext cx="0" cy="0"/>
+          <a:chOff x="0" y="0"/>
+          <a:chExt cx="0" cy="0"/>
+        </a:xfrm>
+      </p:grpSpPr>
+      <p:sp>
+        <p:nvSpPr>
+          <p:cNvPr id="2" name="Title 1">
+            <a:extLst>
+              <a:ext uri="{FF2B5EF4-FFF2-40B4-BE49-F238E27FC236}">
+                <a16:creationId xmlns:a16="http://schemas.microsoft.com/office/drawing/2014/main" id="{573615FD-F95C-84F6-EE91-8545437E113C}"/>
+              </a:ext>
+            </a:extLst>
+          </p:cNvPr>
+          <p:cNvSpPr>
+            <a:spLocks noGrp="1"/>
+          </p:cNvSpPr>
+          <p:nvPr>
+            <p:ph type="title"/>
+          </p:nvPr>
+        </p:nvSpPr>
+        <p:spPr/>
+        <p:txBody>
+          <a:bodyPr/>
+          <a:lstStyle/>
+          <a:p>
+            <a:r>
+              <a:rPr lang="en-CA" dirty="0"/>
+              <a:t>Python Basics</a:t>
+            </a:r>
+          </a:p>
+        </p:txBody>
+      </p:sp>
+      <p:sp>
+        <p:nvSpPr>
+          <p:cNvPr id="3" name="Text Placeholder 2">
+            <a:extLst>
+              <a:ext uri="{FF2B5EF4-FFF2-40B4-BE49-F238E27FC236}">
+                <a16:creationId xmlns:a16="http://schemas.microsoft.com/office/drawing/2014/main" id="{B24739C6-7DB5-4F10-F332-62756ADC1BCF}"/>
+              </a:ext>
+            </a:extLst>
+          </p:cNvPr>
+          <p:cNvSpPr>
+            <a:spLocks noGrp="1"/>
+          </p:cNvSpPr>
+          <p:nvPr>
+            <p:ph type="body" idx="1"/>
+          </p:nvPr>
+        </p:nvSpPr>
+        <p:spPr/>
+        <p:txBody>
+          <a:bodyPr/>
+          <a:lstStyle/>
+          <a:p>
+            <a:r>
+              <a:rPr lang="en-CA" dirty="0"/>
+              <a:t>Strings, integers, and the </a:t>
+            </a:r>
+            <a:r>
+              <a:rPr lang="en-CA" dirty="0">
+                <a:latin typeface="Consolas" panose="020B0609020204030204" pitchFamily="49" charset="0"/>
+              </a:rPr>
+              <a:t>print</a:t>
+            </a:r>
+            <a:r>
+              <a:rPr lang="en-CA" dirty="0"/>
+              <a:t> statement</a:t>
+            </a:r>
+          </a:p>
+          <a:p>
+            <a:endParaRPr lang="en-CA" dirty="0"/>
+          </a:p>
+        </p:txBody>
+      </p:sp>
+    </p:spTree>
+    <p:extLst>
+      <p:ext uri="{BB962C8B-B14F-4D97-AF65-F5344CB8AC3E}">
+        <p14:creationId xmlns:p14="http://schemas.microsoft.com/office/powerpoint/2010/main" val="2612894566"/>
+      </p:ext>
+    </p:extLst>
+  </p:cSld>
+  <p:clrMapOvr>
+    <a:masterClrMapping/>
+  </p:clrMapOvr>
+</p:sld>
+</file>
+
+<file path=ppt/slides/slide7.xml><?xml version="1.0" encoding="utf-8"?>
+<p:sld xmlns:a="http://schemas.openxmlformats.org/drawingml/2006/main" xmlns:r="http://schemas.openxmlformats.org/officeDocument/2006/relationships" xmlns:p="http://schemas.openxmlformats.org/presentationml/2006/main">
+  <p:cSld>
+    <p:spTree>
+      <p:nvGrpSpPr>
+        <p:cNvPr id="1" name=""/>
+        <p:cNvGrpSpPr/>
+        <p:nvPr/>
+      </p:nvGrpSpPr>
+      <p:grpSpPr>
+        <a:xfrm>
+          <a:off x="0" y="0"/>
+          <a:ext cx="0" cy="0"/>
+          <a:chOff x="0" y="0"/>
+          <a:chExt cx="0" cy="0"/>
+        </a:xfrm>
+      </p:grpSpPr>
+      <p:sp>
+        <p:nvSpPr>
+          <p:cNvPr id="2" name="Title 1">
+            <a:extLst>
+              <a:ext uri="{FF2B5EF4-FFF2-40B4-BE49-F238E27FC236}">
+                <a16:creationId xmlns:a16="http://schemas.microsoft.com/office/drawing/2014/main" id="{20A681A3-70AE-BA1F-20B2-A91264840404}"/>
+              </a:ext>
+            </a:extLst>
+          </p:cNvPr>
+          <p:cNvSpPr>
+            <a:spLocks noGrp="1"/>
+          </p:cNvSpPr>
+          <p:nvPr>
+            <p:ph type="title"/>
+          </p:nvPr>
+        </p:nvSpPr>
+        <p:spPr>
+          <a:xfrm>
+            <a:off x="1143000" y="1097280"/>
+            <a:ext cx="3931920" cy="851263"/>
+          </a:xfrm>
+        </p:spPr>
+        <p:txBody>
+          <a:bodyPr/>
+          <a:lstStyle/>
+          <a:p>
+            <a:r>
+              <a:rPr lang="en-CA" dirty="0"/>
+              <a:t>Hello, World!</a:t>
+            </a:r>
+          </a:p>
+        </p:txBody>
+      </p:sp>
+      <p:sp>
+        <p:nvSpPr>
+          <p:cNvPr id="4" name="Text Placeholder 3">
+            <a:extLst>
+              <a:ext uri="{FF2B5EF4-FFF2-40B4-BE49-F238E27FC236}">
+                <a16:creationId xmlns:a16="http://schemas.microsoft.com/office/drawing/2014/main" id="{1A1876A9-055D-8AB3-5864-DBD6E0F3B6AB}"/>
+              </a:ext>
+            </a:extLst>
+          </p:cNvPr>
+          <p:cNvSpPr>
+            <a:spLocks noGrp="1"/>
+          </p:cNvSpPr>
+          <p:nvPr>
+            <p:ph type="body" sz="half" idx="2"/>
+          </p:nvPr>
+        </p:nvSpPr>
+        <p:spPr>
+          <a:xfrm>
+            <a:off x="1143000" y="2090057"/>
+            <a:ext cx="3931920" cy="3762103"/>
+          </a:xfrm>
+        </p:spPr>
+        <p:txBody>
+          <a:bodyPr/>
+          <a:lstStyle/>
+          <a:p>
+            <a:pPr marL="285750" indent="-285750">
+              <a:buFont typeface="Arial" panose="020B0604020202020204" pitchFamily="34" charset="0"/>
+              <a:buChar char="•"/>
+            </a:pPr>
+            <a:r>
+              <a:rPr lang="en-CA" dirty="0"/>
+              <a:t>To print something onto our screens, we need to use the </a:t>
+            </a:r>
+            <a:r>
+              <a:rPr lang="en-CA" b="1" dirty="0">
+                <a:latin typeface="Consolas" panose="020B0609020204030204" pitchFamily="49" charset="0"/>
+              </a:rPr>
+              <a:t>print</a:t>
+            </a:r>
+            <a:r>
+              <a:rPr lang="en-CA" dirty="0"/>
+              <a:t> function.</a:t>
+            </a:r>
+          </a:p>
+          <a:p>
+            <a:endParaRPr lang="en-CA" dirty="0"/>
+          </a:p>
+          <a:p>
+            <a:pPr marL="285750" indent="-285750">
+              <a:buFont typeface="Arial" panose="020B0604020202020204" pitchFamily="34" charset="0"/>
+              <a:buChar char="•"/>
+            </a:pPr>
+            <a:r>
+              <a:rPr lang="en-CA" dirty="0"/>
+              <a:t>We also need to put the text that we want to print between “quotation marks”</a:t>
+            </a:r>
+          </a:p>
+          <a:p>
+            <a:pPr marL="285750" indent="-285750">
+              <a:buFont typeface="Arial" panose="020B0604020202020204" pitchFamily="34" charset="0"/>
+              <a:buChar char="•"/>
+            </a:pPr>
+            <a:endParaRPr lang="en-CA" dirty="0"/>
+          </a:p>
+          <a:p>
+            <a:pPr marL="285750" indent="-285750">
+              <a:buFont typeface="Arial" panose="020B0604020202020204" pitchFamily="34" charset="0"/>
+              <a:buChar char="•"/>
+            </a:pPr>
+            <a:r>
+              <a:rPr lang="en-CA" dirty="0"/>
+              <a:t>If we forget the “quotation marks”, we will get an </a:t>
+            </a:r>
+            <a:r>
+              <a:rPr lang="en-CA" dirty="0">
+                <a:solidFill>
+                  <a:srgbClr val="FF0000"/>
+                </a:solidFill>
+              </a:rPr>
+              <a:t>error</a:t>
+            </a:r>
+            <a:endParaRPr lang="en-CA" dirty="0"/>
+          </a:p>
+        </p:txBody>
+      </p:sp>
+      <p:pic>
+        <p:nvPicPr>
+          <p:cNvPr id="14" name="Content Placeholder 13">
+            <a:extLst>
+              <a:ext uri="{FF2B5EF4-FFF2-40B4-BE49-F238E27FC236}">
+                <a16:creationId xmlns:a16="http://schemas.microsoft.com/office/drawing/2014/main" id="{2D753413-E486-569A-6E39-E888D5F16786}"/>
+              </a:ext>
+            </a:extLst>
+          </p:cNvPr>
+          <p:cNvPicPr>
+            <a:picLocks noGrp="1" noChangeAspect="1"/>
+          </p:cNvPicPr>
+          <p:nvPr>
+            <p:ph idx="1"/>
+          </p:nvPr>
+        </p:nvPicPr>
+        <p:blipFill>
+          <a:blip r:embed="rId2"/>
+          <a:stretch>
+            <a:fillRect/>
+          </a:stretch>
+        </p:blipFill>
+        <p:spPr>
+          <a:xfrm>
+            <a:off x="5851525" y="1687913"/>
+            <a:ext cx="5213350" cy="3482174"/>
+          </a:xfrm>
+        </p:spPr>
+      </p:pic>
+    </p:spTree>
+    <p:extLst>
+      <p:ext uri="{BB962C8B-B14F-4D97-AF65-F5344CB8AC3E}">
+        <p14:creationId xmlns:p14="http://schemas.microsoft.com/office/powerpoint/2010/main" val="333081405"/>
+      </p:ext>
+    </p:extLst>
+  </p:cSld>
+  <p:clrMapOvr>
+    <a:masterClrMapping/>
+  </p:clrMapOvr>
+</p:sld>
+</file>
+
+<file path=ppt/slides/slide8.xml><?xml version="1.0" encoding="utf-8"?>
+<p:sld xmlns:a="http://schemas.openxmlformats.org/drawingml/2006/main" xmlns:r="http://schemas.openxmlformats.org/officeDocument/2006/relationships" xmlns:p="http://schemas.openxmlformats.org/presentationml/2006/main">
+  <p:cSld>
+    <p:spTree>
+      <p:nvGrpSpPr>
+        <p:cNvPr id="1" name="">
+          <a:extLst>
+            <a:ext uri="{FF2B5EF4-FFF2-40B4-BE49-F238E27FC236}">
+              <a16:creationId xmlns:a16="http://schemas.microsoft.com/office/drawing/2014/main" id="{9D8008F9-31C2-13AC-1ECE-E5921FF08A57}"/>
+            </a:ext>
+          </a:extLst>
+        </p:cNvPr>
+        <p:cNvGrpSpPr/>
+        <p:nvPr/>
+      </p:nvGrpSpPr>
+      <p:grpSpPr>
+        <a:xfrm>
+          <a:off x="0" y="0"/>
+          <a:ext cx="0" cy="0"/>
+          <a:chOff x="0" y="0"/>
+          <a:chExt cx="0" cy="0"/>
+        </a:xfrm>
+      </p:grpSpPr>
+      <p:sp>
+        <p:nvSpPr>
+          <p:cNvPr id="2" name="Title 1">
+            <a:extLst>
+              <a:ext uri="{FF2B5EF4-FFF2-40B4-BE49-F238E27FC236}">
+                <a16:creationId xmlns:a16="http://schemas.microsoft.com/office/drawing/2014/main" id="{474D8639-843F-78DB-81DB-EBCDAD1ACEE5}"/>
+              </a:ext>
+            </a:extLst>
+          </p:cNvPr>
+          <p:cNvSpPr>
+            <a:spLocks noGrp="1"/>
+          </p:cNvSpPr>
+          <p:nvPr>
+            <p:ph type="title"/>
+          </p:nvPr>
+        </p:nvSpPr>
+        <p:spPr>
+          <a:xfrm>
+            <a:off x="1143000" y="1097280"/>
+            <a:ext cx="3931920" cy="851263"/>
+          </a:xfrm>
+        </p:spPr>
+        <p:txBody>
+          <a:bodyPr/>
+          <a:lstStyle/>
+          <a:p>
+            <a:r>
+              <a:rPr lang="en-CA" dirty="0"/>
+              <a:t>Strings</a:t>
+            </a:r>
+          </a:p>
+        </p:txBody>
+      </p:sp>
+      <p:sp>
+        <p:nvSpPr>
+          <p:cNvPr id="4" name="Text Placeholder 3">
+            <a:extLst>
+              <a:ext uri="{FF2B5EF4-FFF2-40B4-BE49-F238E27FC236}">
+                <a16:creationId xmlns:a16="http://schemas.microsoft.com/office/drawing/2014/main" id="{E62A04F8-BFC6-BF6D-DF8E-72AB00E76264}"/>
+              </a:ext>
+            </a:extLst>
+          </p:cNvPr>
+          <p:cNvSpPr>
+            <a:spLocks noGrp="1"/>
+          </p:cNvSpPr>
+          <p:nvPr>
+            <p:ph type="body" sz="half" idx="2"/>
+          </p:nvPr>
+        </p:nvSpPr>
+        <p:spPr>
+          <a:xfrm>
+            <a:off x="1143000" y="2090057"/>
+            <a:ext cx="3931920" cy="3762103"/>
+          </a:xfrm>
+        </p:spPr>
+        <p:txBody>
+          <a:bodyPr/>
+          <a:lstStyle/>
+          <a:p>
+            <a:pPr marL="285750" indent="-285750">
+              <a:buFont typeface="Arial" panose="020B0604020202020204" pitchFamily="34" charset="0"/>
+              <a:buChar char="•"/>
+            </a:pPr>
+            <a:r>
+              <a:rPr lang="en-CA" dirty="0"/>
+              <a:t>When we wrap text between “quotation marks”, we create something in Python called a </a:t>
+            </a:r>
+            <a:r>
+              <a:rPr lang="en-CA" b="1" dirty="0"/>
+              <a:t>string</a:t>
+            </a:r>
+          </a:p>
+          <a:p>
+            <a:pPr marL="285750" indent="-285750">
+              <a:buFont typeface="Arial" panose="020B0604020202020204" pitchFamily="34" charset="0"/>
+              <a:buChar char="•"/>
+            </a:pPr>
+            <a:endParaRPr lang="en-CA" dirty="0"/>
+          </a:p>
+          <a:p>
+            <a:pPr marL="285750" indent="-285750">
+              <a:buFont typeface="Arial" panose="020B0604020202020204" pitchFamily="34" charset="0"/>
+              <a:buChar char="•"/>
+            </a:pPr>
+            <a:r>
+              <a:rPr lang="en-CA" dirty="0"/>
+              <a:t>A </a:t>
+            </a:r>
+            <a:r>
+              <a:rPr lang="en-CA" b="1" dirty="0"/>
+              <a:t>string</a:t>
+            </a:r>
+            <a:r>
+              <a:rPr lang="en-CA" dirty="0"/>
+              <a:t> is just a fancy word for text</a:t>
+            </a:r>
+          </a:p>
+          <a:p>
+            <a:pPr marL="285750" indent="-285750">
+              <a:buFont typeface="Arial" panose="020B0604020202020204" pitchFamily="34" charset="0"/>
+              <a:buChar char="•"/>
+            </a:pPr>
+            <a:endParaRPr lang="en-CA" dirty="0"/>
+          </a:p>
+          <a:p>
+            <a:pPr marL="285750" indent="-285750">
+              <a:buFont typeface="Arial" panose="020B0604020202020204" pitchFamily="34" charset="0"/>
+              <a:buChar char="•"/>
+            </a:pPr>
+            <a:r>
+              <a:rPr lang="en-CA" dirty="0"/>
+              <a:t>Usually, the </a:t>
+            </a:r>
+            <a:r>
+              <a:rPr lang="en-CA" dirty="0">
+                <a:latin typeface="Consolas" panose="020B0609020204030204" pitchFamily="49" charset="0"/>
+              </a:rPr>
+              <a:t>print</a:t>
+            </a:r>
+            <a:r>
+              <a:rPr lang="en-CA" dirty="0"/>
+              <a:t> function can only print strings</a:t>
+            </a:r>
+          </a:p>
+        </p:txBody>
+      </p:sp>
+      <p:sp>
+        <p:nvSpPr>
+          <p:cNvPr id="7" name="Speech Bubble: Rectangle 6">
+            <a:extLst>
+              <a:ext uri="{FF2B5EF4-FFF2-40B4-BE49-F238E27FC236}">
+                <a16:creationId xmlns:a16="http://schemas.microsoft.com/office/drawing/2014/main" id="{78C4DF87-C0F0-3603-16AC-242B7A664008}"/>
+              </a:ext>
+            </a:extLst>
+          </p:cNvPr>
+          <p:cNvSpPr/>
+          <p:nvPr/>
+        </p:nvSpPr>
+        <p:spPr>
+          <a:xfrm>
+            <a:off x="6292317" y="1284117"/>
+            <a:ext cx="2438025" cy="612648"/>
+          </a:xfrm>
+          <a:prstGeom prst="wedgeRectCallout">
+            <a:avLst>
+              <a:gd name="adj1" fmla="val -48213"/>
+              <a:gd name="adj2" fmla="val 110475"/>
+            </a:avLst>
+          </a:prstGeom>
+          <a:solidFill>
+            <a:schemeClr val="accent2"/>
+          </a:solidFill>
+        </p:spPr>
+        <p:style>
+          <a:lnRef idx="2">
+            <a:schemeClr val="accent1">
+              <a:shade val="15000"/>
+            </a:schemeClr>
+          </a:lnRef>
+          <a:fillRef idx="1">
+            <a:schemeClr val="accent1"/>
+          </a:fillRef>
+          <a:effectRef idx="0">
+            <a:schemeClr val="accent1"/>
+          </a:effectRef>
+          <a:fontRef idx="minor">
+            <a:schemeClr val="lt1"/>
+          </a:fontRef>
+        </p:style>
+        <p:txBody>
+          <a:bodyPr rtlCol="0" anchor="ctr"/>
+          <a:lstStyle/>
+          <a:p>
+            <a:pPr algn="ctr"/>
+            <a:r>
+              <a:rPr lang="en-CA" dirty="0"/>
+              <a:t>“Hello, World!”</a:t>
+            </a:r>
+          </a:p>
+        </p:txBody>
+      </p:sp>
+      <p:sp>
+        <p:nvSpPr>
+          <p:cNvPr id="9" name="Speech Bubble: Rectangle 8">
+            <a:extLst>
+              <a:ext uri="{FF2B5EF4-FFF2-40B4-BE49-F238E27FC236}">
+                <a16:creationId xmlns:a16="http://schemas.microsoft.com/office/drawing/2014/main" id="{BDAAB18C-EFC9-CA6E-7B9E-2D960D7D244B}"/>
+              </a:ext>
+            </a:extLst>
+          </p:cNvPr>
+          <p:cNvSpPr/>
+          <p:nvPr/>
+        </p:nvSpPr>
+        <p:spPr>
+          <a:xfrm>
+            <a:off x="8044543" y="2340031"/>
+            <a:ext cx="2832273" cy="612648"/>
+          </a:xfrm>
+          <a:prstGeom prst="wedgeRectCallout">
+            <a:avLst>
+              <a:gd name="adj1" fmla="val 48230"/>
+              <a:gd name="adj2" fmla="val 124689"/>
+            </a:avLst>
+          </a:prstGeom>
+          <a:solidFill>
+            <a:schemeClr val="accent2"/>
+          </a:solidFill>
+        </p:spPr>
+        <p:style>
+          <a:lnRef idx="2">
+            <a:schemeClr val="accent1">
+              <a:shade val="15000"/>
+            </a:schemeClr>
+          </a:lnRef>
+          <a:fillRef idx="1">
+            <a:schemeClr val="accent1"/>
+          </a:fillRef>
+          <a:effectRef idx="0">
+            <a:schemeClr val="accent1"/>
+          </a:effectRef>
+          <a:fontRef idx="minor">
+            <a:schemeClr val="lt1"/>
+          </a:fontRef>
+        </p:style>
+        <p:txBody>
+          <a:bodyPr rtlCol="0" anchor="ctr"/>
+          <a:lstStyle/>
+          <a:p>
+            <a:pPr algn="ctr"/>
+            <a:r>
+              <a:rPr lang="en-CA" dirty="0"/>
+              <a:t>“Code Ninjas is the best”</a:t>
+            </a:r>
+          </a:p>
+        </p:txBody>
+      </p:sp>
+      <p:sp>
+        <p:nvSpPr>
+          <p:cNvPr id="10" name="Speech Bubble: Rectangle 9">
+            <a:extLst>
+              <a:ext uri="{FF2B5EF4-FFF2-40B4-BE49-F238E27FC236}">
+                <a16:creationId xmlns:a16="http://schemas.microsoft.com/office/drawing/2014/main" id="{D78B54C2-E135-925D-749F-3979B988A44A}"/>
+              </a:ext>
+            </a:extLst>
+          </p:cNvPr>
+          <p:cNvSpPr/>
+          <p:nvPr/>
+        </p:nvSpPr>
+        <p:spPr>
+          <a:xfrm>
+            <a:off x="6292316" y="3582782"/>
+            <a:ext cx="2438025" cy="612648"/>
+          </a:xfrm>
+          <a:prstGeom prst="wedgeRectCallout">
+            <a:avLst>
+              <a:gd name="adj1" fmla="val -48213"/>
+              <a:gd name="adj2" fmla="val 110475"/>
+            </a:avLst>
+          </a:prstGeom>
+          <a:solidFill>
+            <a:schemeClr val="accent2"/>
+          </a:solidFill>
+        </p:spPr>
+        <p:style>
+          <a:lnRef idx="2">
+            <a:schemeClr val="accent1">
+              <a:shade val="15000"/>
+            </a:schemeClr>
+          </a:lnRef>
+          <a:fillRef idx="1">
+            <a:schemeClr val="accent1"/>
+          </a:fillRef>
+          <a:effectRef idx="0">
+            <a:schemeClr val="accent1"/>
+          </a:effectRef>
+          <a:fontRef idx="minor">
+            <a:schemeClr val="lt1"/>
+          </a:fontRef>
+        </p:style>
+        <p:txBody>
+          <a:bodyPr rtlCol="0" anchor="ctr"/>
+          <a:lstStyle/>
+          <a:p>
+            <a:pPr algn="ctr"/>
+            <a:r>
+              <a:rPr lang="en-CA" dirty="0"/>
+              <a:t>“abc123xyz”</a:t>
+            </a:r>
+          </a:p>
+        </p:txBody>
+      </p:sp>
+    </p:spTree>
+    <p:extLst>
+      <p:ext uri="{BB962C8B-B14F-4D97-AF65-F5344CB8AC3E}">
+        <p14:creationId xmlns:p14="http://schemas.microsoft.com/office/powerpoint/2010/main" val="1648925334"/>
+      </p:ext>
+    </p:extLst>
+  </p:cSld>
+  <p:clrMapOvr>
+    <a:masterClrMapping/>
+  </p:clrMapOvr>
+</p:sld>
+</file>
+
+<file path=ppt/slides/slide9.xml><?xml version="1.0" encoding="utf-8"?>
+<p:sld xmlns:a="http://schemas.openxmlformats.org/drawingml/2006/main" xmlns:r="http://schemas.openxmlformats.org/officeDocument/2006/relationships" xmlns:p="http://schemas.openxmlformats.org/presentationml/2006/main">
+  <p:cSld>
+    <p:spTree>
+      <p:nvGrpSpPr>
+        <p:cNvPr id="1" name="">
+          <a:extLst>
+            <a:ext uri="{FF2B5EF4-FFF2-40B4-BE49-F238E27FC236}">
+              <a16:creationId xmlns:a16="http://schemas.microsoft.com/office/drawing/2014/main" id="{F680DBEF-7518-21FB-159A-62C9880FBD83}"/>
+            </a:ext>
+          </a:extLst>
+        </p:cNvPr>
+        <p:cNvGrpSpPr/>
+        <p:nvPr/>
+      </p:nvGrpSpPr>
+      <p:grpSpPr>
+        <a:xfrm>
+          <a:off x="0" y="0"/>
+          <a:ext cx="0" cy="0"/>
+          <a:chOff x="0" y="0"/>
+          <a:chExt cx="0" cy="0"/>
+        </a:xfrm>
+      </p:grpSpPr>
+      <p:sp>
+        <p:nvSpPr>
+          <p:cNvPr id="2" name="Title 1">
+            <a:extLst>
+              <a:ext uri="{FF2B5EF4-FFF2-40B4-BE49-F238E27FC236}">
+                <a16:creationId xmlns:a16="http://schemas.microsoft.com/office/drawing/2014/main" id="{5AF9285D-2D7A-0EC9-39BC-AEA0A90163B8}"/>
+              </a:ext>
+            </a:extLst>
+          </p:cNvPr>
+          <p:cNvSpPr>
+            <a:spLocks noGrp="1"/>
+          </p:cNvSpPr>
+          <p:nvPr>
+            <p:ph type="title"/>
+          </p:nvPr>
+        </p:nvSpPr>
+        <p:spPr>
+          <a:xfrm>
+            <a:off x="1143000" y="1097280"/>
+            <a:ext cx="3931920" cy="851263"/>
+          </a:xfrm>
+        </p:spPr>
+        <p:txBody>
+          <a:bodyPr/>
+          <a:lstStyle/>
+          <a:p>
+            <a:r>
+              <a:rPr lang="en-CA"/>
+              <a:t>Combining Strings</a:t>
+            </a:r>
+            <a:endParaRPr lang="en-CA" dirty="0"/>
+          </a:p>
+        </p:txBody>
+      </p:sp>
+      <p:sp>
+        <p:nvSpPr>
+          <p:cNvPr id="4" name="Text Placeholder 3">
+            <a:extLst>
+              <a:ext uri="{FF2B5EF4-FFF2-40B4-BE49-F238E27FC236}">
+                <a16:creationId xmlns:a16="http://schemas.microsoft.com/office/drawing/2014/main" id="{5A03E529-1997-FDB7-77C7-A311E1875715}"/>
+              </a:ext>
+            </a:extLst>
+          </p:cNvPr>
+          <p:cNvSpPr>
+            <a:spLocks noGrp="1"/>
+          </p:cNvSpPr>
+          <p:nvPr>
+            <p:ph type="body" sz="half" idx="2"/>
+          </p:nvPr>
+        </p:nvSpPr>
+        <p:spPr>
+          <a:xfrm>
+            <a:off x="1143000" y="2090057"/>
+            <a:ext cx="3931920" cy="3762103"/>
+          </a:xfrm>
+        </p:spPr>
+        <p:txBody>
+          <a:bodyPr/>
+          <a:lstStyle/>
+          <a:p>
+            <a:pPr marL="285750" indent="-285750">
+              <a:buFont typeface="Arial" panose="020B0604020202020204" pitchFamily="34" charset="0"/>
+              <a:buChar char="•"/>
+            </a:pPr>
+            <a:r>
+              <a:rPr lang="en-CA"/>
+              <a:t>To put two strings together, we can just put a plus sign (+) between the two strings!</a:t>
+            </a:r>
+            <a:endParaRPr lang="en-CA" b="1"/>
+          </a:p>
+          <a:p>
+            <a:pPr marL="285750" indent="-285750">
+              <a:buFont typeface="Arial" panose="020B0604020202020204" pitchFamily="34" charset="0"/>
+              <a:buChar char="•"/>
+            </a:pPr>
+            <a:endParaRPr lang="en-CA"/>
+          </a:p>
+          <a:p>
+            <a:pPr marL="285750" indent="-285750">
+              <a:buFont typeface="Arial" panose="020B0604020202020204" pitchFamily="34" charset="0"/>
+              <a:buChar char="•"/>
+            </a:pPr>
+            <a:r>
+              <a:rPr lang="en-CA"/>
+              <a:t>You can also use a plus sign to put two strings together inside of a </a:t>
+            </a:r>
+            <a:r>
+              <a:rPr lang="en-CA">
+                <a:latin typeface="Consolas" panose="020B0609020204030204" pitchFamily="49" charset="0"/>
+              </a:rPr>
+              <a:t>print</a:t>
+            </a:r>
+            <a:r>
+              <a:rPr lang="en-CA"/>
+              <a:t> function.</a:t>
+            </a:r>
+          </a:p>
+          <a:p>
+            <a:pPr marL="285750" indent="-285750">
+              <a:buFont typeface="Arial" panose="020B0604020202020204" pitchFamily="34" charset="0"/>
+              <a:buChar char="•"/>
+            </a:pPr>
+            <a:endParaRPr lang="en-CA"/>
+          </a:p>
+          <a:p>
+            <a:pPr marL="285750" indent="-285750">
+              <a:buFont typeface="Arial" panose="020B0604020202020204" pitchFamily="34" charset="0"/>
+              <a:buChar char="•"/>
+            </a:pPr>
+            <a:r>
+              <a:rPr lang="en-CA">
+                <a:solidFill>
+                  <a:srgbClr val="FF0000"/>
+                </a:solidFill>
+              </a:rPr>
+              <a:t>Be careful!</a:t>
+            </a:r>
+            <a:r>
+              <a:rPr lang="en-CA"/>
+              <a:t> When you’re combining two strings together, make sure you include a space at the end of the first string!</a:t>
+            </a:r>
+            <a:endParaRPr lang="en-CA" dirty="0">
+              <a:solidFill>
+                <a:srgbClr val="FF0000"/>
+              </a:solidFill>
+            </a:endParaRPr>
+          </a:p>
+        </p:txBody>
+      </p:sp>
+      <p:pic>
+        <p:nvPicPr>
+          <p:cNvPr id="6" name="Content Placeholder 5">
+            <a:extLst>
+              <a:ext uri="{FF2B5EF4-FFF2-40B4-BE49-F238E27FC236}">
+                <a16:creationId xmlns:a16="http://schemas.microsoft.com/office/drawing/2014/main" id="{A20AC352-795A-C1F0-5907-CF7CC8C08D5B}"/>
+              </a:ext>
+            </a:extLst>
+          </p:cNvPr>
+          <p:cNvPicPr>
+            <a:picLocks noGrp="1" noChangeAspect="1"/>
+          </p:cNvPicPr>
+          <p:nvPr>
+            <p:ph idx="1"/>
+          </p:nvPr>
+        </p:nvPicPr>
+        <p:blipFill>
+          <a:blip r:embed="rId2"/>
+          <a:stretch>
+            <a:fillRect/>
+          </a:stretch>
+        </p:blipFill>
+        <p:spPr>
+          <a:xfrm>
+            <a:off x="5851525" y="1698965"/>
+            <a:ext cx="5213350" cy="3460070"/>
+          </a:xfrm>
+        </p:spPr>
+      </p:pic>
+    </p:spTree>
+    <p:extLst>
+      <p:ext uri="{BB962C8B-B14F-4D97-AF65-F5344CB8AC3E}">
+        <p14:creationId xmlns:p14="http://schemas.microsoft.com/office/powerpoint/2010/main" val="1856306127"/>
       </p:ext>
     </p:extLst>
   </p:cSld>

</xml_diff>

<commit_message>
Added folder for Course 1
</commit_message>
<xml_diff>
--- a/Intro to Python.pptx
+++ b/Intro to Python.pptx
@@ -284,16 +284,47 @@
 </p:presentation>
 </file>
 
-<file path=ppt/revisionInfo.xml><?xml version="1.0" encoding="utf-8"?>
-<p1510:revInfo xmlns:a="http://schemas.openxmlformats.org/drawingml/2006/main" xmlns:r="http://schemas.openxmlformats.org/officeDocument/2006/relationships" xmlns:p1510="http://schemas.microsoft.com/office/powerpoint/2015/10/main">
-  <p1510:revLst>
-    <p1510:client id="{224AFB37-81B3-4C06-9FE7-888E941E794D}" v="6" dt="2025-07-08T22:49:15.524"/>
-  </p1510:revLst>
-</p1510:revInfo>
-</file>
-
 <file path=ppt/changesInfos/changesInfo1.xml><?xml version="1.0" encoding="utf-8"?>
 <pc:chgInfo xmlns:a="http://schemas.openxmlformats.org/drawingml/2006/main" xmlns:r="http://schemas.openxmlformats.org/officeDocument/2006/relationships" xmlns:ac="http://schemas.microsoft.com/office/drawing/2013/main/command" xmlns:pc="http://schemas.microsoft.com/office/powerpoint/2013/main/command">
+  <pc:docChgLst>
+    <pc:chgData name="Tristin Schlauch" userId="a338a217be8c714a" providerId="LiveId" clId="{C04A9FB2-BF40-47B1-9094-2F0B5D54591A}"/>
+    <pc:docChg chg="undo custSel modSld">
+      <pc:chgData name="Tristin Schlauch" userId="a338a217be8c714a" providerId="LiveId" clId="{C04A9FB2-BF40-47B1-9094-2F0B5D54591A}" dt="2025-07-27T18:11:24.554" v="2" actId="313"/>
+      <pc:docMkLst>
+        <pc:docMk/>
+      </pc:docMkLst>
+      <pc:sldChg chg="modSp mod">
+        <pc:chgData name="Tristin Schlauch" userId="a338a217be8c714a" providerId="LiveId" clId="{C04A9FB2-BF40-47B1-9094-2F0B5D54591A}" dt="2025-07-27T18:11:24.554" v="2" actId="313"/>
+        <pc:sldMkLst>
+          <pc:docMk/>
+          <pc:sldMk cId="3485202157" sldId="283"/>
+        </pc:sldMkLst>
+        <pc:spChg chg="mod">
+          <ac:chgData name="Tristin Schlauch" userId="a338a217be8c714a" providerId="LiveId" clId="{C04A9FB2-BF40-47B1-9094-2F0B5D54591A}" dt="2025-07-27T18:11:24.554" v="2" actId="313"/>
+          <ac:spMkLst>
+            <pc:docMk/>
+            <pc:sldMk cId="3485202157" sldId="283"/>
+            <ac:spMk id="4" creationId="{42E89515-63F3-B454-37FF-9348884BF6A6}"/>
+          </ac:spMkLst>
+        </pc:spChg>
+      </pc:sldChg>
+      <pc:sldChg chg="modSp mod">
+        <pc:chgData name="Tristin Schlauch" userId="a338a217be8c714a" providerId="LiveId" clId="{C04A9FB2-BF40-47B1-9094-2F0B5D54591A}" dt="2025-07-25T23:24:07.165" v="0" actId="20577"/>
+        <pc:sldMkLst>
+          <pc:docMk/>
+          <pc:sldMk cId="4004496122" sldId="303"/>
+        </pc:sldMkLst>
+        <pc:spChg chg="mod">
+          <ac:chgData name="Tristin Schlauch" userId="a338a217be8c714a" providerId="LiveId" clId="{C04A9FB2-BF40-47B1-9094-2F0B5D54591A}" dt="2025-07-25T23:24:07.165" v="0" actId="20577"/>
+          <ac:spMkLst>
+            <pc:docMk/>
+            <pc:sldMk cId="4004496122" sldId="303"/>
+            <ac:spMk id="4" creationId="{930DA5C7-191D-1483-9670-3F1E5A5B9BD6}"/>
+          </ac:spMkLst>
+        </pc:spChg>
+      </pc:sldChg>
+    </pc:docChg>
+  </pc:docChgLst>
   <pc:docChgLst>
     <pc:chgData name="Tristin Schlauch" userId="a338a217be8c714a" providerId="LiveId" clId="{745B7E24-5365-4587-8D3A-A90B788E4913}"/>
     <pc:docChg chg="undo redo custSel addSld delSld modSld sldOrd addSection modSection">
@@ -307,22 +338,6 @@
           <pc:docMk/>
           <pc:sldMk cId="1109769617" sldId="257"/>
         </pc:sldMkLst>
-        <pc:spChg chg="mod">
-          <ac:chgData name="Tristin Schlauch" userId="a338a217be8c714a" providerId="LiveId" clId="{745B7E24-5365-4587-8D3A-A90B788E4913}" dt="2025-04-11T22:11:39.828" v="104" actId="20577"/>
-          <ac:spMkLst>
-            <pc:docMk/>
-            <pc:sldMk cId="1109769617" sldId="257"/>
-            <ac:spMk id="3" creationId="{A12318B2-D797-D3BD-8F96-CFE500DBAE22}"/>
-          </ac:spMkLst>
-        </pc:spChg>
-        <pc:picChg chg="add mod">
-          <ac:chgData name="Tristin Schlauch" userId="a338a217be8c714a" providerId="LiveId" clId="{745B7E24-5365-4587-8D3A-A90B788E4913}" dt="2025-04-11T23:35:42.993" v="3301" actId="14100"/>
-          <ac:picMkLst>
-            <pc:docMk/>
-            <pc:sldMk cId="1109769617" sldId="257"/>
-            <ac:picMk id="5" creationId="{3882A9EF-422F-6934-722F-EB3CE623898B}"/>
-          </ac:picMkLst>
-        </pc:picChg>
       </pc:sldChg>
       <pc:sldChg chg="addSp delSp modSp mod">
         <pc:chgData name="Tristin Schlauch" userId="a338a217be8c714a" providerId="LiveId" clId="{745B7E24-5365-4587-8D3A-A90B788E4913}" dt="2025-04-15T16:18:37.321" v="21467" actId="20577"/>
@@ -330,22 +345,6 @@
           <pc:docMk/>
           <pc:sldMk cId="2464511473" sldId="258"/>
         </pc:sldMkLst>
-        <pc:spChg chg="mod">
-          <ac:chgData name="Tristin Schlauch" userId="a338a217be8c714a" providerId="LiveId" clId="{745B7E24-5365-4587-8D3A-A90B788E4913}" dt="2025-04-15T16:18:37.321" v="21467" actId="20577"/>
-          <ac:spMkLst>
-            <pc:docMk/>
-            <pc:sldMk cId="2464511473" sldId="258"/>
-            <ac:spMk id="3" creationId="{BBD45FC6-C168-66C4-A7D4-649BE2A8E763}"/>
-          </ac:spMkLst>
-        </pc:spChg>
-        <pc:picChg chg="add mod">
-          <ac:chgData name="Tristin Schlauch" userId="a338a217be8c714a" providerId="LiveId" clId="{745B7E24-5365-4587-8D3A-A90B788E4913}" dt="2025-04-11T23:35:37.197" v="3300" actId="14100"/>
-          <ac:picMkLst>
-            <pc:docMk/>
-            <pc:sldMk cId="2464511473" sldId="258"/>
-            <ac:picMk id="6" creationId="{B68FD70F-A4A2-DE95-EFB1-249C3EE107AE}"/>
-          </ac:picMkLst>
-        </pc:picChg>
       </pc:sldChg>
       <pc:sldChg chg="modSp mod">
         <pc:chgData name="Tristin Schlauch" userId="a338a217be8c714a" providerId="LiveId" clId="{745B7E24-5365-4587-8D3A-A90B788E4913}" dt="2025-04-11T23:32:07.091" v="3283" actId="207"/>
@@ -353,14 +352,6 @@
           <pc:docMk/>
           <pc:sldMk cId="458471700" sldId="259"/>
         </pc:sldMkLst>
-        <pc:picChg chg="mod">
-          <ac:chgData name="Tristin Schlauch" userId="a338a217be8c714a" providerId="LiveId" clId="{745B7E24-5365-4587-8D3A-A90B788E4913}" dt="2025-04-11T23:32:07.091" v="3283" actId="207"/>
-          <ac:picMkLst>
-            <pc:docMk/>
-            <pc:sldMk cId="458471700" sldId="259"/>
-            <ac:picMk id="6" creationId="{0BB36A43-88E1-C3CA-65E4-A65623159E6C}"/>
-          </ac:picMkLst>
-        </pc:picChg>
       </pc:sldChg>
       <pc:sldChg chg="modSp mod">
         <pc:chgData name="Tristin Schlauch" userId="a338a217be8c714a" providerId="LiveId" clId="{745B7E24-5365-4587-8D3A-A90B788E4913}" dt="2025-04-11T22:09:49.520" v="100" actId="20577"/>
@@ -368,14 +359,6 @@
           <pc:docMk/>
           <pc:sldMk cId="1363732710" sldId="260"/>
         </pc:sldMkLst>
-        <pc:spChg chg="mod">
-          <ac:chgData name="Tristin Schlauch" userId="a338a217be8c714a" providerId="LiveId" clId="{745B7E24-5365-4587-8D3A-A90B788E4913}" dt="2025-04-11T22:09:49.520" v="100" actId="20577"/>
-          <ac:spMkLst>
-            <pc:docMk/>
-            <pc:sldMk cId="1363732710" sldId="260"/>
-            <ac:spMk id="3" creationId="{CC0B45B2-181F-F932-01A4-A57EFA39835A}"/>
-          </ac:spMkLst>
-        </pc:spChg>
       </pc:sldChg>
       <pc:sldChg chg="modSp new mod">
         <pc:chgData name="Tristin Schlauch" userId="a338a217be8c714a" providerId="LiveId" clId="{745B7E24-5365-4587-8D3A-A90B788E4913}" dt="2025-04-12T02:34:15.347" v="5211" actId="20577"/>
@@ -383,22 +366,6 @@
           <pc:docMk/>
           <pc:sldMk cId="2612894566" sldId="261"/>
         </pc:sldMkLst>
-        <pc:spChg chg="mod">
-          <ac:chgData name="Tristin Schlauch" userId="a338a217be8c714a" providerId="LiveId" clId="{745B7E24-5365-4587-8D3A-A90B788E4913}" dt="2025-04-11T22:12:03.321" v="118" actId="20577"/>
-          <ac:spMkLst>
-            <pc:docMk/>
-            <pc:sldMk cId="2612894566" sldId="261"/>
-            <ac:spMk id="2" creationId="{573615FD-F95C-84F6-EE91-8545437E113C}"/>
-          </ac:spMkLst>
-        </pc:spChg>
-        <pc:spChg chg="mod">
-          <ac:chgData name="Tristin Schlauch" userId="a338a217be8c714a" providerId="LiveId" clId="{745B7E24-5365-4587-8D3A-A90B788E4913}" dt="2025-04-12T02:34:15.347" v="5211" actId="20577"/>
-          <ac:spMkLst>
-            <pc:docMk/>
-            <pc:sldMk cId="2612894566" sldId="261"/>
-            <ac:spMk id="3" creationId="{B24739C6-7DB5-4F10-F332-62756ADC1BCF}"/>
-          </ac:spMkLst>
-        </pc:spChg>
       </pc:sldChg>
       <pc:sldChg chg="modSp new mod">
         <pc:chgData name="Tristin Schlauch" userId="a338a217be8c714a" providerId="LiveId" clId="{745B7E24-5365-4587-8D3A-A90B788E4913}" dt="2025-04-11T22:14:02.361" v="355" actId="20577"/>
@@ -406,22 +373,6 @@
           <pc:docMk/>
           <pc:sldMk cId="3682949838" sldId="262"/>
         </pc:sldMkLst>
-        <pc:spChg chg="mod">
-          <ac:chgData name="Tristin Schlauch" userId="a338a217be8c714a" providerId="LiveId" clId="{745B7E24-5365-4587-8D3A-A90B788E4913}" dt="2025-04-11T22:13:05.416" v="193" actId="313"/>
-          <ac:spMkLst>
-            <pc:docMk/>
-            <pc:sldMk cId="3682949838" sldId="262"/>
-            <ac:spMk id="2" creationId="{73DB35D7-E2FF-56A9-DA52-69FB5E0EC317}"/>
-          </ac:spMkLst>
-        </pc:spChg>
-        <pc:spChg chg="mod">
-          <ac:chgData name="Tristin Schlauch" userId="a338a217be8c714a" providerId="LiveId" clId="{745B7E24-5365-4587-8D3A-A90B788E4913}" dt="2025-04-11T22:14:02.361" v="355" actId="20577"/>
-          <ac:spMkLst>
-            <pc:docMk/>
-            <pc:sldMk cId="3682949838" sldId="262"/>
-            <ac:spMk id="3" creationId="{6190B831-7B12-E33F-415E-B020A5A4A560}"/>
-          </ac:spMkLst>
-        </pc:spChg>
       </pc:sldChg>
       <pc:sldChg chg="addSp delSp modSp new mod">
         <pc:chgData name="Tristin Schlauch" userId="a338a217be8c714a" providerId="LiveId" clId="{745B7E24-5365-4587-8D3A-A90B788E4913}" dt="2025-04-11T22:24:56.090" v="731" actId="113"/>
@@ -429,30 +380,6 @@
           <pc:docMk/>
           <pc:sldMk cId="333081405" sldId="263"/>
         </pc:sldMkLst>
-        <pc:spChg chg="mod">
-          <ac:chgData name="Tristin Schlauch" userId="a338a217be8c714a" providerId="LiveId" clId="{745B7E24-5365-4587-8D3A-A90B788E4913}" dt="2025-04-11T22:14:42.013" v="372" actId="14100"/>
-          <ac:spMkLst>
-            <pc:docMk/>
-            <pc:sldMk cId="333081405" sldId="263"/>
-            <ac:spMk id="2" creationId="{20A681A3-70AE-BA1F-20B2-A91264840404}"/>
-          </ac:spMkLst>
-        </pc:spChg>
-        <pc:spChg chg="mod">
-          <ac:chgData name="Tristin Schlauch" userId="a338a217be8c714a" providerId="LiveId" clId="{745B7E24-5365-4587-8D3A-A90B788E4913}" dt="2025-04-11T22:24:56.090" v="731" actId="113"/>
-          <ac:spMkLst>
-            <pc:docMk/>
-            <pc:sldMk cId="333081405" sldId="263"/>
-            <ac:spMk id="4" creationId="{1A1876A9-055D-8AB3-5864-DBD6E0F3B6AB}"/>
-          </ac:spMkLst>
-        </pc:spChg>
-        <pc:picChg chg="add mod ord">
-          <ac:chgData name="Tristin Schlauch" userId="a338a217be8c714a" providerId="LiveId" clId="{745B7E24-5365-4587-8D3A-A90B788E4913}" dt="2025-04-11T22:24:22.367" v="667" actId="22"/>
-          <ac:picMkLst>
-            <pc:docMk/>
-            <pc:sldMk cId="333081405" sldId="263"/>
-            <ac:picMk id="14" creationId="{2D753413-E486-569A-6E39-E888D5F16786}"/>
-          </ac:picMkLst>
-        </pc:picChg>
       </pc:sldChg>
       <pc:sldChg chg="new del">
         <pc:chgData name="Tristin Schlauch" userId="a338a217be8c714a" providerId="LiveId" clId="{745B7E24-5365-4587-8D3A-A90B788E4913}" dt="2025-04-11T22:27:10.805" v="733" actId="2696"/>
@@ -467,46 +394,6 @@
           <pc:docMk/>
           <pc:sldMk cId="1648925334" sldId="264"/>
         </pc:sldMkLst>
-        <pc:spChg chg="mod">
-          <ac:chgData name="Tristin Schlauch" userId="a338a217be8c714a" providerId="LiveId" clId="{745B7E24-5365-4587-8D3A-A90B788E4913}" dt="2025-04-11T22:27:18.315" v="741" actId="20577"/>
-          <ac:spMkLst>
-            <pc:docMk/>
-            <pc:sldMk cId="1648925334" sldId="264"/>
-            <ac:spMk id="2" creationId="{474D8639-843F-78DB-81DB-EBCDAD1ACEE5}"/>
-          </ac:spMkLst>
-        </pc:spChg>
-        <pc:spChg chg="mod">
-          <ac:chgData name="Tristin Schlauch" userId="a338a217be8c714a" providerId="LiveId" clId="{745B7E24-5365-4587-8D3A-A90B788E4913}" dt="2025-04-11T22:36:19.977" v="1058" actId="20577"/>
-          <ac:spMkLst>
-            <pc:docMk/>
-            <pc:sldMk cId="1648925334" sldId="264"/>
-            <ac:spMk id="4" creationId="{E62A04F8-BFC6-BF6D-DF8E-72AB00E76264}"/>
-          </ac:spMkLst>
-        </pc:spChg>
-        <pc:spChg chg="add mod">
-          <ac:chgData name="Tristin Schlauch" userId="a338a217be8c714a" providerId="LiveId" clId="{745B7E24-5365-4587-8D3A-A90B788E4913}" dt="2025-04-11T23:33:03.134" v="3285" actId="207"/>
-          <ac:spMkLst>
-            <pc:docMk/>
-            <pc:sldMk cId="1648925334" sldId="264"/>
-            <ac:spMk id="7" creationId="{78C4DF87-C0F0-3603-16AC-242B7A664008}"/>
-          </ac:spMkLst>
-        </pc:spChg>
-        <pc:spChg chg="add mod">
-          <ac:chgData name="Tristin Schlauch" userId="a338a217be8c714a" providerId="LiveId" clId="{745B7E24-5365-4587-8D3A-A90B788E4913}" dt="2025-04-11T23:33:03.134" v="3285" actId="207"/>
-          <ac:spMkLst>
-            <pc:docMk/>
-            <pc:sldMk cId="1648925334" sldId="264"/>
-            <ac:spMk id="9" creationId="{BDAAB18C-EFC9-CA6E-7B9E-2D960D7D244B}"/>
-          </ac:spMkLst>
-        </pc:spChg>
-        <pc:spChg chg="add mod">
-          <ac:chgData name="Tristin Schlauch" userId="a338a217be8c714a" providerId="LiveId" clId="{745B7E24-5365-4587-8D3A-A90B788E4913}" dt="2025-04-11T23:33:03.134" v="3285" actId="207"/>
-          <ac:spMkLst>
-            <pc:docMk/>
-            <pc:sldMk cId="1648925334" sldId="264"/>
-            <ac:spMk id="10" creationId="{D78B54C2-E135-925D-749F-3979B988A44A}"/>
-          </ac:spMkLst>
-        </pc:spChg>
       </pc:sldChg>
       <pc:sldChg chg="addSp delSp modSp add mod setBg">
         <pc:chgData name="Tristin Schlauch" userId="a338a217be8c714a" providerId="LiveId" clId="{745B7E24-5365-4587-8D3A-A90B788E4913}" dt="2025-04-11T22:41:30.847" v="1461" actId="26606"/>
@@ -514,30 +401,6 @@
           <pc:docMk/>
           <pc:sldMk cId="1856306127" sldId="265"/>
         </pc:sldMkLst>
-        <pc:spChg chg="mod">
-          <ac:chgData name="Tristin Schlauch" userId="a338a217be8c714a" providerId="LiveId" clId="{745B7E24-5365-4587-8D3A-A90B788E4913}" dt="2025-04-11T22:41:30.847" v="1461" actId="26606"/>
-          <ac:spMkLst>
-            <pc:docMk/>
-            <pc:sldMk cId="1856306127" sldId="265"/>
-            <ac:spMk id="2" creationId="{5AF9285D-2D7A-0EC9-39BC-AEA0A90163B8}"/>
-          </ac:spMkLst>
-        </pc:spChg>
-        <pc:spChg chg="mod">
-          <ac:chgData name="Tristin Schlauch" userId="a338a217be8c714a" providerId="LiveId" clId="{745B7E24-5365-4587-8D3A-A90B788E4913}" dt="2025-04-11T22:41:30.847" v="1461" actId="26606"/>
-          <ac:spMkLst>
-            <pc:docMk/>
-            <pc:sldMk cId="1856306127" sldId="265"/>
-            <ac:spMk id="4" creationId="{5A03E529-1997-FDB7-77C7-A311E1875715}"/>
-          </ac:spMkLst>
-        </pc:spChg>
-        <pc:picChg chg="add mod ord">
-          <ac:chgData name="Tristin Schlauch" userId="a338a217be8c714a" providerId="LiveId" clId="{745B7E24-5365-4587-8D3A-A90B788E4913}" dt="2025-04-11T22:41:30.847" v="1461" actId="26606"/>
-          <ac:picMkLst>
-            <pc:docMk/>
-            <pc:sldMk cId="1856306127" sldId="265"/>
-            <ac:picMk id="6" creationId="{A20AC352-795A-C1F0-5907-CF7CC8C08D5B}"/>
-          </ac:picMkLst>
-        </pc:picChg>
       </pc:sldChg>
       <pc:sldChg chg="addSp delSp modSp add mod">
         <pc:chgData name="Tristin Schlauch" userId="a338a217be8c714a" providerId="LiveId" clId="{745B7E24-5365-4587-8D3A-A90B788E4913}" dt="2025-04-11T22:59:27.856" v="1978" actId="20577"/>
@@ -545,30 +408,6 @@
           <pc:docMk/>
           <pc:sldMk cId="2295966033" sldId="266"/>
         </pc:sldMkLst>
-        <pc:spChg chg="mod">
-          <ac:chgData name="Tristin Schlauch" userId="a338a217be8c714a" providerId="LiveId" clId="{745B7E24-5365-4587-8D3A-A90B788E4913}" dt="2025-04-11T22:49:34.797" v="1648" actId="20577"/>
-          <ac:spMkLst>
-            <pc:docMk/>
-            <pc:sldMk cId="2295966033" sldId="266"/>
-            <ac:spMk id="2" creationId="{4BA2A229-2C1A-94AA-DA0E-D500825FC29F}"/>
-          </ac:spMkLst>
-        </pc:spChg>
-        <pc:spChg chg="mod">
-          <ac:chgData name="Tristin Schlauch" userId="a338a217be8c714a" providerId="LiveId" clId="{745B7E24-5365-4587-8D3A-A90B788E4913}" dt="2025-04-11T22:59:27.856" v="1978" actId="20577"/>
-          <ac:spMkLst>
-            <pc:docMk/>
-            <pc:sldMk cId="2295966033" sldId="266"/>
-            <ac:spMk id="4" creationId="{9DD9F5B0-9C00-F356-961F-F123AB2B2607}"/>
-          </ac:spMkLst>
-        </pc:spChg>
-        <pc:picChg chg="add mod ord">
-          <ac:chgData name="Tristin Schlauch" userId="a338a217be8c714a" providerId="LiveId" clId="{745B7E24-5365-4587-8D3A-A90B788E4913}" dt="2025-04-11T22:54:44.195" v="1893" actId="22"/>
-          <ac:picMkLst>
-            <pc:docMk/>
-            <pc:sldMk cId="2295966033" sldId="266"/>
-            <ac:picMk id="8" creationId="{31ABB23C-C8CD-CD14-9407-6513328013F7}"/>
-          </ac:picMkLst>
-        </pc:picChg>
       </pc:sldChg>
       <pc:sldChg chg="new del">
         <pc:chgData name="Tristin Schlauch" userId="a338a217be8c714a" providerId="LiveId" clId="{745B7E24-5365-4587-8D3A-A90B788E4913}" dt="2025-04-11T22:47:44.277" v="1463" actId="2696"/>
@@ -583,30 +422,6 @@
           <pc:docMk/>
           <pc:sldMk cId="846000198" sldId="267"/>
         </pc:sldMkLst>
-        <pc:spChg chg="mod">
-          <ac:chgData name="Tristin Schlauch" userId="a338a217be8c714a" providerId="LiveId" clId="{745B7E24-5365-4587-8D3A-A90B788E4913}" dt="2025-04-11T22:58:31.959" v="1927" actId="20577"/>
-          <ac:spMkLst>
-            <pc:docMk/>
-            <pc:sldMk cId="846000198" sldId="267"/>
-            <ac:spMk id="2" creationId="{A72BB625-0CA8-ACB9-F253-1DE85F2AEE80}"/>
-          </ac:spMkLst>
-        </pc:spChg>
-        <pc:spChg chg="mod">
-          <ac:chgData name="Tristin Schlauch" userId="a338a217be8c714a" providerId="LiveId" clId="{745B7E24-5365-4587-8D3A-A90B788E4913}" dt="2025-04-11T23:12:48.836" v="2208" actId="20577"/>
-          <ac:spMkLst>
-            <pc:docMk/>
-            <pc:sldMk cId="846000198" sldId="267"/>
-            <ac:spMk id="4" creationId="{992E0DA1-CCA6-656C-6C3B-86B0331C5728}"/>
-          </ac:spMkLst>
-        </pc:spChg>
-        <pc:picChg chg="add mod ord">
-          <ac:chgData name="Tristin Schlauch" userId="a338a217be8c714a" providerId="LiveId" clId="{745B7E24-5365-4587-8D3A-A90B788E4913}" dt="2025-04-11T23:14:38.539" v="2210" actId="22"/>
-          <ac:picMkLst>
-            <pc:docMk/>
-            <pc:sldMk cId="846000198" sldId="267"/>
-            <ac:picMk id="7" creationId="{3EAEA0B7-FB3D-236F-9839-8F2E1CB85A85}"/>
-          </ac:picMkLst>
-        </pc:picChg>
       </pc:sldChg>
       <pc:sldChg chg="addSp delSp modSp add mod">
         <pc:chgData name="Tristin Schlauch" userId="a338a217be8c714a" providerId="LiveId" clId="{745B7E24-5365-4587-8D3A-A90B788E4913}" dt="2025-04-11T23:20:14.188" v="2652" actId="22"/>
@@ -614,30 +429,6 @@
           <pc:docMk/>
           <pc:sldMk cId="3600372758" sldId="268"/>
         </pc:sldMkLst>
-        <pc:spChg chg="mod">
-          <ac:chgData name="Tristin Schlauch" userId="a338a217be8c714a" providerId="LiveId" clId="{745B7E24-5365-4587-8D3A-A90B788E4913}" dt="2025-04-11T23:15:42.273" v="2242" actId="14100"/>
-          <ac:spMkLst>
-            <pc:docMk/>
-            <pc:sldMk cId="3600372758" sldId="268"/>
-            <ac:spMk id="2" creationId="{AE2EF6B0-FA34-AD22-ECB5-FB871F799452}"/>
-          </ac:spMkLst>
-        </pc:spChg>
-        <pc:spChg chg="mod">
-          <ac:chgData name="Tristin Schlauch" userId="a338a217be8c714a" providerId="LiveId" clId="{745B7E24-5365-4587-8D3A-A90B788E4913}" dt="2025-04-11T23:18:34.306" v="2650" actId="20577"/>
-          <ac:spMkLst>
-            <pc:docMk/>
-            <pc:sldMk cId="3600372758" sldId="268"/>
-            <ac:spMk id="4" creationId="{E68EF9E0-51EC-9623-B5C7-8CA25C616083}"/>
-          </ac:spMkLst>
-        </pc:spChg>
-        <pc:picChg chg="add mod ord">
-          <ac:chgData name="Tristin Schlauch" userId="a338a217be8c714a" providerId="LiveId" clId="{745B7E24-5365-4587-8D3A-A90B788E4913}" dt="2025-04-11T23:20:14.188" v="2652" actId="22"/>
-          <ac:picMkLst>
-            <pc:docMk/>
-            <pc:sldMk cId="3600372758" sldId="268"/>
-            <ac:picMk id="8" creationId="{3C3BAE52-6DDE-AD48-B540-E37F0CAA0F76}"/>
-          </ac:picMkLst>
-        </pc:picChg>
       </pc:sldChg>
       <pc:sldChg chg="modSp new mod">
         <pc:chgData name="Tristin Schlauch" userId="a338a217be8c714a" providerId="LiveId" clId="{745B7E24-5365-4587-8D3A-A90B788E4913}" dt="2025-04-11T23:26:43.814" v="3273" actId="20577"/>
@@ -645,22 +436,6 @@
           <pc:docMk/>
           <pc:sldMk cId="2649422868" sldId="269"/>
         </pc:sldMkLst>
-        <pc:spChg chg="mod">
-          <ac:chgData name="Tristin Schlauch" userId="a338a217be8c714a" providerId="LiveId" clId="{745B7E24-5365-4587-8D3A-A90B788E4913}" dt="2025-04-11T23:21:06.325" v="2682" actId="20577"/>
-          <ac:spMkLst>
-            <pc:docMk/>
-            <pc:sldMk cId="2649422868" sldId="269"/>
-            <ac:spMk id="2" creationId="{85C0CF99-D5BF-0D5F-778A-DC0C75D29491}"/>
-          </ac:spMkLst>
-        </pc:spChg>
-        <pc:spChg chg="mod">
-          <ac:chgData name="Tristin Schlauch" userId="a338a217be8c714a" providerId="LiveId" clId="{745B7E24-5365-4587-8D3A-A90B788E4913}" dt="2025-04-11T23:26:43.814" v="3273" actId="20577"/>
-          <ac:spMkLst>
-            <pc:docMk/>
-            <pc:sldMk cId="2649422868" sldId="269"/>
-            <ac:spMk id="3" creationId="{9C7D56BE-5D10-F538-0C1F-F17117EF8666}"/>
-          </ac:spMkLst>
-        </pc:spChg>
       </pc:sldChg>
       <pc:sldChg chg="addSp delSp modSp new mod modClrScheme chgLayout">
         <pc:chgData name="Tristin Schlauch" userId="a338a217be8c714a" providerId="LiveId" clId="{745B7E24-5365-4587-8D3A-A90B788E4913}" dt="2025-04-12T01:45:00.764" v="4522" actId="14100"/>
@@ -668,30 +443,6 @@
           <pc:docMk/>
           <pc:sldMk cId="4101037148" sldId="270"/>
         </pc:sldMkLst>
-        <pc:spChg chg="mod ord">
-          <ac:chgData name="Tristin Schlauch" userId="a338a217be8c714a" providerId="LiveId" clId="{745B7E24-5365-4587-8D3A-A90B788E4913}" dt="2025-04-12T01:33:33.679" v="3711" actId="700"/>
-          <ac:spMkLst>
-            <pc:docMk/>
-            <pc:sldMk cId="4101037148" sldId="270"/>
-            <ac:spMk id="2" creationId="{86B3F944-211E-F9D2-F4F6-5C0C0F336072}"/>
-          </ac:spMkLst>
-        </pc:spChg>
-        <pc:spChg chg="add mod ord">
-          <ac:chgData name="Tristin Schlauch" userId="a338a217be8c714a" providerId="LiveId" clId="{745B7E24-5365-4587-8D3A-A90B788E4913}" dt="2025-04-12T01:45:00.764" v="4522" actId="14100"/>
-          <ac:spMkLst>
-            <pc:docMk/>
-            <pc:sldMk cId="4101037148" sldId="270"/>
-            <ac:spMk id="4" creationId="{EBD85136-D407-4C2C-44D6-FA290D61DC74}"/>
-          </ac:spMkLst>
-        </pc:spChg>
-        <pc:picChg chg="add mod ord">
-          <ac:chgData name="Tristin Schlauch" userId="a338a217be8c714a" providerId="LiveId" clId="{745B7E24-5365-4587-8D3A-A90B788E4913}" dt="2025-04-12T01:38:08.100" v="3926" actId="22"/>
-          <ac:picMkLst>
-            <pc:docMk/>
-            <pc:sldMk cId="4101037148" sldId="270"/>
-            <ac:picMk id="6" creationId="{17A2B4E0-6F0D-4918-A4D4-891DCEE5DAB9}"/>
-          </ac:picMkLst>
-        </pc:picChg>
       </pc:sldChg>
       <pc:sldChg chg="addSp delSp modSp add mod">
         <pc:chgData name="Tristin Schlauch" userId="a338a217be8c714a" providerId="LiveId" clId="{745B7E24-5365-4587-8D3A-A90B788E4913}" dt="2025-04-12T01:51:53.167" v="4529" actId="22"/>
@@ -699,30 +450,6 @@
           <pc:docMk/>
           <pc:sldMk cId="1890857210" sldId="271"/>
         </pc:sldMkLst>
-        <pc:spChg chg="mod">
-          <ac:chgData name="Tristin Schlauch" userId="a338a217be8c714a" providerId="LiveId" clId="{745B7E24-5365-4587-8D3A-A90B788E4913}" dt="2025-04-12T01:39:03.392" v="3942" actId="20577"/>
-          <ac:spMkLst>
-            <pc:docMk/>
-            <pc:sldMk cId="1890857210" sldId="271"/>
-            <ac:spMk id="2" creationId="{2C503A57-6DB6-E8E0-900B-FBCCF90E107E}"/>
-          </ac:spMkLst>
-        </pc:spChg>
-        <pc:spChg chg="mod">
-          <ac:chgData name="Tristin Schlauch" userId="a338a217be8c714a" providerId="LiveId" clId="{745B7E24-5365-4587-8D3A-A90B788E4913}" dt="2025-04-12T01:45:25.992" v="4527" actId="114"/>
-          <ac:spMkLst>
-            <pc:docMk/>
-            <pc:sldMk cId="1890857210" sldId="271"/>
-            <ac:spMk id="4" creationId="{519E66CB-B56F-D845-F4E5-D736212EECE0}"/>
-          </ac:spMkLst>
-        </pc:spChg>
-        <pc:picChg chg="add mod ord">
-          <ac:chgData name="Tristin Schlauch" userId="a338a217be8c714a" providerId="LiveId" clId="{745B7E24-5365-4587-8D3A-A90B788E4913}" dt="2025-04-12T01:51:53.167" v="4529" actId="22"/>
-          <ac:picMkLst>
-            <pc:docMk/>
-            <pc:sldMk cId="1890857210" sldId="271"/>
-            <ac:picMk id="8" creationId="{2D34436E-E1A3-546E-7947-74BA019E7CB7}"/>
-          </ac:picMkLst>
-        </pc:picChg>
       </pc:sldChg>
       <pc:sldChg chg="modSp add mod ord">
         <pc:chgData name="Tristin Schlauch" userId="a338a217be8c714a" providerId="LiveId" clId="{745B7E24-5365-4587-8D3A-A90B788E4913}" dt="2025-04-12T02:01:39.329" v="5125" actId="255"/>
@@ -730,22 +457,6 @@
           <pc:docMk/>
           <pc:sldMk cId="1159791470" sldId="272"/>
         </pc:sldMkLst>
-        <pc:spChg chg="mod">
-          <ac:chgData name="Tristin Schlauch" userId="a338a217be8c714a" providerId="LiveId" clId="{745B7E24-5365-4587-8D3A-A90B788E4913}" dt="2025-04-12T01:54:41.162" v="4541" actId="20577"/>
-          <ac:spMkLst>
-            <pc:docMk/>
-            <pc:sldMk cId="1159791470" sldId="272"/>
-            <ac:spMk id="2" creationId="{24171CEB-3F5F-811C-7488-46209BA5C5F7}"/>
-          </ac:spMkLst>
-        </pc:spChg>
-        <pc:spChg chg="mod">
-          <ac:chgData name="Tristin Schlauch" userId="a338a217be8c714a" providerId="LiveId" clId="{745B7E24-5365-4587-8D3A-A90B788E4913}" dt="2025-04-12T02:01:39.329" v="5125" actId="255"/>
-          <ac:spMkLst>
-            <pc:docMk/>
-            <pc:sldMk cId="1159791470" sldId="272"/>
-            <ac:spMk id="3" creationId="{BC16C1B0-4ACC-BB02-DCE3-F8A2BA412897}"/>
-          </ac:spMkLst>
-        </pc:spChg>
       </pc:sldChg>
       <pc:sldChg chg="modSp add mod ord">
         <pc:chgData name="Tristin Schlauch" userId="a338a217be8c714a" providerId="LiveId" clId="{745B7E24-5365-4587-8D3A-A90B788E4913}" dt="2025-04-12T02:41:16.263" v="5218" actId="2711"/>
@@ -753,22 +464,6 @@
           <pc:docMk/>
           <pc:sldMk cId="2657423670" sldId="273"/>
         </pc:sldMkLst>
-        <pc:spChg chg="mod">
-          <ac:chgData name="Tristin Schlauch" userId="a338a217be8c714a" providerId="LiveId" clId="{745B7E24-5365-4587-8D3A-A90B788E4913}" dt="2025-04-12T02:12:44.742" v="5134" actId="20577"/>
-          <ac:spMkLst>
-            <pc:docMk/>
-            <pc:sldMk cId="2657423670" sldId="273"/>
-            <ac:spMk id="2" creationId="{A37F8991-028C-BE2D-1E2A-8440BFEA052B}"/>
-          </ac:spMkLst>
-        </pc:spChg>
-        <pc:spChg chg="mod">
-          <ac:chgData name="Tristin Schlauch" userId="a338a217be8c714a" providerId="LiveId" clId="{745B7E24-5365-4587-8D3A-A90B788E4913}" dt="2025-04-12T02:41:16.263" v="5218" actId="2711"/>
-          <ac:spMkLst>
-            <pc:docMk/>
-            <pc:sldMk cId="2657423670" sldId="273"/>
-            <ac:spMk id="3" creationId="{50D7CF0D-0649-82D6-4744-24EF339A3C23}"/>
-          </ac:spMkLst>
-        </pc:spChg>
       </pc:sldChg>
       <pc:sldChg chg="addSp delSp modSp add mod ord">
         <pc:chgData name="Tristin Schlauch" userId="a338a217be8c714a" providerId="LiveId" clId="{745B7E24-5365-4587-8D3A-A90B788E4913}" dt="2025-04-12T03:49:26.337" v="5710" actId="1076"/>
@@ -776,38 +471,6 @@
           <pc:docMk/>
           <pc:sldMk cId="1987775902" sldId="274"/>
         </pc:sldMkLst>
-        <pc:spChg chg="mod">
-          <ac:chgData name="Tristin Schlauch" userId="a338a217be8c714a" providerId="LiveId" clId="{745B7E24-5365-4587-8D3A-A90B788E4913}" dt="2025-04-12T03:41:55.365" v="5702" actId="1076"/>
-          <ac:spMkLst>
-            <pc:docMk/>
-            <pc:sldMk cId="1987775902" sldId="274"/>
-            <ac:spMk id="2" creationId="{104346AA-DCBC-FE9A-C2FF-441EBEED8313}"/>
-          </ac:spMkLst>
-        </pc:spChg>
-        <pc:spChg chg="mod">
-          <ac:chgData name="Tristin Schlauch" userId="a338a217be8c714a" providerId="LiveId" clId="{745B7E24-5365-4587-8D3A-A90B788E4913}" dt="2025-04-12T03:43:31.382" v="5703" actId="20577"/>
-          <ac:spMkLst>
-            <pc:docMk/>
-            <pc:sldMk cId="1987775902" sldId="274"/>
-            <ac:spMk id="4" creationId="{EFEF4443-4903-A401-FDAA-195F8C06A5A3}"/>
-          </ac:spMkLst>
-        </pc:spChg>
-        <pc:picChg chg="add mod">
-          <ac:chgData name="Tristin Schlauch" userId="a338a217be8c714a" providerId="LiveId" clId="{745B7E24-5365-4587-8D3A-A90B788E4913}" dt="2025-04-12T03:49:26.337" v="5710" actId="1076"/>
-          <ac:picMkLst>
-            <pc:docMk/>
-            <pc:sldMk cId="1987775902" sldId="274"/>
-            <ac:picMk id="8" creationId="{2B781598-7620-EF1F-9F76-825000F9CF09}"/>
-          </ac:picMkLst>
-        </pc:picChg>
-        <pc:picChg chg="add mod ord">
-          <ac:chgData name="Tristin Schlauch" userId="a338a217be8c714a" providerId="LiveId" clId="{745B7E24-5365-4587-8D3A-A90B788E4913}" dt="2025-04-12T03:49:18.773" v="5708" actId="1076"/>
-          <ac:picMkLst>
-            <pc:docMk/>
-            <pc:sldMk cId="1987775902" sldId="274"/>
-            <ac:picMk id="10" creationId="{353AFD7C-DDB6-C1A1-504F-AF9CB2175037}"/>
-          </ac:picMkLst>
-        </pc:picChg>
       </pc:sldChg>
       <pc:sldChg chg="addSp delSp modSp add mod">
         <pc:chgData name="Tristin Schlauch" userId="a338a217be8c714a" providerId="LiveId" clId="{745B7E24-5365-4587-8D3A-A90B788E4913}" dt="2025-04-12T03:58:50.881" v="6069" actId="20577"/>
@@ -815,38 +478,6 @@
           <pc:docMk/>
           <pc:sldMk cId="3610940009" sldId="275"/>
         </pc:sldMkLst>
-        <pc:spChg chg="mod">
-          <ac:chgData name="Tristin Schlauch" userId="a338a217be8c714a" providerId="LiveId" clId="{745B7E24-5365-4587-8D3A-A90B788E4913}" dt="2025-04-12T03:53:02.907" v="5739" actId="20577"/>
-          <ac:spMkLst>
-            <pc:docMk/>
-            <pc:sldMk cId="3610940009" sldId="275"/>
-            <ac:spMk id="2" creationId="{B674C022-A32E-7000-362B-E2A15B381159}"/>
-          </ac:spMkLst>
-        </pc:spChg>
-        <pc:spChg chg="mod">
-          <ac:chgData name="Tristin Schlauch" userId="a338a217be8c714a" providerId="LiveId" clId="{745B7E24-5365-4587-8D3A-A90B788E4913}" dt="2025-04-12T03:58:50.881" v="6069" actId="20577"/>
-          <ac:spMkLst>
-            <pc:docMk/>
-            <pc:sldMk cId="3610940009" sldId="275"/>
-            <ac:spMk id="4" creationId="{6AE680DF-3966-9499-8EBE-E0CB325C7728}"/>
-          </ac:spMkLst>
-        </pc:spChg>
-        <pc:picChg chg="add mod">
-          <ac:chgData name="Tristin Schlauch" userId="a338a217be8c714a" providerId="LiveId" clId="{745B7E24-5365-4587-8D3A-A90B788E4913}" dt="2025-04-12T03:56:48.495" v="6040" actId="14100"/>
-          <ac:picMkLst>
-            <pc:docMk/>
-            <pc:sldMk cId="3610940009" sldId="275"/>
-            <ac:picMk id="5" creationId="{AA5A447C-1BB4-1349-A8AD-9B1EBE14EB77}"/>
-          </ac:picMkLst>
-        </pc:picChg>
-        <pc:picChg chg="add mod ord">
-          <ac:chgData name="Tristin Schlauch" userId="a338a217be8c714a" providerId="LiveId" clId="{745B7E24-5365-4587-8D3A-A90B788E4913}" dt="2025-04-12T03:57:33.724" v="6044" actId="1076"/>
-          <ac:picMkLst>
-            <pc:docMk/>
-            <pc:sldMk cId="3610940009" sldId="275"/>
-            <ac:picMk id="11" creationId="{9B56725C-4362-AC64-359D-D31783547BAC}"/>
-          </ac:picMkLst>
-        </pc:picChg>
       </pc:sldChg>
       <pc:sldChg chg="addSp delSp modSp add mod">
         <pc:chgData name="Tristin Schlauch" userId="a338a217be8c714a" providerId="LiveId" clId="{745B7E24-5365-4587-8D3A-A90B788E4913}" dt="2025-04-12T04:14:25.089" v="6377" actId="478"/>
@@ -854,30 +485,6 @@
           <pc:docMk/>
           <pc:sldMk cId="2527031289" sldId="276"/>
         </pc:sldMkLst>
-        <pc:spChg chg="mod">
-          <ac:chgData name="Tristin Schlauch" userId="a338a217be8c714a" providerId="LiveId" clId="{745B7E24-5365-4587-8D3A-A90B788E4913}" dt="2025-04-12T03:59:14.409" v="6077" actId="20577"/>
-          <ac:spMkLst>
-            <pc:docMk/>
-            <pc:sldMk cId="2527031289" sldId="276"/>
-            <ac:spMk id="2" creationId="{446627F0-C61D-FBC3-1E60-8100A216837A}"/>
-          </ac:spMkLst>
-        </pc:spChg>
-        <pc:spChg chg="mod">
-          <ac:chgData name="Tristin Schlauch" userId="a338a217be8c714a" providerId="LiveId" clId="{745B7E24-5365-4587-8D3A-A90B788E4913}" dt="2025-04-12T04:07:34.199" v="6374" actId="20577"/>
-          <ac:spMkLst>
-            <pc:docMk/>
-            <pc:sldMk cId="2527031289" sldId="276"/>
-            <ac:spMk id="4" creationId="{60C6A015-3E37-A1B3-BF69-9E3B1D714098}"/>
-          </ac:spMkLst>
-        </pc:spChg>
-        <pc:picChg chg="add mod ord">
-          <ac:chgData name="Tristin Schlauch" userId="a338a217be8c714a" providerId="LiveId" clId="{745B7E24-5365-4587-8D3A-A90B788E4913}" dt="2025-04-12T04:14:23.163" v="6376" actId="22"/>
-          <ac:picMkLst>
-            <pc:docMk/>
-            <pc:sldMk cId="2527031289" sldId="276"/>
-            <ac:picMk id="8" creationId="{0E36455B-D11C-5731-E76C-2405B1404CA8}"/>
-          </ac:picMkLst>
-        </pc:picChg>
       </pc:sldChg>
       <pc:sldChg chg="modSp add mod ord">
         <pc:chgData name="Tristin Schlauch" userId="a338a217be8c714a" providerId="LiveId" clId="{745B7E24-5365-4587-8D3A-A90B788E4913}" dt="2025-04-12T04:21:15.845" v="6735" actId="20577"/>
@@ -885,22 +492,6 @@
           <pc:docMk/>
           <pc:sldMk cId="1768162994" sldId="277"/>
         </pc:sldMkLst>
-        <pc:spChg chg="mod">
-          <ac:chgData name="Tristin Schlauch" userId="a338a217be8c714a" providerId="LiveId" clId="{745B7E24-5365-4587-8D3A-A90B788E4913}" dt="2025-04-12T04:18:15.285" v="6386" actId="20577"/>
-          <ac:spMkLst>
-            <pc:docMk/>
-            <pc:sldMk cId="1768162994" sldId="277"/>
-            <ac:spMk id="2" creationId="{F7C201CA-3D83-3A4B-2E58-A4D6E84EBA2E}"/>
-          </ac:spMkLst>
-        </pc:spChg>
-        <pc:spChg chg="mod">
-          <ac:chgData name="Tristin Schlauch" userId="a338a217be8c714a" providerId="LiveId" clId="{745B7E24-5365-4587-8D3A-A90B788E4913}" dt="2025-04-12T04:21:15.845" v="6735" actId="20577"/>
-          <ac:spMkLst>
-            <pc:docMk/>
-            <pc:sldMk cId="1768162994" sldId="277"/>
-            <ac:spMk id="3" creationId="{44BEB54D-F878-20E7-46FB-43CF582C4164}"/>
-          </ac:spMkLst>
-        </pc:spChg>
       </pc:sldChg>
       <pc:sldChg chg="modSp new mod">
         <pc:chgData name="Tristin Schlauch" userId="a338a217be8c714a" providerId="LiveId" clId="{745B7E24-5365-4587-8D3A-A90B788E4913}" dt="2025-04-12T04:21:42.001" v="6758" actId="20577"/>
@@ -908,22 +499,6 @@
           <pc:docMk/>
           <pc:sldMk cId="3727397199" sldId="278"/>
         </pc:sldMkLst>
-        <pc:spChg chg="mod">
-          <ac:chgData name="Tristin Schlauch" userId="a338a217be8c714a" providerId="LiveId" clId="{745B7E24-5365-4587-8D3A-A90B788E4913}" dt="2025-04-12T04:21:34.053" v="6749" actId="20577"/>
-          <ac:spMkLst>
-            <pc:docMk/>
-            <pc:sldMk cId="3727397199" sldId="278"/>
-            <ac:spMk id="2" creationId="{BC594031-05C0-F774-5565-70E86424CBAA}"/>
-          </ac:spMkLst>
-        </pc:spChg>
-        <pc:spChg chg="mod">
-          <ac:chgData name="Tristin Schlauch" userId="a338a217be8c714a" providerId="LiveId" clId="{745B7E24-5365-4587-8D3A-A90B788E4913}" dt="2025-04-12T04:21:42.001" v="6758" actId="20577"/>
-          <ac:spMkLst>
-            <pc:docMk/>
-            <pc:sldMk cId="3727397199" sldId="278"/>
-            <ac:spMk id="3" creationId="{AE75AB3B-5876-932A-0763-B4A4FCE47C51}"/>
-          </ac:spMkLst>
-        </pc:spChg>
       </pc:sldChg>
       <pc:sldChg chg="addSp delSp modSp add mod ord">
         <pc:chgData name="Tristin Schlauch" userId="a338a217be8c714a" providerId="LiveId" clId="{745B7E24-5365-4587-8D3A-A90B788E4913}" dt="2025-04-12T13:49:40.100" v="7235" actId="1076"/>
@@ -931,38 +506,6 @@
           <pc:docMk/>
           <pc:sldMk cId="3776585760" sldId="279"/>
         </pc:sldMkLst>
-        <pc:spChg chg="mod">
-          <ac:chgData name="Tristin Schlauch" userId="a338a217be8c714a" providerId="LiveId" clId="{745B7E24-5365-4587-8D3A-A90B788E4913}" dt="2025-04-12T13:08:42.877" v="6782" actId="20577"/>
-          <ac:spMkLst>
-            <pc:docMk/>
-            <pc:sldMk cId="3776585760" sldId="279"/>
-            <ac:spMk id="2" creationId="{E1E253A9-CEE7-DE52-5E22-3F7D2AF63F57}"/>
-          </ac:spMkLst>
-        </pc:spChg>
-        <pc:spChg chg="mod">
-          <ac:chgData name="Tristin Schlauch" userId="a338a217be8c714a" providerId="LiveId" clId="{745B7E24-5365-4587-8D3A-A90B788E4913}" dt="2025-04-12T13:46:27.306" v="7221" actId="20577"/>
-          <ac:spMkLst>
-            <pc:docMk/>
-            <pc:sldMk cId="3776585760" sldId="279"/>
-            <ac:spMk id="4" creationId="{8B451A7B-B706-0BE0-FD92-F9351D505D5D}"/>
-          </ac:spMkLst>
-        </pc:spChg>
-        <pc:picChg chg="add mod">
-          <ac:chgData name="Tristin Schlauch" userId="a338a217be8c714a" providerId="LiveId" clId="{745B7E24-5365-4587-8D3A-A90B788E4913}" dt="2025-04-12T13:49:40.100" v="7235" actId="1076"/>
-          <ac:picMkLst>
-            <pc:docMk/>
-            <pc:sldMk cId="3776585760" sldId="279"/>
-            <ac:picMk id="2050" creationId="{D78B00D0-8DCB-4DDA-692B-53A39C835291}"/>
-          </ac:picMkLst>
-        </pc:picChg>
-        <pc:picChg chg="add mod">
-          <ac:chgData name="Tristin Schlauch" userId="a338a217be8c714a" providerId="LiveId" clId="{745B7E24-5365-4587-8D3A-A90B788E4913}" dt="2025-04-12T13:49:40.100" v="7235" actId="1076"/>
-          <ac:picMkLst>
-            <pc:docMk/>
-            <pc:sldMk cId="3776585760" sldId="279"/>
-            <ac:picMk id="2054" creationId="{7D809131-4B46-3819-FA87-CBF89AAB3948}"/>
-          </ac:picMkLst>
-        </pc:picChg>
       </pc:sldChg>
       <pc:sldChg chg="modSp add mod ord">
         <pc:chgData name="Tristin Schlauch" userId="a338a217be8c714a" providerId="LiveId" clId="{745B7E24-5365-4587-8D3A-A90B788E4913}" dt="2025-04-15T23:57:03.340" v="22699" actId="20577"/>
@@ -970,22 +513,6 @@
           <pc:docMk/>
           <pc:sldMk cId="3776492510" sldId="280"/>
         </pc:sldMkLst>
-        <pc:spChg chg="mod">
-          <ac:chgData name="Tristin Schlauch" userId="a338a217be8c714a" providerId="LiveId" clId="{745B7E24-5365-4587-8D3A-A90B788E4913}" dt="2025-04-15T23:57:03.340" v="22699" actId="20577"/>
-          <ac:spMkLst>
-            <pc:docMk/>
-            <pc:sldMk cId="3776492510" sldId="280"/>
-            <ac:spMk id="2" creationId="{23199309-C3E7-7DD3-9AF3-BE24AE1D6A58}"/>
-          </ac:spMkLst>
-        </pc:spChg>
-        <pc:spChg chg="mod">
-          <ac:chgData name="Tristin Schlauch" userId="a338a217be8c714a" providerId="LiveId" clId="{745B7E24-5365-4587-8D3A-A90B788E4913}" dt="2025-04-12T13:53:55.487" v="7406" actId="20577"/>
-          <ac:spMkLst>
-            <pc:docMk/>
-            <pc:sldMk cId="3776492510" sldId="280"/>
-            <ac:spMk id="3" creationId="{0FEB6FBE-3956-4244-2F01-AE63DCD4C86F}"/>
-          </ac:spMkLst>
-        </pc:spChg>
       </pc:sldChg>
       <pc:sldChg chg="addSp delSp modSp add mod ord">
         <pc:chgData name="Tristin Schlauch" userId="a338a217be8c714a" providerId="LiveId" clId="{745B7E24-5365-4587-8D3A-A90B788E4913}" dt="2025-04-12T19:48:13.089" v="10175" actId="20577"/>
@@ -993,30 +520,6 @@
           <pc:docMk/>
           <pc:sldMk cId="2339005028" sldId="281"/>
         </pc:sldMkLst>
-        <pc:spChg chg="mod">
-          <ac:chgData name="Tristin Schlauch" userId="a338a217be8c714a" providerId="LiveId" clId="{745B7E24-5365-4587-8D3A-A90B788E4913}" dt="2025-04-12T19:48:13.089" v="10175" actId="20577"/>
-          <ac:spMkLst>
-            <pc:docMk/>
-            <pc:sldMk cId="2339005028" sldId="281"/>
-            <ac:spMk id="2" creationId="{04FE3254-8047-DDE6-9A53-A4DE60844BC8}"/>
-          </ac:spMkLst>
-        </pc:spChg>
-        <pc:spChg chg="mod">
-          <ac:chgData name="Tristin Schlauch" userId="a338a217be8c714a" providerId="LiveId" clId="{745B7E24-5365-4587-8D3A-A90B788E4913}" dt="2025-04-12T14:39:13.908" v="8376" actId="113"/>
-          <ac:spMkLst>
-            <pc:docMk/>
-            <pc:sldMk cId="2339005028" sldId="281"/>
-            <ac:spMk id="4" creationId="{F04E17C2-A80E-F8E9-A3E1-D3DBFCA40A4D}"/>
-          </ac:spMkLst>
-        </pc:spChg>
-        <pc:picChg chg="add mod ord">
-          <ac:chgData name="Tristin Schlauch" userId="a338a217be8c714a" providerId="LiveId" clId="{745B7E24-5365-4587-8D3A-A90B788E4913}" dt="2025-04-12T14:17:24.835" v="7761" actId="22"/>
-          <ac:picMkLst>
-            <pc:docMk/>
-            <pc:sldMk cId="2339005028" sldId="281"/>
-            <ac:picMk id="11" creationId="{A0A131CA-9C70-BB33-D445-6ED1277CD0D3}"/>
-          </ac:picMkLst>
-        </pc:picChg>
       </pc:sldChg>
       <pc:sldChg chg="addSp delSp modSp add mod">
         <pc:chgData name="Tristin Schlauch" userId="a338a217be8c714a" providerId="LiveId" clId="{745B7E24-5365-4587-8D3A-A90B788E4913}" dt="2025-04-12T20:16:31.047" v="11317" actId="1076"/>
@@ -1024,38 +527,6 @@
           <pc:docMk/>
           <pc:sldMk cId="3426545287" sldId="282"/>
         </pc:sldMkLst>
-        <pc:spChg chg="mod">
-          <ac:chgData name="Tristin Schlauch" userId="a338a217be8c714a" providerId="LiveId" clId="{745B7E24-5365-4587-8D3A-A90B788E4913}" dt="2025-04-12T14:19:05.201" v="7819" actId="20577"/>
-          <ac:spMkLst>
-            <pc:docMk/>
-            <pc:sldMk cId="3426545287" sldId="282"/>
-            <ac:spMk id="2" creationId="{3F14CA9A-078C-80C1-62BB-141859B1DA3A}"/>
-          </ac:spMkLst>
-        </pc:spChg>
-        <pc:spChg chg="mod">
-          <ac:chgData name="Tristin Schlauch" userId="a338a217be8c714a" providerId="LiveId" clId="{745B7E24-5365-4587-8D3A-A90B788E4913}" dt="2025-04-12T20:14:36.016" v="11215" actId="20577"/>
-          <ac:spMkLst>
-            <pc:docMk/>
-            <pc:sldMk cId="3426545287" sldId="282"/>
-            <ac:spMk id="4" creationId="{C638A291-9D24-DEE2-A586-166E52AD8628}"/>
-          </ac:spMkLst>
-        </pc:spChg>
-        <pc:spChg chg="add mod">
-          <ac:chgData name="Tristin Schlauch" userId="a338a217be8c714a" providerId="LiveId" clId="{745B7E24-5365-4587-8D3A-A90B788E4913}" dt="2025-04-12T20:16:31.047" v="11317" actId="1076"/>
-          <ac:spMkLst>
-            <pc:docMk/>
-            <pc:sldMk cId="3426545287" sldId="282"/>
-            <ac:spMk id="8" creationId="{96B59942-A4BE-B643-28AB-B31ED2636D19}"/>
-          </ac:spMkLst>
-        </pc:spChg>
-        <pc:picChg chg="add mod ord">
-          <ac:chgData name="Tristin Schlauch" userId="a338a217be8c714a" providerId="LiveId" clId="{745B7E24-5365-4587-8D3A-A90B788E4913}" dt="2025-04-12T14:27:47.950" v="8229" actId="22"/>
-          <ac:picMkLst>
-            <pc:docMk/>
-            <pc:sldMk cId="3426545287" sldId="282"/>
-            <ac:picMk id="7" creationId="{295BF3B4-6BD6-7617-1576-959E75544BB9}"/>
-          </ac:picMkLst>
-        </pc:picChg>
       </pc:sldChg>
       <pc:sldChg chg="new del">
         <pc:chgData name="Tristin Schlauch" userId="a338a217be8c714a" providerId="LiveId" clId="{745B7E24-5365-4587-8D3A-A90B788E4913}" dt="2025-04-12T14:35:14.538" v="8231" actId="2696"/>
@@ -1070,30 +541,6 @@
           <pc:docMk/>
           <pc:sldMk cId="3485202157" sldId="283"/>
         </pc:sldMkLst>
-        <pc:spChg chg="mod">
-          <ac:chgData name="Tristin Schlauch" userId="a338a217be8c714a" providerId="LiveId" clId="{745B7E24-5365-4587-8D3A-A90B788E4913}" dt="2025-04-12T14:37:30.342" v="8295"/>
-          <ac:spMkLst>
-            <pc:docMk/>
-            <pc:sldMk cId="3485202157" sldId="283"/>
-            <ac:spMk id="2" creationId="{5B985707-B231-1C46-DB9F-965FB5FD2186}"/>
-          </ac:spMkLst>
-        </pc:spChg>
-        <pc:spChg chg="mod">
-          <ac:chgData name="Tristin Schlauch" userId="a338a217be8c714a" providerId="LiveId" clId="{745B7E24-5365-4587-8D3A-A90B788E4913}" dt="2025-04-12T14:43:23.716" v="8641" actId="2711"/>
-          <ac:spMkLst>
-            <pc:docMk/>
-            <pc:sldMk cId="3485202157" sldId="283"/>
-            <ac:spMk id="4" creationId="{42E89515-63F3-B454-37FF-9348884BF6A6}"/>
-          </ac:spMkLst>
-        </pc:spChg>
-        <pc:picChg chg="add mod ord">
-          <ac:chgData name="Tristin Schlauch" userId="a338a217be8c714a" providerId="LiveId" clId="{745B7E24-5365-4587-8D3A-A90B788E4913}" dt="2025-04-12T14:49:18.128" v="8645" actId="22"/>
-          <ac:picMkLst>
-            <pc:docMk/>
-            <pc:sldMk cId="3485202157" sldId="283"/>
-            <ac:picMk id="10" creationId="{E350C38C-D53F-7B72-6572-677242D889C4}"/>
-          </ac:picMkLst>
-        </pc:picChg>
       </pc:sldChg>
       <pc:sldChg chg="addSp delSp modSp add mod">
         <pc:chgData name="Tristin Schlauch" userId="a338a217be8c714a" providerId="LiveId" clId="{745B7E24-5365-4587-8D3A-A90B788E4913}" dt="2025-04-12T17:27:17.556" v="9241" actId="2711"/>
@@ -1101,30 +548,6 @@
           <pc:docMk/>
           <pc:sldMk cId="613548772" sldId="284"/>
         </pc:sldMkLst>
-        <pc:spChg chg="mod">
-          <ac:chgData name="Tristin Schlauch" userId="a338a217be8c714a" providerId="LiveId" clId="{745B7E24-5365-4587-8D3A-A90B788E4913}" dt="2025-04-12T17:25:34.417" v="9156" actId="20577"/>
-          <ac:spMkLst>
-            <pc:docMk/>
-            <pc:sldMk cId="613548772" sldId="284"/>
-            <ac:spMk id="2" creationId="{D354FFD1-4350-DF63-C561-E8E92A4249CE}"/>
-          </ac:spMkLst>
-        </pc:spChg>
-        <pc:spChg chg="mod">
-          <ac:chgData name="Tristin Schlauch" userId="a338a217be8c714a" providerId="LiveId" clId="{745B7E24-5365-4587-8D3A-A90B788E4913}" dt="2025-04-12T17:27:17.556" v="9241" actId="2711"/>
-          <ac:spMkLst>
-            <pc:docMk/>
-            <pc:sldMk cId="613548772" sldId="284"/>
-            <ac:spMk id="4" creationId="{B883B152-BEF5-1EDD-9C5A-8F44858F1616}"/>
-          </ac:spMkLst>
-        </pc:spChg>
-        <pc:picChg chg="add mod ord">
-          <ac:chgData name="Tristin Schlauch" userId="a338a217be8c714a" providerId="LiveId" clId="{745B7E24-5365-4587-8D3A-A90B788E4913}" dt="2025-04-12T17:25:10.145" v="9129" actId="22"/>
-          <ac:picMkLst>
-            <pc:docMk/>
-            <pc:sldMk cId="613548772" sldId="284"/>
-            <ac:picMk id="7" creationId="{50F3E478-6404-E2BF-0E83-69D9C74AFE02}"/>
-          </ac:picMkLst>
-        </pc:picChg>
       </pc:sldChg>
       <pc:sldChg chg="addSp delSp modSp add mod">
         <pc:chgData name="Tristin Schlauch" userId="a338a217be8c714a" providerId="LiveId" clId="{745B7E24-5365-4587-8D3A-A90B788E4913}" dt="2025-04-12T17:34:25.651" v="9411" actId="22"/>
@@ -1132,30 +555,6 @@
           <pc:docMk/>
           <pc:sldMk cId="4281893830" sldId="285"/>
         </pc:sldMkLst>
-        <pc:spChg chg="mod">
-          <ac:chgData name="Tristin Schlauch" userId="a338a217be8c714a" providerId="LiveId" clId="{745B7E24-5365-4587-8D3A-A90B788E4913}" dt="2025-04-12T17:26:46.139" v="9161" actId="20577"/>
-          <ac:spMkLst>
-            <pc:docMk/>
-            <pc:sldMk cId="4281893830" sldId="285"/>
-            <ac:spMk id="2" creationId="{E7CE5A9F-972F-281D-74D3-BE023F62F3C2}"/>
-          </ac:spMkLst>
-        </pc:spChg>
-        <pc:spChg chg="mod">
-          <ac:chgData name="Tristin Schlauch" userId="a338a217be8c714a" providerId="LiveId" clId="{745B7E24-5365-4587-8D3A-A90B788E4913}" dt="2025-04-12T17:30:25.115" v="9409" actId="20577"/>
-          <ac:spMkLst>
-            <pc:docMk/>
-            <pc:sldMk cId="4281893830" sldId="285"/>
-            <ac:spMk id="4" creationId="{86EAF69F-C3D3-5677-56BF-7FE0F2F8F639}"/>
-          </ac:spMkLst>
-        </pc:spChg>
-        <pc:picChg chg="add mod ord">
-          <ac:chgData name="Tristin Schlauch" userId="a338a217be8c714a" providerId="LiveId" clId="{745B7E24-5365-4587-8D3A-A90B788E4913}" dt="2025-04-12T17:34:25.651" v="9411" actId="22"/>
-          <ac:picMkLst>
-            <pc:docMk/>
-            <pc:sldMk cId="4281893830" sldId="285"/>
-            <ac:picMk id="8" creationId="{7E1713F4-6938-6EC2-1228-0C224A068AD0}"/>
-          </ac:picMkLst>
-        </pc:picChg>
       </pc:sldChg>
       <pc:sldChg chg="new del">
         <pc:chgData name="Tristin Schlauch" userId="a338a217be8c714a" providerId="LiveId" clId="{745B7E24-5365-4587-8D3A-A90B788E4913}" dt="2025-04-12T17:35:35.410" v="9413" actId="47"/>
@@ -1170,30 +569,6 @@
           <pc:docMk/>
           <pc:sldMk cId="2529700172" sldId="286"/>
         </pc:sldMkLst>
-        <pc:spChg chg="mod">
-          <ac:chgData name="Tristin Schlauch" userId="a338a217be8c714a" providerId="LiveId" clId="{745B7E24-5365-4587-8D3A-A90B788E4913}" dt="2025-04-12T17:35:41.068" v="9418" actId="20577"/>
-          <ac:spMkLst>
-            <pc:docMk/>
-            <pc:sldMk cId="2529700172" sldId="286"/>
-            <ac:spMk id="2" creationId="{B6BCABA7-0A21-DD34-EE11-E3275F38FE20}"/>
-          </ac:spMkLst>
-        </pc:spChg>
-        <pc:spChg chg="mod">
-          <ac:chgData name="Tristin Schlauch" userId="a338a217be8c714a" providerId="LiveId" clId="{745B7E24-5365-4587-8D3A-A90B788E4913}" dt="2025-04-12T17:40:58.257" v="9782" actId="20577"/>
-          <ac:spMkLst>
-            <pc:docMk/>
-            <pc:sldMk cId="2529700172" sldId="286"/>
-            <ac:spMk id="4" creationId="{F8AEDC53-6E9B-6DD8-2D65-599558C60ECC}"/>
-          </ac:spMkLst>
-        </pc:spChg>
-        <pc:picChg chg="add mod ord">
-          <ac:chgData name="Tristin Schlauch" userId="a338a217be8c714a" providerId="LiveId" clId="{745B7E24-5365-4587-8D3A-A90B788E4913}" dt="2025-04-12T17:58:35.227" v="9784" actId="22"/>
-          <ac:picMkLst>
-            <pc:docMk/>
-            <pc:sldMk cId="2529700172" sldId="286"/>
-            <ac:picMk id="7" creationId="{44CC8CEE-7D3E-2677-BBAC-36419E2EFA0F}"/>
-          </ac:picMkLst>
-        </pc:picChg>
       </pc:sldChg>
       <pc:sldChg chg="addSp delSp modSp add mod modClrScheme chgLayout">
         <pc:chgData name="Tristin Schlauch" userId="a338a217be8c714a" providerId="LiveId" clId="{745B7E24-5365-4587-8D3A-A90B788E4913}" dt="2025-04-12T20:08:42.245" v="10915" actId="1076"/>
@@ -1201,86 +576,6 @@
           <pc:docMk/>
           <pc:sldMk cId="3137066385" sldId="287"/>
         </pc:sldMkLst>
-        <pc:spChg chg="mod ord">
-          <ac:chgData name="Tristin Schlauch" userId="a338a217be8c714a" providerId="LiveId" clId="{745B7E24-5365-4587-8D3A-A90B788E4913}" dt="2025-04-12T19:47:28.215" v="10157" actId="20577"/>
-          <ac:spMkLst>
-            <pc:docMk/>
-            <pc:sldMk cId="3137066385" sldId="287"/>
-            <ac:spMk id="2" creationId="{97AE471E-C219-C3FE-2445-0149C64FCC3A}"/>
-          </ac:spMkLst>
-        </pc:spChg>
-        <pc:spChg chg="add mod">
-          <ac:chgData name="Tristin Schlauch" userId="a338a217be8c714a" providerId="LiveId" clId="{745B7E24-5365-4587-8D3A-A90B788E4913}" dt="2025-04-12T20:08:42.245" v="10915" actId="1076"/>
-          <ac:spMkLst>
-            <pc:docMk/>
-            <pc:sldMk cId="3137066385" sldId="287"/>
-            <ac:spMk id="13" creationId="{F53C08E1-CB65-3F84-CF43-19C8E19AFC78}"/>
-          </ac:spMkLst>
-        </pc:spChg>
-        <pc:spChg chg="add mod">
-          <ac:chgData name="Tristin Schlauch" userId="a338a217be8c714a" providerId="LiveId" clId="{745B7E24-5365-4587-8D3A-A90B788E4913}" dt="2025-04-12T20:08:42.245" v="10915" actId="1076"/>
-          <ac:spMkLst>
-            <pc:docMk/>
-            <pc:sldMk cId="3137066385" sldId="287"/>
-            <ac:spMk id="14" creationId="{B1EA179E-90C9-4293-899B-1F15CAA6E651}"/>
-          </ac:spMkLst>
-        </pc:spChg>
-        <pc:spChg chg="add mod">
-          <ac:chgData name="Tristin Schlauch" userId="a338a217be8c714a" providerId="LiveId" clId="{745B7E24-5365-4587-8D3A-A90B788E4913}" dt="2025-04-12T20:08:42.245" v="10915" actId="1076"/>
-          <ac:spMkLst>
-            <pc:docMk/>
-            <pc:sldMk cId="3137066385" sldId="287"/>
-            <ac:spMk id="15" creationId="{BC0C7B6A-2832-6EEB-0FFB-F895929F6593}"/>
-          </ac:spMkLst>
-        </pc:spChg>
-        <pc:spChg chg="add mod">
-          <ac:chgData name="Tristin Schlauch" userId="a338a217be8c714a" providerId="LiveId" clId="{745B7E24-5365-4587-8D3A-A90B788E4913}" dt="2025-04-12T20:08:42.245" v="10915" actId="1076"/>
-          <ac:spMkLst>
-            <pc:docMk/>
-            <pc:sldMk cId="3137066385" sldId="287"/>
-            <ac:spMk id="16" creationId="{082F291F-F63D-F4A1-6228-30E071C15394}"/>
-          </ac:spMkLst>
-        </pc:spChg>
-        <pc:spChg chg="add mod">
-          <ac:chgData name="Tristin Schlauch" userId="a338a217be8c714a" providerId="LiveId" clId="{745B7E24-5365-4587-8D3A-A90B788E4913}" dt="2025-04-12T20:08:42.245" v="10915" actId="1076"/>
-          <ac:spMkLst>
-            <pc:docMk/>
-            <pc:sldMk cId="3137066385" sldId="287"/>
-            <ac:spMk id="17" creationId="{4B623651-77D8-F617-F1E0-763251E6B337}"/>
-          </ac:spMkLst>
-        </pc:spChg>
-        <pc:spChg chg="add mod">
-          <ac:chgData name="Tristin Schlauch" userId="a338a217be8c714a" providerId="LiveId" clId="{745B7E24-5365-4587-8D3A-A90B788E4913}" dt="2025-04-12T20:08:42.245" v="10915" actId="1076"/>
-          <ac:spMkLst>
-            <pc:docMk/>
-            <pc:sldMk cId="3137066385" sldId="287"/>
-            <ac:spMk id="18" creationId="{915DE6C8-7B83-7A06-C784-4CFA012461B2}"/>
-          </ac:spMkLst>
-        </pc:spChg>
-        <pc:spChg chg="add mod">
-          <ac:chgData name="Tristin Schlauch" userId="a338a217be8c714a" providerId="LiveId" clId="{745B7E24-5365-4587-8D3A-A90B788E4913}" dt="2025-04-12T20:08:42.245" v="10915" actId="1076"/>
-          <ac:spMkLst>
-            <pc:docMk/>
-            <pc:sldMk cId="3137066385" sldId="287"/>
-            <ac:spMk id="19" creationId="{F87A91E7-7E61-A930-35D4-AEF4E680C5F1}"/>
-          </ac:spMkLst>
-        </pc:spChg>
-        <pc:spChg chg="add mod">
-          <ac:chgData name="Tristin Schlauch" userId="a338a217be8c714a" providerId="LiveId" clId="{745B7E24-5365-4587-8D3A-A90B788E4913}" dt="2025-04-12T20:08:42.245" v="10915" actId="1076"/>
-          <ac:spMkLst>
-            <pc:docMk/>
-            <pc:sldMk cId="3137066385" sldId="287"/>
-            <ac:spMk id="20" creationId="{EF481B1E-BC9D-B221-13FB-147344B381E8}"/>
-          </ac:spMkLst>
-        </pc:spChg>
-        <pc:picChg chg="add mod ord">
-          <ac:chgData name="Tristin Schlauch" userId="a338a217be8c714a" providerId="LiveId" clId="{745B7E24-5365-4587-8D3A-A90B788E4913}" dt="2025-04-12T20:08:42.245" v="10915" actId="1076"/>
-          <ac:picMkLst>
-            <pc:docMk/>
-            <pc:sldMk cId="3137066385" sldId="287"/>
-            <ac:picMk id="12" creationId="{E04ED41B-90AF-8E30-C627-1FAB2D28E358}"/>
-          </ac:picMkLst>
-        </pc:picChg>
       </pc:sldChg>
       <pc:sldChg chg="modSp add mod ord">
         <pc:chgData name="Tristin Schlauch" userId="a338a217be8c714a" providerId="LiveId" clId="{745B7E24-5365-4587-8D3A-A90B788E4913}" dt="2025-04-12T20:20:01.472" v="11572" actId="20577"/>
@@ -1288,22 +583,6 @@
           <pc:docMk/>
           <pc:sldMk cId="3924650160" sldId="288"/>
         </pc:sldMkLst>
-        <pc:spChg chg="mod">
-          <ac:chgData name="Tristin Schlauch" userId="a338a217be8c714a" providerId="LiveId" clId="{745B7E24-5365-4587-8D3A-A90B788E4913}" dt="2025-04-12T20:10:52.589" v="10926" actId="20577"/>
-          <ac:spMkLst>
-            <pc:docMk/>
-            <pc:sldMk cId="3924650160" sldId="288"/>
-            <ac:spMk id="2" creationId="{F7F06F1D-A94A-9E96-474A-22C9438CFD0C}"/>
-          </ac:spMkLst>
-        </pc:spChg>
-        <pc:spChg chg="mod">
-          <ac:chgData name="Tristin Schlauch" userId="a338a217be8c714a" providerId="LiveId" clId="{745B7E24-5365-4587-8D3A-A90B788E4913}" dt="2025-04-12T20:20:01.472" v="11572" actId="20577"/>
-          <ac:spMkLst>
-            <pc:docMk/>
-            <pc:sldMk cId="3924650160" sldId="288"/>
-            <ac:spMk id="3" creationId="{E984FE1D-7054-F49C-1F44-6B2B28683CEF}"/>
-          </ac:spMkLst>
-        </pc:spChg>
       </pc:sldChg>
       <pc:sldChg chg="modSp add mod ord">
         <pc:chgData name="Tristin Schlauch" userId="a338a217be8c714a" providerId="LiveId" clId="{745B7E24-5365-4587-8D3A-A90B788E4913}" dt="2025-04-13T00:26:19.830" v="11633" actId="2711"/>
@@ -1311,22 +590,6 @@
           <pc:docMk/>
           <pc:sldMk cId="1950122775" sldId="289"/>
         </pc:sldMkLst>
-        <pc:spChg chg="mod">
-          <ac:chgData name="Tristin Schlauch" userId="a338a217be8c714a" providerId="LiveId" clId="{745B7E24-5365-4587-8D3A-A90B788E4913}" dt="2025-04-12T20:21:12.039" v="11586" actId="20577"/>
-          <ac:spMkLst>
-            <pc:docMk/>
-            <pc:sldMk cId="1950122775" sldId="289"/>
-            <ac:spMk id="2" creationId="{CEC0E389-64F1-1A5D-37CC-4A60B7351C15}"/>
-          </ac:spMkLst>
-        </pc:spChg>
-        <pc:spChg chg="mod">
-          <ac:chgData name="Tristin Schlauch" userId="a338a217be8c714a" providerId="LiveId" clId="{745B7E24-5365-4587-8D3A-A90B788E4913}" dt="2025-04-13T00:26:19.830" v="11633" actId="2711"/>
-          <ac:spMkLst>
-            <pc:docMk/>
-            <pc:sldMk cId="1950122775" sldId="289"/>
-            <ac:spMk id="3" creationId="{2BCBB453-484A-A39A-6F53-2F7D8D8636BD}"/>
-          </ac:spMkLst>
-        </pc:spChg>
       </pc:sldChg>
       <pc:sldChg chg="addSp delSp modSp add mod ord">
         <pc:chgData name="Tristin Schlauch" userId="a338a217be8c714a" providerId="LiveId" clId="{745B7E24-5365-4587-8D3A-A90B788E4913}" dt="2025-04-13T03:28:52.188" v="12644" actId="22"/>
@@ -1334,30 +597,6 @@
           <pc:docMk/>
           <pc:sldMk cId="4223351522" sldId="290"/>
         </pc:sldMkLst>
-        <pc:spChg chg="mod">
-          <ac:chgData name="Tristin Schlauch" userId="a338a217be8c714a" providerId="LiveId" clId="{745B7E24-5365-4587-8D3A-A90B788E4913}" dt="2025-04-13T00:26:45.204" v="11658" actId="20577"/>
-          <ac:spMkLst>
-            <pc:docMk/>
-            <pc:sldMk cId="4223351522" sldId="290"/>
-            <ac:spMk id="2" creationId="{F4A37A70-E1A8-6564-131A-E0ABEE13EA8C}"/>
-          </ac:spMkLst>
-        </pc:spChg>
-        <pc:spChg chg="mod">
-          <ac:chgData name="Tristin Schlauch" userId="a338a217be8c714a" providerId="LiveId" clId="{745B7E24-5365-4587-8D3A-A90B788E4913}" dt="2025-04-13T03:24:20.312" v="12640" actId="20577"/>
-          <ac:spMkLst>
-            <pc:docMk/>
-            <pc:sldMk cId="4223351522" sldId="290"/>
-            <ac:spMk id="4" creationId="{261B4F72-972F-A7A8-7EA7-04D94555B2DD}"/>
-          </ac:spMkLst>
-        </pc:spChg>
-        <pc:picChg chg="add mod ord">
-          <ac:chgData name="Tristin Schlauch" userId="a338a217be8c714a" providerId="LiveId" clId="{745B7E24-5365-4587-8D3A-A90B788E4913}" dt="2025-04-13T03:28:52.188" v="12644" actId="22"/>
-          <ac:picMkLst>
-            <pc:docMk/>
-            <pc:sldMk cId="4223351522" sldId="290"/>
-            <ac:picMk id="9" creationId="{602F1F64-0158-F783-FA48-FFB6D1D842C6}"/>
-          </ac:picMkLst>
-        </pc:picChg>
       </pc:sldChg>
       <pc:sldChg chg="addSp delSp modSp add mod">
         <pc:chgData name="Tristin Schlauch" userId="a338a217be8c714a" providerId="LiveId" clId="{745B7E24-5365-4587-8D3A-A90B788E4913}" dt="2025-04-13T03:34:51.262" v="13023" actId="22"/>
@@ -1365,30 +604,6 @@
           <pc:docMk/>
           <pc:sldMk cId="4070835499" sldId="291"/>
         </pc:sldMkLst>
-        <pc:spChg chg="mod">
-          <ac:chgData name="Tristin Schlauch" userId="a338a217be8c714a" providerId="LiveId" clId="{745B7E24-5365-4587-8D3A-A90B788E4913}" dt="2025-04-13T03:29:48.697" v="12666" actId="20577"/>
-          <ac:spMkLst>
-            <pc:docMk/>
-            <pc:sldMk cId="4070835499" sldId="291"/>
-            <ac:spMk id="2" creationId="{0138ACDC-641D-F7EA-9BA6-34357D230840}"/>
-          </ac:spMkLst>
-        </pc:spChg>
-        <pc:spChg chg="mod">
-          <ac:chgData name="Tristin Schlauch" userId="a338a217be8c714a" providerId="LiveId" clId="{745B7E24-5365-4587-8D3A-A90B788E4913}" dt="2025-04-13T03:32:23.314" v="13021" actId="20577"/>
-          <ac:spMkLst>
-            <pc:docMk/>
-            <pc:sldMk cId="4070835499" sldId="291"/>
-            <ac:spMk id="4" creationId="{6D7071D3-22E5-98DF-289B-8C345521B85B}"/>
-          </ac:spMkLst>
-        </pc:spChg>
-        <pc:picChg chg="add mod ord">
-          <ac:chgData name="Tristin Schlauch" userId="a338a217be8c714a" providerId="LiveId" clId="{745B7E24-5365-4587-8D3A-A90B788E4913}" dt="2025-04-13T03:34:51.262" v="13023" actId="22"/>
-          <ac:picMkLst>
-            <pc:docMk/>
-            <pc:sldMk cId="4070835499" sldId="291"/>
-            <ac:picMk id="7" creationId="{66C01759-0EC2-166E-B390-52F104A7C579}"/>
-          </ac:picMkLst>
-        </pc:picChg>
       </pc:sldChg>
       <pc:sldChg chg="addSp delSp modSp add mod">
         <pc:chgData name="Tristin Schlauch" userId="a338a217be8c714a" providerId="LiveId" clId="{745B7E24-5365-4587-8D3A-A90B788E4913}" dt="2025-04-13T03:41:11.962" v="13488" actId="22"/>
@@ -1396,30 +611,6 @@
           <pc:docMk/>
           <pc:sldMk cId="1132280905" sldId="292"/>
         </pc:sldMkLst>
-        <pc:spChg chg="mod">
-          <ac:chgData name="Tristin Schlauch" userId="a338a217be8c714a" providerId="LiveId" clId="{745B7E24-5365-4587-8D3A-A90B788E4913}" dt="2025-04-13T03:35:28.090" v="13038" actId="20577"/>
-          <ac:spMkLst>
-            <pc:docMk/>
-            <pc:sldMk cId="1132280905" sldId="292"/>
-            <ac:spMk id="2" creationId="{EB5479B6-C70D-AFBA-3011-1D460743D021}"/>
-          </ac:spMkLst>
-        </pc:spChg>
-        <pc:spChg chg="mod">
-          <ac:chgData name="Tristin Schlauch" userId="a338a217be8c714a" providerId="LiveId" clId="{745B7E24-5365-4587-8D3A-A90B788E4913}" dt="2025-04-13T03:38:20.505" v="13486" actId="20577"/>
-          <ac:spMkLst>
-            <pc:docMk/>
-            <pc:sldMk cId="1132280905" sldId="292"/>
-            <ac:spMk id="4" creationId="{D75F54B7-E12C-FDDE-3AED-AC0765FB9538}"/>
-          </ac:spMkLst>
-        </pc:spChg>
-        <pc:picChg chg="add mod ord">
-          <ac:chgData name="Tristin Schlauch" userId="a338a217be8c714a" providerId="LiveId" clId="{745B7E24-5365-4587-8D3A-A90B788E4913}" dt="2025-04-13T03:41:11.962" v="13488" actId="22"/>
-          <ac:picMkLst>
-            <pc:docMk/>
-            <pc:sldMk cId="1132280905" sldId="292"/>
-            <ac:picMk id="8" creationId="{40BCEABD-44F7-C2CE-5BDF-CD711BEA840A}"/>
-          </ac:picMkLst>
-        </pc:picChg>
       </pc:sldChg>
       <pc:sldChg chg="addSp delSp modSp add mod">
         <pc:chgData name="Tristin Schlauch" userId="a338a217be8c714a" providerId="LiveId" clId="{745B7E24-5365-4587-8D3A-A90B788E4913}" dt="2025-04-13T03:50:25.554" v="13904" actId="22"/>
@@ -1427,30 +618,6 @@
           <pc:docMk/>
           <pc:sldMk cId="3159697742" sldId="293"/>
         </pc:sldMkLst>
-        <pc:spChg chg="mod">
-          <ac:chgData name="Tristin Schlauch" userId="a338a217be8c714a" providerId="LiveId" clId="{745B7E24-5365-4587-8D3A-A90B788E4913}" dt="2025-04-13T03:44:02.604" v="13505" actId="2711"/>
-          <ac:spMkLst>
-            <pc:docMk/>
-            <pc:sldMk cId="3159697742" sldId="293"/>
-            <ac:spMk id="2" creationId="{C419449A-96FB-A28F-86C3-96AE88506C16}"/>
-          </ac:spMkLst>
-        </pc:spChg>
-        <pc:spChg chg="mod">
-          <ac:chgData name="Tristin Schlauch" userId="a338a217be8c714a" providerId="LiveId" clId="{745B7E24-5365-4587-8D3A-A90B788E4913}" dt="2025-04-13T03:46:44.034" v="13902" actId="20577"/>
-          <ac:spMkLst>
-            <pc:docMk/>
-            <pc:sldMk cId="3159697742" sldId="293"/>
-            <ac:spMk id="4" creationId="{B8DDB644-9B0B-C128-D97F-88EA771055E9}"/>
-          </ac:spMkLst>
-        </pc:spChg>
-        <pc:picChg chg="add mod ord">
-          <ac:chgData name="Tristin Schlauch" userId="a338a217be8c714a" providerId="LiveId" clId="{745B7E24-5365-4587-8D3A-A90B788E4913}" dt="2025-04-13T03:50:25.554" v="13904" actId="22"/>
-          <ac:picMkLst>
-            <pc:docMk/>
-            <pc:sldMk cId="3159697742" sldId="293"/>
-            <ac:picMk id="7" creationId="{249ECA17-B6D3-F913-6809-2F4823D89938}"/>
-          </ac:picMkLst>
-        </pc:picChg>
       </pc:sldChg>
       <pc:sldChg chg="modSp add mod ord">
         <pc:chgData name="Tristin Schlauch" userId="a338a217be8c714a" providerId="LiveId" clId="{745B7E24-5365-4587-8D3A-A90B788E4913}" dt="2025-04-13T03:57:20.236" v="14471" actId="2711"/>
@@ -1458,22 +625,6 @@
           <pc:docMk/>
           <pc:sldMk cId="1083113515" sldId="294"/>
         </pc:sldMkLst>
-        <pc:spChg chg="mod">
-          <ac:chgData name="Tristin Schlauch" userId="a338a217be8c714a" providerId="LiveId" clId="{745B7E24-5365-4587-8D3A-A90B788E4913}" dt="2025-04-13T03:51:27.607" v="13912" actId="20577"/>
-          <ac:spMkLst>
-            <pc:docMk/>
-            <pc:sldMk cId="1083113515" sldId="294"/>
-            <ac:spMk id="2" creationId="{EF9BB72D-504E-689D-CA51-DCD25FE28BA7}"/>
-          </ac:spMkLst>
-        </pc:spChg>
-        <pc:spChg chg="mod">
-          <ac:chgData name="Tristin Schlauch" userId="a338a217be8c714a" providerId="LiveId" clId="{745B7E24-5365-4587-8D3A-A90B788E4913}" dt="2025-04-13T03:57:20.236" v="14471" actId="2711"/>
-          <ac:spMkLst>
-            <pc:docMk/>
-            <pc:sldMk cId="1083113515" sldId="294"/>
-            <ac:spMk id="3" creationId="{A0EBDB07-7126-4367-7F49-CA77B3BFDC79}"/>
-          </ac:spMkLst>
-        </pc:spChg>
       </pc:sldChg>
       <pc:sldChg chg="modSp add mod ord">
         <pc:chgData name="Tristin Schlauch" userId="a338a217be8c714a" providerId="LiveId" clId="{745B7E24-5365-4587-8D3A-A90B788E4913}" dt="2025-04-13T03:58:05.655" v="14497" actId="20577"/>
@@ -1481,14 +632,6 @@
           <pc:docMk/>
           <pc:sldMk cId="3421698232" sldId="295"/>
         </pc:sldMkLst>
-        <pc:spChg chg="mod">
-          <ac:chgData name="Tristin Schlauch" userId="a338a217be8c714a" providerId="LiveId" clId="{745B7E24-5365-4587-8D3A-A90B788E4913}" dt="2025-04-13T03:58:05.655" v="14497" actId="20577"/>
-          <ac:spMkLst>
-            <pc:docMk/>
-            <pc:sldMk cId="3421698232" sldId="295"/>
-            <ac:spMk id="3" creationId="{ADA80C02-D558-75DD-CFE6-423F148BD32E}"/>
-          </ac:spMkLst>
-        </pc:spChg>
       </pc:sldChg>
       <pc:sldChg chg="addSp delSp modSp add mod ord">
         <pc:chgData name="Tristin Schlauch" userId="a338a217be8c714a" providerId="LiveId" clId="{745B7E24-5365-4587-8D3A-A90B788E4913}" dt="2025-04-13T04:03:27.394" v="14905" actId="688"/>
@@ -1496,30 +639,6 @@
           <pc:docMk/>
           <pc:sldMk cId="3117830446" sldId="296"/>
         </pc:sldMkLst>
-        <pc:spChg chg="mod">
-          <ac:chgData name="Tristin Schlauch" userId="a338a217be8c714a" providerId="LiveId" clId="{745B7E24-5365-4587-8D3A-A90B788E4913}" dt="2025-04-13T03:58:53.306" v="14562" actId="20577"/>
-          <ac:spMkLst>
-            <pc:docMk/>
-            <pc:sldMk cId="3117830446" sldId="296"/>
-            <ac:spMk id="2" creationId="{970973EC-7A88-F2F5-AB1F-FB2B74CA5B19}"/>
-          </ac:spMkLst>
-        </pc:spChg>
-        <pc:spChg chg="mod">
-          <ac:chgData name="Tristin Schlauch" userId="a338a217be8c714a" providerId="LiveId" clId="{745B7E24-5365-4587-8D3A-A90B788E4913}" dt="2025-04-13T04:00:45.856" v="14871" actId="20577"/>
-          <ac:spMkLst>
-            <pc:docMk/>
-            <pc:sldMk cId="3117830446" sldId="296"/>
-            <ac:spMk id="4" creationId="{F7E44726-E14C-3057-C7E9-973D0AFE816B}"/>
-          </ac:spMkLst>
-        </pc:spChg>
-        <pc:picChg chg="add mod">
-          <ac:chgData name="Tristin Schlauch" userId="a338a217be8c714a" providerId="LiveId" clId="{745B7E24-5365-4587-8D3A-A90B788E4913}" dt="2025-04-13T04:03:27.394" v="14905" actId="688"/>
-          <ac:picMkLst>
-            <pc:docMk/>
-            <pc:sldMk cId="3117830446" sldId="296"/>
-            <ac:picMk id="7" creationId="{CD6874FB-60C2-E560-2D99-0F112BD41B74}"/>
-          </ac:picMkLst>
-        </pc:picChg>
       </pc:sldChg>
       <pc:sldChg chg="addSp modSp new mod">
         <pc:chgData name="Tristin Schlauch" userId="a338a217be8c714a" providerId="LiveId" clId="{745B7E24-5365-4587-8D3A-A90B788E4913}" dt="2025-04-13T04:10:34.248" v="15105" actId="1076"/>
@@ -1527,30 +646,6 @@
           <pc:docMk/>
           <pc:sldMk cId="1846569385" sldId="297"/>
         </pc:sldMkLst>
-        <pc:spChg chg="mod">
-          <ac:chgData name="Tristin Schlauch" userId="a338a217be8c714a" providerId="LiveId" clId="{745B7E24-5365-4587-8D3A-A90B788E4913}" dt="2025-04-13T04:03:58.508" v="14947" actId="5793"/>
-          <ac:spMkLst>
-            <pc:docMk/>
-            <pc:sldMk cId="1846569385" sldId="297"/>
-            <ac:spMk id="2" creationId="{C575F51A-9D7F-9FCF-B0DD-3D197744365B}"/>
-          </ac:spMkLst>
-        </pc:spChg>
-        <pc:spChg chg="mod">
-          <ac:chgData name="Tristin Schlauch" userId="a338a217be8c714a" providerId="LiveId" clId="{745B7E24-5365-4587-8D3A-A90B788E4913}" dt="2025-04-13T04:08:41.425" v="15103" actId="20577"/>
-          <ac:spMkLst>
-            <pc:docMk/>
-            <pc:sldMk cId="1846569385" sldId="297"/>
-            <ac:spMk id="3" creationId="{83EB7C95-DAF3-3658-0D6E-0061998D525E}"/>
-          </ac:spMkLst>
-        </pc:spChg>
-        <pc:picChg chg="add mod">
-          <ac:chgData name="Tristin Schlauch" userId="a338a217be8c714a" providerId="LiveId" clId="{745B7E24-5365-4587-8D3A-A90B788E4913}" dt="2025-04-13T04:10:34.248" v="15105" actId="1076"/>
-          <ac:picMkLst>
-            <pc:docMk/>
-            <pc:sldMk cId="1846569385" sldId="297"/>
-            <ac:picMk id="4098" creationId="{727DDF98-1237-9120-A2B8-4AFE1F4222E7}"/>
-          </ac:picMkLst>
-        </pc:picChg>
       </pc:sldChg>
       <pc:sldChg chg="modSp add mod ord">
         <pc:chgData name="Tristin Schlauch" userId="a338a217be8c714a" providerId="LiveId" clId="{745B7E24-5365-4587-8D3A-A90B788E4913}" dt="2025-04-13T05:01:44.942" v="15188" actId="2711"/>
@@ -1558,22 +653,6 @@
           <pc:docMk/>
           <pc:sldMk cId="1867110972" sldId="298"/>
         </pc:sldMkLst>
-        <pc:spChg chg="mod">
-          <ac:chgData name="Tristin Schlauch" userId="a338a217be8c714a" providerId="LiveId" clId="{745B7E24-5365-4587-8D3A-A90B788E4913}" dt="2025-04-13T05:00:09.618" v="15119" actId="20577"/>
-          <ac:spMkLst>
-            <pc:docMk/>
-            <pc:sldMk cId="1867110972" sldId="298"/>
-            <ac:spMk id="2" creationId="{2D30AD2F-D343-F11A-538A-309C8D83F158}"/>
-          </ac:spMkLst>
-        </pc:spChg>
-        <pc:spChg chg="mod">
-          <ac:chgData name="Tristin Schlauch" userId="a338a217be8c714a" providerId="LiveId" clId="{745B7E24-5365-4587-8D3A-A90B788E4913}" dt="2025-04-13T05:01:44.942" v="15188" actId="2711"/>
-          <ac:spMkLst>
-            <pc:docMk/>
-            <pc:sldMk cId="1867110972" sldId="298"/>
-            <ac:spMk id="3" creationId="{7ED7875A-804E-DEE9-A6B3-8FBE9DD55755}"/>
-          </ac:spMkLst>
-        </pc:spChg>
       </pc:sldChg>
       <pc:sldChg chg="add del">
         <pc:chgData name="Tristin Schlauch" userId="a338a217be8c714a" providerId="LiveId" clId="{745B7E24-5365-4587-8D3A-A90B788E4913}" dt="2025-04-13T04:59:49.425" v="15107" actId="2890"/>
@@ -1595,30 +674,6 @@
           <pc:docMk/>
           <pc:sldMk cId="3279583618" sldId="299"/>
         </pc:sldMkLst>
-        <pc:spChg chg="mod">
-          <ac:chgData name="Tristin Schlauch" userId="a338a217be8c714a" providerId="LiveId" clId="{745B7E24-5365-4587-8D3A-A90B788E4913}" dt="2025-04-13T05:02:18.361" v="15214" actId="2711"/>
-          <ac:spMkLst>
-            <pc:docMk/>
-            <pc:sldMk cId="3279583618" sldId="299"/>
-            <ac:spMk id="2" creationId="{3D58AEE9-6C88-AB06-3B58-73C0F1554EDD}"/>
-          </ac:spMkLst>
-        </pc:spChg>
-        <pc:spChg chg="mod">
-          <ac:chgData name="Tristin Schlauch" userId="a338a217be8c714a" providerId="LiveId" clId="{745B7E24-5365-4587-8D3A-A90B788E4913}" dt="2025-04-13T05:05:51.679" v="15564" actId="20577"/>
-          <ac:spMkLst>
-            <pc:docMk/>
-            <pc:sldMk cId="3279583618" sldId="299"/>
-            <ac:spMk id="4" creationId="{ED4B61D4-E747-E26C-4A27-55E099A84EF5}"/>
-          </ac:spMkLst>
-        </pc:spChg>
-        <pc:picChg chg="add mod">
-          <ac:chgData name="Tristin Schlauch" userId="a338a217be8c714a" providerId="LiveId" clId="{745B7E24-5365-4587-8D3A-A90B788E4913}" dt="2025-04-13T05:14:58.691" v="15576" actId="931"/>
-          <ac:picMkLst>
-            <pc:docMk/>
-            <pc:sldMk cId="3279583618" sldId="299"/>
-            <ac:picMk id="8" creationId="{806B8406-D546-146B-6CAA-8CA6F7AB411F}"/>
-          </ac:picMkLst>
-        </pc:picChg>
       </pc:sldChg>
       <pc:sldChg chg="add del replId">
         <pc:chgData name="Tristin Schlauch" userId="a338a217be8c714a" providerId="LiveId" clId="{745B7E24-5365-4587-8D3A-A90B788E4913}" dt="2025-04-13T04:59:49.425" v="15107" actId="2890"/>
@@ -1633,30 +688,6 @@
           <pc:docMk/>
           <pc:sldMk cId="2934335830" sldId="300"/>
         </pc:sldMkLst>
-        <pc:spChg chg="mod">
-          <ac:chgData name="Tristin Schlauch" userId="a338a217be8c714a" providerId="LiveId" clId="{745B7E24-5365-4587-8D3A-A90B788E4913}" dt="2025-04-13T05:15:30.957" v="15592" actId="20577"/>
-          <ac:spMkLst>
-            <pc:docMk/>
-            <pc:sldMk cId="2934335830" sldId="300"/>
-            <ac:spMk id="2" creationId="{19C4D249-E94A-4543-6D28-94895EF633AD}"/>
-          </ac:spMkLst>
-        </pc:spChg>
-        <pc:spChg chg="mod">
-          <ac:chgData name="Tristin Schlauch" userId="a338a217be8c714a" providerId="LiveId" clId="{745B7E24-5365-4587-8D3A-A90B788E4913}" dt="2025-04-13T05:21:06.541" v="16084" actId="27636"/>
-          <ac:spMkLst>
-            <pc:docMk/>
-            <pc:sldMk cId="2934335830" sldId="300"/>
-            <ac:spMk id="4" creationId="{F81B6D4B-8FCF-09F1-8C10-6CD5F1AA7669}"/>
-          </ac:spMkLst>
-        </pc:spChg>
-        <pc:picChg chg="add mod ord">
-          <ac:chgData name="Tristin Schlauch" userId="a338a217be8c714a" providerId="LiveId" clId="{745B7E24-5365-4587-8D3A-A90B788E4913}" dt="2025-04-13T05:24:14.030" v="16086" actId="22"/>
-          <ac:picMkLst>
-            <pc:docMk/>
-            <pc:sldMk cId="2934335830" sldId="300"/>
-            <ac:picMk id="7" creationId="{2E74C6D3-9CC1-C684-31A9-19A09974F807}"/>
-          </ac:picMkLst>
-        </pc:picChg>
       </pc:sldChg>
       <pc:sldChg chg="addSp delSp modSp add mod">
         <pc:chgData name="Tristin Schlauch" userId="a338a217be8c714a" providerId="LiveId" clId="{745B7E24-5365-4587-8D3A-A90B788E4913}" dt="2025-04-14T01:05:45.895" v="16848" actId="20577"/>
@@ -1664,30 +695,6 @@
           <pc:docMk/>
           <pc:sldMk cId="1487682697" sldId="301"/>
         </pc:sldMkLst>
-        <pc:spChg chg="mod">
-          <ac:chgData name="Tristin Schlauch" userId="a338a217be8c714a" providerId="LiveId" clId="{745B7E24-5365-4587-8D3A-A90B788E4913}" dt="2025-04-13T05:26:46.907" v="16108" actId="2711"/>
-          <ac:spMkLst>
-            <pc:docMk/>
-            <pc:sldMk cId="1487682697" sldId="301"/>
-            <ac:spMk id="2" creationId="{7C792E85-639F-9789-89E6-44CD2CE0BF6D}"/>
-          </ac:spMkLst>
-        </pc:spChg>
-        <pc:spChg chg="mod">
-          <ac:chgData name="Tristin Schlauch" userId="a338a217be8c714a" providerId="LiveId" clId="{745B7E24-5365-4587-8D3A-A90B788E4913}" dt="2025-04-14T01:05:45.895" v="16848" actId="20577"/>
-          <ac:spMkLst>
-            <pc:docMk/>
-            <pc:sldMk cId="1487682697" sldId="301"/>
-            <ac:spMk id="4" creationId="{A322866E-4416-98B4-FD6E-8AE477B887DA}"/>
-          </ac:spMkLst>
-        </pc:spChg>
-        <pc:picChg chg="add mod ord">
-          <ac:chgData name="Tristin Schlauch" userId="a338a217be8c714a" providerId="LiveId" clId="{745B7E24-5365-4587-8D3A-A90B788E4913}" dt="2025-04-13T15:07:54.267" v="16615" actId="22"/>
-          <ac:picMkLst>
-            <pc:docMk/>
-            <pc:sldMk cId="1487682697" sldId="301"/>
-            <ac:picMk id="8" creationId="{EF6C0923-CE33-03D9-42DE-3E1123C5F643}"/>
-          </ac:picMkLst>
-        </pc:picChg>
       </pc:sldChg>
       <pc:sldChg chg="add del replId">
         <pc:chgData name="Tristin Schlauch" userId="a338a217be8c714a" providerId="LiveId" clId="{745B7E24-5365-4587-8D3A-A90B788E4913}" dt="2025-04-13T04:59:49.425" v="15107" actId="2890"/>
@@ -1709,30 +716,6 @@
           <pc:docMk/>
           <pc:sldMk cId="1892604837" sldId="302"/>
         </pc:sldMkLst>
-        <pc:spChg chg="mod">
-          <ac:chgData name="Tristin Schlauch" userId="a338a217be8c714a" providerId="LiveId" clId="{745B7E24-5365-4587-8D3A-A90B788E4913}" dt="2025-04-14T01:02:53.704" v="16639" actId="20577"/>
-          <ac:spMkLst>
-            <pc:docMk/>
-            <pc:sldMk cId="1892604837" sldId="302"/>
-            <ac:spMk id="2" creationId="{4A843283-840F-F4EC-75FA-4FE5D464F065}"/>
-          </ac:spMkLst>
-        </pc:spChg>
-        <pc:spChg chg="mod">
-          <ac:chgData name="Tristin Schlauch" userId="a338a217be8c714a" providerId="LiveId" clId="{745B7E24-5365-4587-8D3A-A90B788E4913}" dt="2025-04-14T01:10:53.686" v="17188" actId="20577"/>
-          <ac:spMkLst>
-            <pc:docMk/>
-            <pc:sldMk cId="1892604837" sldId="302"/>
-            <ac:spMk id="4" creationId="{9C8D5567-4387-E560-D7B2-2AD78982F9A0}"/>
-          </ac:spMkLst>
-        </pc:spChg>
-        <pc:picChg chg="add mod ord">
-          <ac:chgData name="Tristin Schlauch" userId="a338a217be8c714a" providerId="LiveId" clId="{745B7E24-5365-4587-8D3A-A90B788E4913}" dt="2025-04-14T01:15:50.091" v="17190" actId="22"/>
-          <ac:picMkLst>
-            <pc:docMk/>
-            <pc:sldMk cId="1892604837" sldId="302"/>
-            <ac:picMk id="7" creationId="{723E0EF0-DF5A-3ACD-19C7-DC112EC2C1DA}"/>
-          </ac:picMkLst>
-        </pc:picChg>
       </pc:sldChg>
       <pc:sldChg chg="add del">
         <pc:chgData name="Tristin Schlauch" userId="a338a217be8c714a" providerId="LiveId" clId="{745B7E24-5365-4587-8D3A-A90B788E4913}" dt="2025-04-14T01:20:02.136" v="17192" actId="2696"/>
@@ -1754,30 +737,6 @@
           <pc:docMk/>
           <pc:sldMk cId="4004496122" sldId="303"/>
         </pc:sldMkLst>
-        <pc:spChg chg="mod">
-          <ac:chgData name="Tristin Schlauch" userId="a338a217be8c714a" providerId="LiveId" clId="{745B7E24-5365-4587-8D3A-A90B788E4913}" dt="2025-04-14T01:20:09.710" v="17200" actId="20577"/>
-          <ac:spMkLst>
-            <pc:docMk/>
-            <pc:sldMk cId="4004496122" sldId="303"/>
-            <ac:spMk id="2" creationId="{F29A503F-6B34-224F-01CC-E06D7B615D61}"/>
-          </ac:spMkLst>
-        </pc:spChg>
-        <pc:spChg chg="mod">
-          <ac:chgData name="Tristin Schlauch" userId="a338a217be8c714a" providerId="LiveId" clId="{745B7E24-5365-4587-8D3A-A90B788E4913}" dt="2025-04-14T01:31:30.646" v="17515" actId="20577"/>
-          <ac:spMkLst>
-            <pc:docMk/>
-            <pc:sldMk cId="4004496122" sldId="303"/>
-            <ac:spMk id="4" creationId="{930DA5C7-191D-1483-9670-3F1E5A5B9BD6}"/>
-          </ac:spMkLst>
-        </pc:spChg>
-        <pc:picChg chg="add mod ord">
-          <ac:chgData name="Tristin Schlauch" userId="a338a217be8c714a" providerId="LiveId" clId="{745B7E24-5365-4587-8D3A-A90B788E4913}" dt="2025-04-14T01:27:17.232" v="17441" actId="22"/>
-          <ac:picMkLst>
-            <pc:docMk/>
-            <pc:sldMk cId="4004496122" sldId="303"/>
-            <ac:picMk id="10" creationId="{66378315-FCC1-BD67-9F62-EDE6E4EFDEC3}"/>
-          </ac:picMkLst>
-        </pc:picChg>
       </pc:sldChg>
       <pc:sldChg chg="modSp add mod ord">
         <pc:chgData name="Tristin Schlauch" userId="a338a217be8c714a" providerId="LiveId" clId="{745B7E24-5365-4587-8D3A-A90B788E4913}" dt="2025-04-14T04:13:32.583" v="18318" actId="114"/>
@@ -1785,22 +744,6 @@
           <pc:docMk/>
           <pc:sldMk cId="1437784268" sldId="304"/>
         </pc:sldMkLst>
-        <pc:spChg chg="mod">
-          <ac:chgData name="Tristin Schlauch" userId="a338a217be8c714a" providerId="LiveId" clId="{745B7E24-5365-4587-8D3A-A90B788E4913}" dt="2025-04-14T01:27:58.198" v="17450" actId="20577"/>
-          <ac:spMkLst>
-            <pc:docMk/>
-            <pc:sldMk cId="1437784268" sldId="304"/>
-            <ac:spMk id="2" creationId="{5ECFEC8A-215A-14ED-EFD8-FC682D6CE1B2}"/>
-          </ac:spMkLst>
-        </pc:spChg>
-        <pc:spChg chg="mod">
-          <ac:chgData name="Tristin Schlauch" userId="a338a217be8c714a" providerId="LiveId" clId="{745B7E24-5365-4587-8D3A-A90B788E4913}" dt="2025-04-14T04:13:32.583" v="18318" actId="114"/>
-          <ac:spMkLst>
-            <pc:docMk/>
-            <pc:sldMk cId="1437784268" sldId="304"/>
-            <ac:spMk id="3" creationId="{0AE91960-3880-7D44-AAE7-2EB179460D25}"/>
-          </ac:spMkLst>
-        </pc:spChg>
       </pc:sldChg>
       <pc:sldChg chg="modSp add mod ord">
         <pc:chgData name="Tristin Schlauch" userId="a338a217be8c714a" providerId="LiveId" clId="{745B7E24-5365-4587-8D3A-A90B788E4913}" dt="2025-04-14T05:27:34.883" v="18429" actId="2711"/>
@@ -1808,22 +751,6 @@
           <pc:docMk/>
           <pc:sldMk cId="2624744852" sldId="305"/>
         </pc:sldMkLst>
-        <pc:spChg chg="mod">
-          <ac:chgData name="Tristin Schlauch" userId="a338a217be8c714a" providerId="LiveId" clId="{745B7E24-5365-4587-8D3A-A90B788E4913}" dt="2025-04-14T05:26:46.304" v="18342" actId="20577"/>
-          <ac:spMkLst>
-            <pc:docMk/>
-            <pc:sldMk cId="2624744852" sldId="305"/>
-            <ac:spMk id="2" creationId="{6998DEA8-444C-136C-5A67-D610529F88F2}"/>
-          </ac:spMkLst>
-        </pc:spChg>
-        <pc:spChg chg="mod">
-          <ac:chgData name="Tristin Schlauch" userId="a338a217be8c714a" providerId="LiveId" clId="{745B7E24-5365-4587-8D3A-A90B788E4913}" dt="2025-04-14T05:27:34.883" v="18429" actId="2711"/>
-          <ac:spMkLst>
-            <pc:docMk/>
-            <pc:sldMk cId="2624744852" sldId="305"/>
-            <ac:spMk id="3" creationId="{220DF6E1-8AC4-A5B6-1FEC-B8240D735CAA}"/>
-          </ac:spMkLst>
-        </pc:spChg>
       </pc:sldChg>
       <pc:sldChg chg="addSp delSp modSp add mod ord setBg">
         <pc:chgData name="Tristin Schlauch" userId="a338a217be8c714a" providerId="LiveId" clId="{745B7E24-5365-4587-8D3A-A90B788E4913}" dt="2025-04-14T05:43:43.230" v="18929" actId="26606"/>
@@ -1831,30 +758,6 @@
           <pc:docMk/>
           <pc:sldMk cId="3307451720" sldId="306"/>
         </pc:sldMkLst>
-        <pc:spChg chg="mod">
-          <ac:chgData name="Tristin Schlauch" userId="a338a217be8c714a" providerId="LiveId" clId="{745B7E24-5365-4587-8D3A-A90B788E4913}" dt="2025-04-14T05:43:43.230" v="18929" actId="26606"/>
-          <ac:spMkLst>
-            <pc:docMk/>
-            <pc:sldMk cId="3307451720" sldId="306"/>
-            <ac:spMk id="2" creationId="{0251FD89-B263-7FBE-EA6A-0E49E3F500A7}"/>
-          </ac:spMkLst>
-        </pc:spChg>
-        <pc:spChg chg="mod ord">
-          <ac:chgData name="Tristin Schlauch" userId="a338a217be8c714a" providerId="LiveId" clId="{745B7E24-5365-4587-8D3A-A90B788E4913}" dt="2025-04-14T05:43:43.230" v="18929" actId="26606"/>
-          <ac:spMkLst>
-            <pc:docMk/>
-            <pc:sldMk cId="3307451720" sldId="306"/>
-            <ac:spMk id="4" creationId="{969E3E9A-54BF-099C-CE51-87220DE63D76}"/>
-          </ac:spMkLst>
-        </pc:spChg>
-        <pc:picChg chg="add del mod ord">
-          <ac:chgData name="Tristin Schlauch" userId="a338a217be8c714a" providerId="LiveId" clId="{745B7E24-5365-4587-8D3A-A90B788E4913}" dt="2025-04-14T05:43:43.230" v="18929" actId="26606"/>
-          <ac:picMkLst>
-            <pc:docMk/>
-            <pc:sldMk cId="3307451720" sldId="306"/>
-            <ac:picMk id="8" creationId="{FF11A01B-B5F8-B7AD-F971-5D6A027FB2E6}"/>
-          </ac:picMkLst>
-        </pc:picChg>
       </pc:sldChg>
       <pc:sldChg chg="addSp delSp modSp add mod">
         <pc:chgData name="Tristin Schlauch" userId="a338a217be8c714a" providerId="LiveId" clId="{745B7E24-5365-4587-8D3A-A90B788E4913}" dt="2025-04-14T15:10:43.671" v="19799" actId="22"/>
@@ -1862,30 +765,6 @@
           <pc:docMk/>
           <pc:sldMk cId="1058649570" sldId="307"/>
         </pc:sldMkLst>
-        <pc:spChg chg="mod">
-          <ac:chgData name="Tristin Schlauch" userId="a338a217be8c714a" providerId="LiveId" clId="{745B7E24-5365-4587-8D3A-A90B788E4913}" dt="2025-04-14T14:57:17.287" v="19629" actId="20577"/>
-          <ac:spMkLst>
-            <pc:docMk/>
-            <pc:sldMk cId="1058649570" sldId="307"/>
-            <ac:spMk id="2" creationId="{997C19F3-C297-CBAA-13F3-2B709CF1D3DF}"/>
-          </ac:spMkLst>
-        </pc:spChg>
-        <pc:spChg chg="mod">
-          <ac:chgData name="Tristin Schlauch" userId="a338a217be8c714a" providerId="LiveId" clId="{745B7E24-5365-4587-8D3A-A90B788E4913}" dt="2025-04-14T14:56:33.372" v="19616" actId="27636"/>
-          <ac:spMkLst>
-            <pc:docMk/>
-            <pc:sldMk cId="1058649570" sldId="307"/>
-            <ac:spMk id="4" creationId="{9AE8CB28-06D3-CDF0-B8A9-CD2CBABCE21C}"/>
-          </ac:spMkLst>
-        </pc:spChg>
-        <pc:picChg chg="add mod ord">
-          <ac:chgData name="Tristin Schlauch" userId="a338a217be8c714a" providerId="LiveId" clId="{745B7E24-5365-4587-8D3A-A90B788E4913}" dt="2025-04-14T15:10:43.671" v="19799" actId="22"/>
-          <ac:picMkLst>
-            <pc:docMk/>
-            <pc:sldMk cId="1058649570" sldId="307"/>
-            <ac:picMk id="7" creationId="{0C4750E4-FAEC-9E34-40C2-B3D7E81EDEC6}"/>
-          </ac:picMkLst>
-        </pc:picChg>
       </pc:sldChg>
       <pc:sldChg chg="addSp delSp modSp add mod setBg">
         <pc:chgData name="Tristin Schlauch" userId="a338a217be8c714a" providerId="LiveId" clId="{745B7E24-5365-4587-8D3A-A90B788E4913}" dt="2025-04-14T18:44:46.509" v="20610" actId="22"/>
@@ -1893,30 +772,6 @@
           <pc:docMk/>
           <pc:sldMk cId="1867005351" sldId="308"/>
         </pc:sldMkLst>
-        <pc:spChg chg="mod">
-          <ac:chgData name="Tristin Schlauch" userId="a338a217be8c714a" providerId="LiveId" clId="{745B7E24-5365-4587-8D3A-A90B788E4913}" dt="2025-04-14T18:44:44.732" v="20608" actId="26606"/>
-          <ac:spMkLst>
-            <pc:docMk/>
-            <pc:sldMk cId="1867005351" sldId="308"/>
-            <ac:spMk id="2" creationId="{A355256E-9A95-5A3B-FABA-26E1A9F7B755}"/>
-          </ac:spMkLst>
-        </pc:spChg>
-        <pc:spChg chg="mod ord">
-          <ac:chgData name="Tristin Schlauch" userId="a338a217be8c714a" providerId="LiveId" clId="{745B7E24-5365-4587-8D3A-A90B788E4913}" dt="2025-04-14T18:44:44.732" v="20608" actId="26606"/>
-          <ac:spMkLst>
-            <pc:docMk/>
-            <pc:sldMk cId="1867005351" sldId="308"/>
-            <ac:spMk id="4" creationId="{6135DD7F-C96D-4AC1-8EEC-CFE155FBB753}"/>
-          </ac:spMkLst>
-        </pc:spChg>
-        <pc:picChg chg="add del mod ord">
-          <ac:chgData name="Tristin Schlauch" userId="a338a217be8c714a" providerId="LiveId" clId="{745B7E24-5365-4587-8D3A-A90B788E4913}" dt="2025-04-14T18:44:46.509" v="20610" actId="22"/>
-          <ac:picMkLst>
-            <pc:docMk/>
-            <pc:sldMk cId="1867005351" sldId="308"/>
-            <ac:picMk id="7" creationId="{B9D55F8F-AF30-9A02-27A9-3E1E5AAF1B91}"/>
-          </ac:picMkLst>
-        </pc:picChg>
       </pc:sldChg>
       <pc:sldChg chg="addSp delSp modSp add mod">
         <pc:chgData name="Tristin Schlauch" userId="a338a217be8c714a" providerId="LiveId" clId="{745B7E24-5365-4587-8D3A-A90B788E4913}" dt="2025-04-14T18:22:26.522" v="20119" actId="22"/>
@@ -1924,30 +779,6 @@
           <pc:docMk/>
           <pc:sldMk cId="488744653" sldId="309"/>
         </pc:sldMkLst>
-        <pc:spChg chg="mod">
-          <ac:chgData name="Tristin Schlauch" userId="a338a217be8c714a" providerId="LiveId" clId="{745B7E24-5365-4587-8D3A-A90B788E4913}" dt="2025-04-14T15:08:07.718" v="19645" actId="20577"/>
-          <ac:spMkLst>
-            <pc:docMk/>
-            <pc:sldMk cId="488744653" sldId="309"/>
-            <ac:spMk id="2" creationId="{D6C37F16-F00D-1C0C-1C88-A4AC026DBD81}"/>
-          </ac:spMkLst>
-        </pc:spChg>
-        <pc:spChg chg="mod">
-          <ac:chgData name="Tristin Schlauch" userId="a338a217be8c714a" providerId="LiveId" clId="{745B7E24-5365-4587-8D3A-A90B788E4913}" dt="2025-04-14T18:19:03.507" v="20118" actId="20577"/>
-          <ac:spMkLst>
-            <pc:docMk/>
-            <pc:sldMk cId="488744653" sldId="309"/>
-            <ac:spMk id="4" creationId="{6E3E5EFA-28AF-4AB2-B576-B2906F8E433E}"/>
-          </ac:spMkLst>
-        </pc:spChg>
-        <pc:picChg chg="add mod ord">
-          <ac:chgData name="Tristin Schlauch" userId="a338a217be8c714a" providerId="LiveId" clId="{745B7E24-5365-4587-8D3A-A90B788E4913}" dt="2025-04-14T18:22:26.522" v="20119" actId="22"/>
-          <ac:picMkLst>
-            <pc:docMk/>
-            <pc:sldMk cId="488744653" sldId="309"/>
-            <ac:picMk id="6" creationId="{07EAC808-687B-9799-5366-0E8639C3BC2E}"/>
-          </ac:picMkLst>
-        </pc:picChg>
       </pc:sldChg>
       <pc:sldChg chg="modSp add mod ord">
         <pc:chgData name="Tristin Schlauch" userId="a338a217be8c714a" providerId="LiveId" clId="{745B7E24-5365-4587-8D3A-A90B788E4913}" dt="2025-04-15T16:08:49.632" v="21398" actId="20577"/>
@@ -1955,22 +786,6 @@
           <pc:docMk/>
           <pc:sldMk cId="265935431" sldId="310"/>
         </pc:sldMkLst>
-        <pc:spChg chg="mod">
-          <ac:chgData name="Tristin Schlauch" userId="a338a217be8c714a" providerId="LiveId" clId="{745B7E24-5365-4587-8D3A-A90B788E4913}" dt="2025-04-15T16:00:16.304" v="20622" actId="20577"/>
-          <ac:spMkLst>
-            <pc:docMk/>
-            <pc:sldMk cId="265935431" sldId="310"/>
-            <ac:spMk id="2" creationId="{E2F2A858-802F-6314-6499-30E777656A8A}"/>
-          </ac:spMkLst>
-        </pc:spChg>
-        <pc:spChg chg="mod">
-          <ac:chgData name="Tristin Schlauch" userId="a338a217be8c714a" providerId="LiveId" clId="{745B7E24-5365-4587-8D3A-A90B788E4913}" dt="2025-04-15T16:08:49.632" v="21398" actId="20577"/>
-          <ac:spMkLst>
-            <pc:docMk/>
-            <pc:sldMk cId="265935431" sldId="310"/>
-            <ac:spMk id="3" creationId="{5D8C002A-5C37-F129-A386-6ABFEFADF798}"/>
-          </ac:spMkLst>
-        </pc:spChg>
       </pc:sldChg>
       <pc:sldChg chg="modSp add mod ord">
         <pc:chgData name="Tristin Schlauch" userId="a338a217be8c714a" providerId="LiveId" clId="{745B7E24-5365-4587-8D3A-A90B788E4913}" dt="2025-04-15T16:19:15.762" v="21475" actId="20577"/>
@@ -1978,22 +793,6 @@
           <pc:docMk/>
           <pc:sldMk cId="2037836037" sldId="311"/>
         </pc:sldMkLst>
-        <pc:spChg chg="mod">
-          <ac:chgData name="Tristin Schlauch" userId="a338a217be8c714a" providerId="LiveId" clId="{745B7E24-5365-4587-8D3A-A90B788E4913}" dt="2025-04-15T16:15:26.940" v="21415" actId="20577"/>
-          <ac:spMkLst>
-            <pc:docMk/>
-            <pc:sldMk cId="2037836037" sldId="311"/>
-            <ac:spMk id="2" creationId="{2B269A59-4835-EC01-6D90-A8665B1D68E0}"/>
-          </ac:spMkLst>
-        </pc:spChg>
-        <pc:spChg chg="mod">
-          <ac:chgData name="Tristin Schlauch" userId="a338a217be8c714a" providerId="LiveId" clId="{745B7E24-5365-4587-8D3A-A90B788E4913}" dt="2025-04-15T16:19:15.762" v="21475" actId="20577"/>
-          <ac:spMkLst>
-            <pc:docMk/>
-            <pc:sldMk cId="2037836037" sldId="311"/>
-            <ac:spMk id="3" creationId="{C360592A-DD20-8E56-B3FE-7BEB01D515E2}"/>
-          </ac:spMkLst>
-        </pc:spChg>
       </pc:sldChg>
       <pc:sldChg chg="addSp delSp modSp new mod">
         <pc:chgData name="Tristin Schlauch" userId="a338a217be8c714a" providerId="LiveId" clId="{745B7E24-5365-4587-8D3A-A90B788E4913}" dt="2025-04-15T16:48:51.445" v="22546" actId="1076"/>
@@ -2001,86 +800,6 @@
           <pc:docMk/>
           <pc:sldMk cId="2413290824" sldId="312"/>
         </pc:sldMkLst>
-        <pc:spChg chg="mod">
-          <ac:chgData name="Tristin Schlauch" userId="a338a217be8c714a" providerId="LiveId" clId="{745B7E24-5365-4587-8D3A-A90B788E4913}" dt="2025-04-15T16:19:52.941" v="21551" actId="20577"/>
-          <ac:spMkLst>
-            <pc:docMk/>
-            <pc:sldMk cId="2413290824" sldId="312"/>
-            <ac:spMk id="2" creationId="{5A9735AC-4EC4-A4A4-59B7-816F1FAC6B7F}"/>
-          </ac:spMkLst>
-        </pc:spChg>
-        <pc:spChg chg="add del mod">
-          <ac:chgData name="Tristin Schlauch" userId="a338a217be8c714a" providerId="LiveId" clId="{745B7E24-5365-4587-8D3A-A90B788E4913}" dt="2025-04-15T16:25:49.507" v="21633" actId="20577"/>
-          <ac:spMkLst>
-            <pc:docMk/>
-            <pc:sldMk cId="2413290824" sldId="312"/>
-            <ac:spMk id="3" creationId="{81CDEC6C-E2E0-57B4-ACC8-81DB8D687CAE}"/>
-          </ac:spMkLst>
-        </pc:spChg>
-        <pc:spChg chg="add del mod">
-          <ac:chgData name="Tristin Schlauch" userId="a338a217be8c714a" providerId="LiveId" clId="{745B7E24-5365-4587-8D3A-A90B788E4913}" dt="2025-04-15T16:39:03.669" v="21979" actId="20577"/>
-          <ac:spMkLst>
-            <pc:docMk/>
-            <pc:sldMk cId="2413290824" sldId="312"/>
-            <ac:spMk id="4" creationId="{613DF58A-6EF5-7F82-B571-A26513A8FC46}"/>
-          </ac:spMkLst>
-        </pc:spChg>
-        <pc:spChg chg="add del mod">
-          <ac:chgData name="Tristin Schlauch" userId="a338a217be8c714a" providerId="LiveId" clId="{745B7E24-5365-4587-8D3A-A90B788E4913}" dt="2025-04-15T16:25:11.100" v="21622" actId="1076"/>
-          <ac:spMkLst>
-            <pc:docMk/>
-            <pc:sldMk cId="2413290824" sldId="312"/>
-            <ac:spMk id="7" creationId="{2E8BF058-8FDE-630A-1B2C-40D63E8EE694}"/>
-          </ac:spMkLst>
-        </pc:spChg>
-        <pc:spChg chg="add del mod">
-          <ac:chgData name="Tristin Schlauch" userId="a338a217be8c714a" providerId="LiveId" clId="{745B7E24-5365-4587-8D3A-A90B788E4913}" dt="2025-04-15T16:41:30.636" v="22504" actId="6549"/>
-          <ac:spMkLst>
-            <pc:docMk/>
-            <pc:sldMk cId="2413290824" sldId="312"/>
-            <ac:spMk id="8" creationId="{19BD7F47-2209-4F68-AE16-F0452F022F90}"/>
-          </ac:spMkLst>
-        </pc:spChg>
-        <pc:spChg chg="add del mod">
-          <ac:chgData name="Tristin Schlauch" userId="a338a217be8c714a" providerId="LiveId" clId="{745B7E24-5365-4587-8D3A-A90B788E4913}" dt="2025-04-15T16:25:20.204" v="21623" actId="1076"/>
-          <ac:spMkLst>
-            <pc:docMk/>
-            <pc:sldMk cId="2413290824" sldId="312"/>
-            <ac:spMk id="11" creationId="{B92AE9D6-4E02-EF14-DE42-E646B8D39E6E}"/>
-          </ac:spMkLst>
-        </pc:spChg>
-        <pc:spChg chg="add del mod">
-          <ac:chgData name="Tristin Schlauch" userId="a338a217be8c714a" providerId="LiveId" clId="{745B7E24-5365-4587-8D3A-A90B788E4913}" dt="2025-04-15T16:41:02.807" v="22453" actId="20577"/>
-          <ac:spMkLst>
-            <pc:docMk/>
-            <pc:sldMk cId="2413290824" sldId="312"/>
-            <ac:spMk id="12" creationId="{37602C67-283E-D51F-27DF-B478A060C585}"/>
-          </ac:spMkLst>
-        </pc:spChg>
-        <pc:picChg chg="add mod">
-          <ac:chgData name="Tristin Schlauch" userId="a338a217be8c714a" providerId="LiveId" clId="{745B7E24-5365-4587-8D3A-A90B788E4913}" dt="2025-04-15T16:48:51.445" v="22546" actId="1076"/>
-          <ac:picMkLst>
-            <pc:docMk/>
-            <pc:sldMk cId="2413290824" sldId="312"/>
-            <ac:picMk id="1026" creationId="{D988FBEA-961D-90FF-BEAD-1B998D44EABB}"/>
-          </ac:picMkLst>
-        </pc:picChg>
-        <pc:picChg chg="add mod">
-          <ac:chgData name="Tristin Schlauch" userId="a338a217be8c714a" providerId="LiveId" clId="{745B7E24-5365-4587-8D3A-A90B788E4913}" dt="2025-04-15T16:48:45.695" v="22545" actId="1076"/>
-          <ac:picMkLst>
-            <pc:docMk/>
-            <pc:sldMk cId="2413290824" sldId="312"/>
-            <ac:picMk id="1028" creationId="{2F9EB716-2351-CD0E-9439-9433723D55C3}"/>
-          </ac:picMkLst>
-        </pc:picChg>
-        <pc:picChg chg="add mod">
-          <ac:chgData name="Tristin Schlauch" userId="a338a217be8c714a" providerId="LiveId" clId="{745B7E24-5365-4587-8D3A-A90B788E4913}" dt="2025-04-15T16:48:26.154" v="22541" actId="1440"/>
-          <ac:picMkLst>
-            <pc:docMk/>
-            <pc:sldMk cId="2413290824" sldId="312"/>
-            <ac:picMk id="1030" creationId="{50D34FCC-B5DA-D316-537C-B66473D585AC}"/>
-          </ac:picMkLst>
-        </pc:picChg>
       </pc:sldChg>
       <pc:sldChg chg="new del">
         <pc:chgData name="Tristin Schlauch" userId="a338a217be8c714a" providerId="LiveId" clId="{745B7E24-5365-4587-8D3A-A90B788E4913}" dt="2025-04-15T16:50:15.977" v="22548" actId="680"/>
@@ -2095,22 +814,6 @@
           <pc:docMk/>
           <pc:sldMk cId="3892297789" sldId="313"/>
         </pc:sldMkLst>
-        <pc:spChg chg="mod">
-          <ac:chgData name="Tristin Schlauch" userId="a338a217be8c714a" providerId="LiveId" clId="{745B7E24-5365-4587-8D3A-A90B788E4913}" dt="2025-04-15T16:50:25.979" v="22559" actId="20577"/>
-          <ac:spMkLst>
-            <pc:docMk/>
-            <pc:sldMk cId="3892297789" sldId="313"/>
-            <ac:spMk id="2" creationId="{17EDDFEF-37D8-BEB2-9F29-90BC09632AF7}"/>
-          </ac:spMkLst>
-        </pc:spChg>
-        <pc:spChg chg="mod">
-          <ac:chgData name="Tristin Schlauch" userId="a338a217be8c714a" providerId="LiveId" clId="{745B7E24-5365-4587-8D3A-A90B788E4913}" dt="2025-04-15T16:51:26.988" v="22690" actId="20577"/>
-          <ac:spMkLst>
-            <pc:docMk/>
-            <pc:sldMk cId="3892297789" sldId="313"/>
-            <ac:spMk id="3" creationId="{A580FB24-C5D2-151A-3952-F5CB44B8C001}"/>
-          </ac:spMkLst>
-        </pc:spChg>
       </pc:sldChg>
     </pc:docChg>
   </pc:docChgLst>
@@ -2135,14 +838,6 @@
             <ac:spMk id="3" creationId="{CC0B45B2-181F-F932-01A4-A57EFA39835A}"/>
           </ac:spMkLst>
         </pc:spChg>
-        <pc:picChg chg="add del mod">
-          <ac:chgData name="Tristin Schlauch" userId="a338a217be8c714a" providerId="LiveId" clId="{224AFB37-81B3-4C06-9FE7-888E941E794D}" dt="2025-07-08T22:31:36.792" v="70" actId="478"/>
-          <ac:picMkLst>
-            <pc:docMk/>
-            <pc:sldMk cId="1363732710" sldId="260"/>
-            <ac:picMk id="5" creationId="{28E2DCB5-2FDF-4542-EA05-003803F6652F}"/>
-          </ac:picMkLst>
-        </pc:picChg>
       </pc:sldChg>
       <pc:sldChg chg="addSp delSp modSp new mod">
         <pc:chgData name="Tristin Schlauch" userId="a338a217be8c714a" providerId="LiveId" clId="{224AFB37-81B3-4C06-9FE7-888E941E794D}" dt="2025-07-08T22:50:32.056" v="704" actId="20577"/>
@@ -2150,14 +845,6 @@
           <pc:docMk/>
           <pc:sldMk cId="2399293795" sldId="314"/>
         </pc:sldMkLst>
-        <pc:spChg chg="add del">
-          <ac:chgData name="Tristin Schlauch" userId="a338a217be8c714a" providerId="LiveId" clId="{224AFB37-81B3-4C06-9FE7-888E941E794D}" dt="2025-07-08T22:34:12.293" v="403" actId="478"/>
-          <ac:spMkLst>
-            <pc:docMk/>
-            <pc:sldMk cId="2399293795" sldId="314"/>
-            <ac:spMk id="2" creationId="{17633D85-9EF8-59FD-1417-C3C0B413E3D0}"/>
-          </ac:spMkLst>
-        </pc:spChg>
         <pc:spChg chg="add mod">
           <ac:chgData name="Tristin Schlauch" userId="a338a217be8c714a" providerId="LiveId" clId="{224AFB37-81B3-4C06-9FE7-888E941E794D}" dt="2025-07-08T22:35:51.470" v="412" actId="14100"/>
           <ac:spMkLst>
@@ -2350,7 +1037,7 @@
           <a:p>
             <a:fld id="{65AF3EA3-B7E0-4619-AFE0-7D039F23CDB1}" type="datetimeFigureOut">
               <a:rPr lang="en-CA" smtClean="0"/>
-              <a:t>2025-07-06</a:t>
+              <a:t>2025-07-25</a:t>
             </a:fld>
             <a:endParaRPr lang="en-CA"/>
           </a:p>
@@ -2685,7 +1372,7 @@
               <a:rPr lang="en-CA" smtClean="0"/>
               <a:t>1</a:t>
             </a:fld>
-            <a:endParaRPr lang="en-CA"/>
+            <a:endParaRPr lang="en-CA" dirty="0"/>
           </a:p>
         </p:txBody>
       </p:sp>
@@ -2898,7 +1585,7 @@
           <a:p>
             <a:fld id="{BFFBEC62-803A-48FD-88C7-F077385A783C}" type="datetimeFigureOut">
               <a:rPr lang="en-CA" smtClean="0"/>
-              <a:t>2025-07-06</a:t>
+              <a:t>2025-07-25</a:t>
             </a:fld>
             <a:endParaRPr lang="en-CA"/>
           </a:p>
@@ -3119,7 +1806,7 @@
           <a:p>
             <a:fld id="{BFFBEC62-803A-48FD-88C7-F077385A783C}" type="datetimeFigureOut">
               <a:rPr lang="en-CA" smtClean="0"/>
-              <a:t>2025-07-06</a:t>
+              <a:t>2025-07-25</a:t>
             </a:fld>
             <a:endParaRPr lang="en-CA"/>
           </a:p>
@@ -3299,7 +1986,7 @@
           <a:p>
             <a:fld id="{BFFBEC62-803A-48FD-88C7-F077385A783C}" type="datetimeFigureOut">
               <a:rPr lang="en-CA" smtClean="0"/>
-              <a:t>2025-07-06</a:t>
+              <a:t>2025-07-25</a:t>
             </a:fld>
             <a:endParaRPr lang="en-CA"/>
           </a:p>
@@ -3469,7 +2156,7 @@
           <a:p>
             <a:fld id="{BFFBEC62-803A-48FD-88C7-F077385A783C}" type="datetimeFigureOut">
               <a:rPr lang="en-CA" smtClean="0"/>
-              <a:t>2025-07-06</a:t>
+              <a:t>2025-07-25</a:t>
             </a:fld>
             <a:endParaRPr lang="en-CA"/>
           </a:p>
@@ -3720,7 +2407,7 @@
           <a:p>
             <a:fld id="{BFFBEC62-803A-48FD-88C7-F077385A783C}" type="datetimeFigureOut">
               <a:rPr lang="en-CA" smtClean="0"/>
-              <a:t>2025-07-06</a:t>
+              <a:t>2025-07-25</a:t>
             </a:fld>
             <a:endParaRPr lang="en-CA"/>
           </a:p>
@@ -4043,7 +2730,7 @@
           <a:p>
             <a:fld id="{BFFBEC62-803A-48FD-88C7-F077385A783C}" type="datetimeFigureOut">
               <a:rPr lang="en-CA" smtClean="0"/>
-              <a:t>2025-07-06</a:t>
+              <a:t>2025-07-25</a:t>
             </a:fld>
             <a:endParaRPr lang="en-CA"/>
           </a:p>
@@ -4467,7 +3154,7 @@
           <a:p>
             <a:fld id="{BFFBEC62-803A-48FD-88C7-F077385A783C}" type="datetimeFigureOut">
               <a:rPr lang="en-CA" smtClean="0"/>
-              <a:t>2025-07-06</a:t>
+              <a:t>2025-07-25</a:t>
             </a:fld>
             <a:endParaRPr lang="en-CA"/>
           </a:p>
@@ -4585,7 +3272,7 @@
           <a:p>
             <a:fld id="{BFFBEC62-803A-48FD-88C7-F077385A783C}" type="datetimeFigureOut">
               <a:rPr lang="en-CA" smtClean="0"/>
-              <a:t>2025-07-06</a:t>
+              <a:t>2025-07-25</a:t>
             </a:fld>
             <a:endParaRPr lang="en-CA"/>
           </a:p>
@@ -4680,7 +3367,7 @@
           <a:p>
             <a:fld id="{BFFBEC62-803A-48FD-88C7-F077385A783C}" type="datetimeFigureOut">
               <a:rPr lang="en-CA" smtClean="0"/>
-              <a:t>2025-07-06</a:t>
+              <a:t>2025-07-25</a:t>
             </a:fld>
             <a:endParaRPr lang="en-CA"/>
           </a:p>
@@ -4970,7 +3657,7 @@
           <a:p>
             <a:fld id="{BFFBEC62-803A-48FD-88C7-F077385A783C}" type="datetimeFigureOut">
               <a:rPr lang="en-CA" smtClean="0"/>
-              <a:t>2025-07-06</a:t>
+              <a:t>2025-07-25</a:t>
             </a:fld>
             <a:endParaRPr lang="en-CA"/>
           </a:p>
@@ -5242,7 +3929,7 @@
           <a:p>
             <a:fld id="{BFFBEC62-803A-48FD-88C7-F077385A783C}" type="datetimeFigureOut">
               <a:rPr lang="en-CA" smtClean="0"/>
-              <a:t>2025-07-06</a:t>
+              <a:t>2025-07-25</a:t>
             </a:fld>
             <a:endParaRPr lang="en-CA"/>
           </a:p>
@@ -5496,7 +4183,7 @@
           <a:p>
             <a:fld id="{BFFBEC62-803A-48FD-88C7-F077385A783C}" type="datetimeFigureOut">
               <a:rPr lang="en-CA" smtClean="0"/>
-              <a:t>2025-07-06</a:t>
+              <a:t>2025-07-25</a:t>
             </a:fld>
             <a:endParaRPr lang="en-CA"/>
           </a:p>
@@ -6046,7 +4733,7 @@
           <a:lstStyle/>
           <a:p>
             <a:r>
-              <a:rPr lang="en-CA" sz="6600"/>
+              <a:rPr lang="en-CA" sz="6600" dirty="0"/>
               <a:t>Intro To Python</a:t>
             </a:r>
           </a:p>
@@ -6081,7 +4768,7 @@
           <a:lstStyle/>
           <a:p>
             <a:r>
-              <a:rPr lang="en-CA" sz="2000"/>
+              <a:rPr lang="en-CA" sz="2000" dirty="0"/>
               <a:t>Code Ninjas Crestwood</a:t>
             </a:r>
           </a:p>
@@ -6147,7 +4834,7 @@
           <a:bodyPr/>
           <a:lstStyle/>
           <a:p>
-            <a:endParaRPr lang="en-CA"/>
+            <a:endParaRPr lang="en-CA" dirty="0"/>
           </a:p>
         </p:txBody>
       </p:sp>
@@ -6260,10 +4947,9 @@
           <a:lstStyle/>
           <a:p>
             <a:r>
-              <a:rPr lang="en-CA"/>
+              <a:rPr lang="en-CA" dirty="0"/>
               <a:t>Combining Strings</a:t>
             </a:r>
-            <a:endParaRPr lang="en-CA" dirty="0"/>
           </a:p>
         </p:txBody>
       </p:sp>
@@ -6298,17 +4984,17 @@
               <a:buChar char="•"/>
             </a:pPr>
             <a:r>
-              <a:rPr lang="en-CA"/>
+              <a:rPr lang="en-CA" dirty="0"/>
               <a:t>To put two strings together, we can just put a plus sign (+) between the two strings!</a:t>
             </a:r>
-            <a:endParaRPr lang="en-CA" b="1"/>
+            <a:endParaRPr lang="en-CA" b="1" dirty="0"/>
           </a:p>
           <a:p>
             <a:pPr marL="285750" indent="-285750">
               <a:buFont typeface="Arial" panose="020B0604020202020204" pitchFamily="34" charset="0"/>
               <a:buChar char="•"/>
             </a:pPr>
-            <a:endParaRPr lang="en-CA"/>
+            <a:endParaRPr lang="en-CA" dirty="0"/>
           </a:p>
           <a:p>
             <a:pPr marL="285750" indent="-285750">
@@ -6316,17 +5002,17 @@
               <a:buChar char="•"/>
             </a:pPr>
             <a:r>
-              <a:rPr lang="en-CA"/>
+              <a:rPr lang="en-CA" dirty="0"/>
               <a:t>You can also use a plus sign to put two strings together inside of a </a:t>
             </a:r>
             <a:r>
-              <a:rPr lang="en-CA">
+              <a:rPr lang="en-CA" dirty="0">
                 <a:latin typeface="Consolas" panose="020B0609020204030204" pitchFamily="49" charset="0"/>
               </a:rPr>
               <a:t>print</a:t>
             </a:r>
             <a:r>
-              <a:rPr lang="en-CA"/>
+              <a:rPr lang="en-CA" dirty="0"/>
               <a:t> function.</a:t>
             </a:r>
           </a:p>
@@ -6335,7 +5021,7 @@
               <a:buFont typeface="Arial" panose="020B0604020202020204" pitchFamily="34" charset="0"/>
               <a:buChar char="•"/>
             </a:pPr>
-            <a:endParaRPr lang="en-CA"/>
+            <a:endParaRPr lang="en-CA" dirty="0"/>
           </a:p>
           <a:p>
             <a:pPr marL="285750" indent="-285750">
@@ -6343,7 +5029,7 @@
               <a:buChar char="•"/>
             </a:pPr>
             <a:r>
-              <a:rPr lang="en-CA">
+              <a:rPr lang="en-CA" dirty="0">
                 <a:solidFill>
                   <a:srgbClr val="FF0000"/>
                 </a:solidFill>
@@ -6351,7 +5037,7 @@
               <a:t>Be careful!</a:t>
             </a:r>
             <a:r>
-              <a:rPr lang="en-CA"/>
+              <a:rPr lang="en-CA" dirty="0"/>
               <a:t> When you’re combining two strings together, make sure you include a space at the end of the first string!</a:t>
             </a:r>
             <a:endParaRPr lang="en-CA" dirty="0">
@@ -9088,10 +7774,9 @@
           <a:lstStyle/>
           <a:p>
             <a:r>
-              <a:rPr lang="en-CA"/>
+              <a:rPr lang="en-CA" dirty="0"/>
               <a:t>Boolean Logic</a:t>
             </a:r>
-            <a:endParaRPr lang="en-CA" dirty="0"/>
           </a:p>
         </p:txBody>
       </p:sp>
@@ -16413,7 +15098,7 @@
             </a:r>
             <a:r>
               <a:rPr lang="en-US" dirty="0"/>
-              <a:t>  defined with the loop is False</a:t>
+              <a:t> defined with the loop is False</a:t>
             </a:r>
           </a:p>
           <a:p>

</xml_diff>